<commit_message>
Fixed bug in model class diagram
</commit_message>
<xml_diff>
--- a/docs/model-class-diagram.pptx
+++ b/docs/model-class-diagram.pptx
@@ -243,7 +243,7 @@
           <a:p>
             <a:fld id="{E739BB41-DB51-AC40-8BC3-82550C14AA6F}" type="datetimeFigureOut">
               <a:rPr lang="en-US" smtClean="0"/>
-              <a:t>9/19/18</a:t>
+              <a:t>9/21/18</a:t>
             </a:fld>
             <a:endParaRPr lang="en-US"/>
           </a:p>
@@ -413,7 +413,7 @@
           <a:p>
             <a:fld id="{E739BB41-DB51-AC40-8BC3-82550C14AA6F}" type="datetimeFigureOut">
               <a:rPr lang="en-US" smtClean="0"/>
-              <a:t>9/19/18</a:t>
+              <a:t>9/21/18</a:t>
             </a:fld>
             <a:endParaRPr lang="en-US"/>
           </a:p>
@@ -593,7 +593,7 @@
           <a:p>
             <a:fld id="{E739BB41-DB51-AC40-8BC3-82550C14AA6F}" type="datetimeFigureOut">
               <a:rPr lang="en-US" smtClean="0"/>
-              <a:t>9/19/18</a:t>
+              <a:t>9/21/18</a:t>
             </a:fld>
             <a:endParaRPr lang="en-US"/>
           </a:p>
@@ -763,7 +763,7 @@
           <a:p>
             <a:fld id="{E739BB41-DB51-AC40-8BC3-82550C14AA6F}" type="datetimeFigureOut">
               <a:rPr lang="en-US" smtClean="0"/>
-              <a:t>9/19/18</a:t>
+              <a:t>9/21/18</a:t>
             </a:fld>
             <a:endParaRPr lang="en-US"/>
           </a:p>
@@ -1009,7 +1009,7 @@
           <a:p>
             <a:fld id="{E739BB41-DB51-AC40-8BC3-82550C14AA6F}" type="datetimeFigureOut">
               <a:rPr lang="en-US" smtClean="0"/>
-              <a:t>9/19/18</a:t>
+              <a:t>9/21/18</a:t>
             </a:fld>
             <a:endParaRPr lang="en-US"/>
           </a:p>
@@ -1241,7 +1241,7 @@
           <a:p>
             <a:fld id="{E739BB41-DB51-AC40-8BC3-82550C14AA6F}" type="datetimeFigureOut">
               <a:rPr lang="en-US" smtClean="0"/>
-              <a:t>9/19/18</a:t>
+              <a:t>9/21/18</a:t>
             </a:fld>
             <a:endParaRPr lang="en-US"/>
           </a:p>
@@ -1608,7 +1608,7 @@
           <a:p>
             <a:fld id="{E739BB41-DB51-AC40-8BC3-82550C14AA6F}" type="datetimeFigureOut">
               <a:rPr lang="en-US" smtClean="0"/>
-              <a:t>9/19/18</a:t>
+              <a:t>9/21/18</a:t>
             </a:fld>
             <a:endParaRPr lang="en-US"/>
           </a:p>
@@ -1726,7 +1726,7 @@
           <a:p>
             <a:fld id="{E739BB41-DB51-AC40-8BC3-82550C14AA6F}" type="datetimeFigureOut">
               <a:rPr lang="en-US" smtClean="0"/>
-              <a:t>9/19/18</a:t>
+              <a:t>9/21/18</a:t>
             </a:fld>
             <a:endParaRPr lang="en-US"/>
           </a:p>
@@ -1821,7 +1821,7 @@
           <a:p>
             <a:fld id="{E739BB41-DB51-AC40-8BC3-82550C14AA6F}" type="datetimeFigureOut">
               <a:rPr lang="en-US" smtClean="0"/>
-              <a:t>9/19/18</a:t>
+              <a:t>9/21/18</a:t>
             </a:fld>
             <a:endParaRPr lang="en-US"/>
           </a:p>
@@ -2098,7 +2098,7 @@
           <a:p>
             <a:fld id="{E739BB41-DB51-AC40-8BC3-82550C14AA6F}" type="datetimeFigureOut">
               <a:rPr lang="en-US" smtClean="0"/>
-              <a:t>9/19/18</a:t>
+              <a:t>9/21/18</a:t>
             </a:fld>
             <a:endParaRPr lang="en-US"/>
           </a:p>
@@ -2355,7 +2355,7 @@
           <a:p>
             <a:fld id="{E739BB41-DB51-AC40-8BC3-82550C14AA6F}" type="datetimeFigureOut">
               <a:rPr lang="en-US" smtClean="0"/>
-              <a:t>9/19/18</a:t>
+              <a:t>9/21/18</a:t>
             </a:fld>
             <a:endParaRPr lang="en-US"/>
           </a:p>
@@ -2568,7 +2568,7 @@
           <a:p>
             <a:fld id="{E739BB41-DB51-AC40-8BC3-82550C14AA6F}" type="datetimeFigureOut">
               <a:rPr lang="en-US" smtClean="0"/>
-              <a:t>9/19/18</a:t>
+              <a:t>9/21/18</a:t>
             </a:fld>
             <a:endParaRPr lang="en-US"/>
           </a:p>
@@ -3148,9 +3148,10 @@
             <a:p>
               <a:pPr eaLnBrk="1" hangingPunct="1"/>
               <a:r>
-                <a:rPr lang="en-US" altLang="en-US" sz="2000" dirty="0"/>
-                <a:t>MultipleChoiceQuestions</a:t>
+                <a:rPr lang="en-US" altLang="en-US" sz="2000"/>
+                <a:t>MultipleChoiceQuestion</a:t>
               </a:r>
+              <a:endParaRPr lang="en-US" altLang="en-US" sz="2000" dirty="0"/>
             </a:p>
           </p:txBody>
         </p:sp>

</xml_diff>

<commit_message>
Updated model class and wireframes diagrams
</commit_message>
<xml_diff>
--- a/docs/model-class-diagram.pptx
+++ b/docs/model-class-diagram.pptx
@@ -5,7 +5,10 @@
     <p:sldMasterId id="2147483756" r:id="rId1"/>
   </p:sldMasterIdLst>
   <p:sldIdLst>
-    <p:sldId id="256" r:id="rId2"/>
+    <p:sldId id="258" r:id="rId2"/>
+    <p:sldId id="256" r:id="rId3"/>
+    <p:sldId id="259" r:id="rId4"/>
+    <p:sldId id="257" r:id="rId5"/>
   </p:sldIdLst>
   <p:sldSz cx="12192000" cy="6858000"/>
   <p:notesSz cx="6858000" cy="9144000"/>
@@ -243,7 +246,7 @@
           <a:p>
             <a:fld id="{E739BB41-DB51-AC40-8BC3-82550C14AA6F}" type="datetimeFigureOut">
               <a:rPr lang="en-US" smtClean="0"/>
-              <a:t>9/21/18</a:t>
+              <a:t>10/15/18</a:t>
             </a:fld>
             <a:endParaRPr lang="en-US"/>
           </a:p>
@@ -413,7 +416,7 @@
           <a:p>
             <a:fld id="{E739BB41-DB51-AC40-8BC3-82550C14AA6F}" type="datetimeFigureOut">
               <a:rPr lang="en-US" smtClean="0"/>
-              <a:t>9/21/18</a:t>
+              <a:t>10/15/18</a:t>
             </a:fld>
             <a:endParaRPr lang="en-US"/>
           </a:p>
@@ -593,7 +596,7 @@
           <a:p>
             <a:fld id="{E739BB41-DB51-AC40-8BC3-82550C14AA6F}" type="datetimeFigureOut">
               <a:rPr lang="en-US" smtClean="0"/>
-              <a:t>9/21/18</a:t>
+              <a:t>10/15/18</a:t>
             </a:fld>
             <a:endParaRPr lang="en-US"/>
           </a:p>
@@ -763,7 +766,7 @@
           <a:p>
             <a:fld id="{E739BB41-DB51-AC40-8BC3-82550C14AA6F}" type="datetimeFigureOut">
               <a:rPr lang="en-US" smtClean="0"/>
-              <a:t>9/21/18</a:t>
+              <a:t>10/15/18</a:t>
             </a:fld>
             <a:endParaRPr lang="en-US"/>
           </a:p>
@@ -1009,7 +1012,7 @@
           <a:p>
             <a:fld id="{E739BB41-DB51-AC40-8BC3-82550C14AA6F}" type="datetimeFigureOut">
               <a:rPr lang="en-US" smtClean="0"/>
-              <a:t>9/21/18</a:t>
+              <a:t>10/15/18</a:t>
             </a:fld>
             <a:endParaRPr lang="en-US"/>
           </a:p>
@@ -1241,7 +1244,7 @@
           <a:p>
             <a:fld id="{E739BB41-DB51-AC40-8BC3-82550C14AA6F}" type="datetimeFigureOut">
               <a:rPr lang="en-US" smtClean="0"/>
-              <a:t>9/21/18</a:t>
+              <a:t>10/15/18</a:t>
             </a:fld>
             <a:endParaRPr lang="en-US"/>
           </a:p>
@@ -1608,7 +1611,7 @@
           <a:p>
             <a:fld id="{E739BB41-DB51-AC40-8BC3-82550C14AA6F}" type="datetimeFigureOut">
               <a:rPr lang="en-US" smtClean="0"/>
-              <a:t>9/21/18</a:t>
+              <a:t>10/15/18</a:t>
             </a:fld>
             <a:endParaRPr lang="en-US"/>
           </a:p>
@@ -1726,7 +1729,7 @@
           <a:p>
             <a:fld id="{E739BB41-DB51-AC40-8BC3-82550C14AA6F}" type="datetimeFigureOut">
               <a:rPr lang="en-US" smtClean="0"/>
-              <a:t>9/21/18</a:t>
+              <a:t>10/15/18</a:t>
             </a:fld>
             <a:endParaRPr lang="en-US"/>
           </a:p>
@@ -1821,7 +1824,7 @@
           <a:p>
             <a:fld id="{E739BB41-DB51-AC40-8BC3-82550C14AA6F}" type="datetimeFigureOut">
               <a:rPr lang="en-US" smtClean="0"/>
-              <a:t>9/21/18</a:t>
+              <a:t>10/15/18</a:t>
             </a:fld>
             <a:endParaRPr lang="en-US"/>
           </a:p>
@@ -2098,7 +2101,7 @@
           <a:p>
             <a:fld id="{E739BB41-DB51-AC40-8BC3-82550C14AA6F}" type="datetimeFigureOut">
               <a:rPr lang="en-US" smtClean="0"/>
-              <a:t>9/21/18</a:t>
+              <a:t>10/15/18</a:t>
             </a:fld>
             <a:endParaRPr lang="en-US"/>
           </a:p>
@@ -2355,7 +2358,7 @@
           <a:p>
             <a:fld id="{E739BB41-DB51-AC40-8BC3-82550C14AA6F}" type="datetimeFigureOut">
               <a:rPr lang="en-US" smtClean="0"/>
-              <a:t>9/21/18</a:t>
+              <a:t>10/15/18</a:t>
             </a:fld>
             <a:endParaRPr lang="en-US"/>
           </a:p>
@@ -2568,7 +2571,7 @@
           <a:p>
             <a:fld id="{E739BB41-DB51-AC40-8BC3-82550C14AA6F}" type="datetimeFigureOut">
               <a:rPr lang="en-US" smtClean="0"/>
-              <a:t>9/21/18</a:t>
+              <a:t>10/15/18</a:t>
             </a:fld>
             <a:endParaRPr lang="en-US"/>
           </a:p>
@@ -2973,6 +2976,70 @@
           <a:chExt cx="0" cy="0"/>
         </a:xfrm>
       </p:grpSpPr>
+      <p:sp>
+        <p:nvSpPr>
+          <p:cNvPr id="2" name="Title 1">
+            <a:extLst>
+              <a:ext uri="{FF2B5EF4-FFF2-40B4-BE49-F238E27FC236}">
+                <a16:creationId xmlns:a16="http://schemas.microsoft.com/office/drawing/2014/main" id="{400BC608-ED53-9E46-95E6-23B44E45324D}"/>
+              </a:ext>
+            </a:extLst>
+          </p:cNvPr>
+          <p:cNvSpPr>
+            <a:spLocks noGrp="1"/>
+          </p:cNvSpPr>
+          <p:nvPr>
+            <p:ph type="title"/>
+          </p:nvPr>
+        </p:nvSpPr>
+        <p:spPr>
+          <a:xfrm>
+            <a:off x="838200" y="2766219"/>
+            <a:ext cx="10515600" cy="1325563"/>
+          </a:xfrm>
+        </p:spPr>
+        <p:txBody>
+          <a:bodyPr/>
+          <a:lstStyle/>
+          <a:p>
+            <a:pPr algn="ctr"/>
+            <a:r>
+              <a:rPr lang="en-US" dirty="0"/>
+              <a:t>demo-07-mvc-model</a:t>
+            </a:r>
+          </a:p>
+        </p:txBody>
+      </p:sp>
+    </p:spTree>
+    <p:extLst>
+      <p:ext uri="{BB962C8B-B14F-4D97-AF65-F5344CB8AC3E}">
+        <p14:creationId xmlns:p14="http://schemas.microsoft.com/office/powerpoint/2010/main" val="1177267814"/>
+      </p:ext>
+    </p:extLst>
+  </p:cSld>
+  <p:clrMapOvr>
+    <a:masterClrMapping/>
+  </p:clrMapOvr>
+</p:sld>
+</file>
+
+<file path=ppt/slides/slide2.xml><?xml version="1.0" encoding="utf-8"?>
+<p:sld xmlns:a="http://schemas.openxmlformats.org/drawingml/2006/main" xmlns:r="http://schemas.openxmlformats.org/officeDocument/2006/relationships" xmlns:p="http://schemas.openxmlformats.org/presentationml/2006/main">
+  <p:cSld>
+    <p:spTree>
+      <p:nvGrpSpPr>
+        <p:cNvPr id="1" name=""/>
+        <p:cNvGrpSpPr/>
+        <p:nvPr/>
+      </p:nvGrpSpPr>
+      <p:grpSpPr>
+        <a:xfrm>
+          <a:off x="0" y="0"/>
+          <a:ext cx="0" cy="0"/>
+          <a:chOff x="0" y="0"/>
+          <a:chExt cx="0" cy="0"/>
+        </a:xfrm>
+      </p:grpSpPr>
       <p:grpSp>
         <p:nvGrpSpPr>
           <p:cNvPr id="2" name="Group 1">
@@ -2987,7 +3054,7 @@
         </p:nvGrpSpPr>
         <p:grpSpPr>
           <a:xfrm>
-            <a:off x="4659857" y="1450553"/>
+            <a:off x="4659857" y="2259449"/>
             <a:ext cx="2872287" cy="2339102"/>
             <a:chOff x="3897790" y="1311900"/>
             <a:chExt cx="3458441" cy="2339102"/>
@@ -3356,6 +3423,991 @@
     <p:extLst>
       <p:ext uri="{BB962C8B-B14F-4D97-AF65-F5344CB8AC3E}">
         <p14:creationId xmlns:p14="http://schemas.microsoft.com/office/powerpoint/2010/main" val="3635043082"/>
+      </p:ext>
+    </p:extLst>
+  </p:cSld>
+  <p:clrMapOvr>
+    <a:masterClrMapping/>
+  </p:clrMapOvr>
+</p:sld>
+</file>
+
+<file path=ppt/slides/slide3.xml><?xml version="1.0" encoding="utf-8"?>
+<p:sld xmlns:a="http://schemas.openxmlformats.org/drawingml/2006/main" xmlns:r="http://schemas.openxmlformats.org/officeDocument/2006/relationships" xmlns:p="http://schemas.openxmlformats.org/presentationml/2006/main">
+  <p:cSld>
+    <p:spTree>
+      <p:nvGrpSpPr>
+        <p:cNvPr id="1" name=""/>
+        <p:cNvGrpSpPr/>
+        <p:nvPr/>
+      </p:nvGrpSpPr>
+      <p:grpSpPr>
+        <a:xfrm>
+          <a:off x="0" y="0"/>
+          <a:ext cx="0" cy="0"/>
+          <a:chOff x="0" y="0"/>
+          <a:chExt cx="0" cy="0"/>
+        </a:xfrm>
+      </p:grpSpPr>
+      <p:sp>
+        <p:nvSpPr>
+          <p:cNvPr id="2" name="Title 1">
+            <a:extLst>
+              <a:ext uri="{FF2B5EF4-FFF2-40B4-BE49-F238E27FC236}">
+                <a16:creationId xmlns:a16="http://schemas.microsoft.com/office/drawing/2014/main" id="{400BC608-ED53-9E46-95E6-23B44E45324D}"/>
+              </a:ext>
+            </a:extLst>
+          </p:cNvPr>
+          <p:cNvSpPr>
+            <a:spLocks noGrp="1"/>
+          </p:cNvSpPr>
+          <p:nvPr>
+            <p:ph type="title"/>
+          </p:nvPr>
+        </p:nvSpPr>
+        <p:spPr>
+          <a:xfrm>
+            <a:off x="838200" y="2766219"/>
+            <a:ext cx="10515600" cy="1325563"/>
+          </a:xfrm>
+        </p:spPr>
+        <p:txBody>
+          <a:bodyPr/>
+          <a:lstStyle/>
+          <a:p>
+            <a:pPr algn="ctr"/>
+            <a:r>
+              <a:rPr lang="en-US" dirty="0"/>
+              <a:t>demo-12-has-many-assoc</a:t>
+            </a:r>
+          </a:p>
+        </p:txBody>
+      </p:sp>
+    </p:spTree>
+    <p:extLst>
+      <p:ext uri="{BB962C8B-B14F-4D97-AF65-F5344CB8AC3E}">
+        <p14:creationId xmlns:p14="http://schemas.microsoft.com/office/powerpoint/2010/main" val="1830227482"/>
+      </p:ext>
+    </p:extLst>
+  </p:cSld>
+  <p:clrMapOvr>
+    <a:masterClrMapping/>
+  </p:clrMapOvr>
+</p:sld>
+</file>
+
+<file path=ppt/slides/slide4.xml><?xml version="1.0" encoding="utf-8"?>
+<p:sld xmlns:a="http://schemas.openxmlformats.org/drawingml/2006/main" xmlns:r="http://schemas.openxmlformats.org/officeDocument/2006/relationships" xmlns:p="http://schemas.openxmlformats.org/presentationml/2006/main">
+  <p:cSld>
+    <p:spTree>
+      <p:nvGrpSpPr>
+        <p:cNvPr id="1" name=""/>
+        <p:cNvGrpSpPr/>
+        <p:nvPr/>
+      </p:nvGrpSpPr>
+      <p:grpSpPr>
+        <a:xfrm>
+          <a:off x="0" y="0"/>
+          <a:ext cx="0" cy="0"/>
+          <a:chOff x="0" y="0"/>
+          <a:chExt cx="0" cy="0"/>
+        </a:xfrm>
+      </p:grpSpPr>
+      <p:grpSp>
+        <p:nvGrpSpPr>
+          <p:cNvPr id="2" name="Group 1">
+            <a:extLst>
+              <a:ext uri="{FF2B5EF4-FFF2-40B4-BE49-F238E27FC236}">
+                <a16:creationId xmlns:a16="http://schemas.microsoft.com/office/drawing/2014/main" id="{28D0630C-FB17-0E4C-A756-3B437772780F}"/>
+              </a:ext>
+            </a:extLst>
+          </p:cNvPr>
+          <p:cNvGrpSpPr/>
+          <p:nvPr/>
+        </p:nvGrpSpPr>
+        <p:grpSpPr>
+          <a:xfrm>
+            <a:off x="7706867" y="2259449"/>
+            <a:ext cx="2872287" cy="2339102"/>
+            <a:chOff x="3897790" y="1311900"/>
+            <a:chExt cx="3458441" cy="2339102"/>
+          </a:xfrm>
+        </p:grpSpPr>
+        <p:sp>
+          <p:nvSpPr>
+            <p:cNvPr id="50" name="TextBox 29">
+              <a:extLst>
+                <a:ext uri="{FF2B5EF4-FFF2-40B4-BE49-F238E27FC236}">
+                  <a16:creationId xmlns:a16="http://schemas.microsoft.com/office/drawing/2014/main" id="{EC5D1D39-01C2-544F-83B5-7EB087837FAC}"/>
+                </a:ext>
+              </a:extLst>
+            </p:cNvPr>
+            <p:cNvSpPr txBox="1">
+              <a:spLocks noChangeArrowheads="1"/>
+            </p:cNvSpPr>
+            <p:nvPr/>
+          </p:nvSpPr>
+          <p:spPr bwMode="auto">
+            <a:xfrm>
+              <a:off x="3897790" y="1311900"/>
+              <a:ext cx="3458441" cy="400110"/>
+            </a:xfrm>
+            <a:prstGeom prst="rect">
+              <a:avLst/>
+            </a:prstGeom>
+            <a:noFill/>
+            <a:ln w="38100">
+              <a:solidFill>
+                <a:schemeClr val="tx1"/>
+              </a:solidFill>
+              <a:miter lim="800000"/>
+              <a:headEnd/>
+              <a:tailEnd/>
+            </a:ln>
+            <a:extLst>
+              <a:ext uri="{909E8E84-426E-40DD-AFC4-6F175D3DCCD1}">
+                <a14:hiddenFill xmlns:a14="http://schemas.microsoft.com/office/drawing/2010/main">
+                  <a:solidFill>
+                    <a:srgbClr val="FFFFFF"/>
+                  </a:solidFill>
+                </a14:hiddenFill>
+              </a:ext>
+            </a:extLst>
+          </p:spPr>
+          <p:txBody>
+            <a:bodyPr wrap="square">
+              <a:spAutoFit/>
+            </a:bodyPr>
+            <a:lstStyle>
+              <a:lvl1pPr eaLnBrk="0" hangingPunct="0">
+                <a:defRPr sz="2400">
+                  <a:solidFill>
+                    <a:schemeClr val="tx1"/>
+                  </a:solidFill>
+                  <a:latin typeface="Calibri" charset="0"/>
+                  <a:ea typeface="ＭＳ Ｐゴシック" charset="-128"/>
+                </a:defRPr>
+              </a:lvl1pPr>
+              <a:lvl2pPr marL="742950" indent="-285750" eaLnBrk="0" hangingPunct="0">
+                <a:defRPr sz="2400">
+                  <a:solidFill>
+                    <a:schemeClr val="tx1"/>
+                  </a:solidFill>
+                  <a:latin typeface="Calibri" charset="0"/>
+                  <a:ea typeface="ＭＳ Ｐゴシック" charset="-128"/>
+                </a:defRPr>
+              </a:lvl2pPr>
+              <a:lvl3pPr marL="1143000" indent="-228600" eaLnBrk="0" hangingPunct="0">
+                <a:defRPr sz="2400">
+                  <a:solidFill>
+                    <a:schemeClr val="tx1"/>
+                  </a:solidFill>
+                  <a:latin typeface="Calibri" charset="0"/>
+                  <a:ea typeface="ＭＳ Ｐゴシック" charset="-128"/>
+                </a:defRPr>
+              </a:lvl3pPr>
+              <a:lvl4pPr marL="1600200" indent="-228600" eaLnBrk="0" hangingPunct="0">
+                <a:defRPr sz="2400">
+                  <a:solidFill>
+                    <a:schemeClr val="tx1"/>
+                  </a:solidFill>
+                  <a:latin typeface="Calibri" charset="0"/>
+                  <a:ea typeface="ＭＳ Ｐゴシック" charset="-128"/>
+                </a:defRPr>
+              </a:lvl4pPr>
+              <a:lvl5pPr marL="2057400" indent="-228600" eaLnBrk="0" hangingPunct="0">
+                <a:defRPr sz="2400">
+                  <a:solidFill>
+                    <a:schemeClr val="tx1"/>
+                  </a:solidFill>
+                  <a:latin typeface="Calibri" charset="0"/>
+                  <a:ea typeface="ＭＳ Ｐゴシック" charset="-128"/>
+                </a:defRPr>
+              </a:lvl5pPr>
+              <a:lvl6pPr marL="2514600" indent="-228600" defTabSz="457200" eaLnBrk="0" fontAlgn="base" hangingPunct="0">
+                <a:spcBef>
+                  <a:spcPct val="0"/>
+                </a:spcBef>
+                <a:spcAft>
+                  <a:spcPct val="0"/>
+                </a:spcAft>
+                <a:defRPr sz="2400">
+                  <a:solidFill>
+                    <a:schemeClr val="tx1"/>
+                  </a:solidFill>
+                  <a:latin typeface="Calibri" charset="0"/>
+                  <a:ea typeface="ＭＳ Ｐゴシック" charset="-128"/>
+                </a:defRPr>
+              </a:lvl6pPr>
+              <a:lvl7pPr marL="2971800" indent="-228600" defTabSz="457200" eaLnBrk="0" fontAlgn="base" hangingPunct="0">
+                <a:spcBef>
+                  <a:spcPct val="0"/>
+                </a:spcBef>
+                <a:spcAft>
+                  <a:spcPct val="0"/>
+                </a:spcAft>
+                <a:defRPr sz="2400">
+                  <a:solidFill>
+                    <a:schemeClr val="tx1"/>
+                  </a:solidFill>
+                  <a:latin typeface="Calibri" charset="0"/>
+                  <a:ea typeface="ＭＳ Ｐゴシック" charset="-128"/>
+                </a:defRPr>
+              </a:lvl7pPr>
+              <a:lvl8pPr marL="3429000" indent="-228600" defTabSz="457200" eaLnBrk="0" fontAlgn="base" hangingPunct="0">
+                <a:spcBef>
+                  <a:spcPct val="0"/>
+                </a:spcBef>
+                <a:spcAft>
+                  <a:spcPct val="0"/>
+                </a:spcAft>
+                <a:defRPr sz="2400">
+                  <a:solidFill>
+                    <a:schemeClr val="tx1"/>
+                  </a:solidFill>
+                  <a:latin typeface="Calibri" charset="0"/>
+                  <a:ea typeface="ＭＳ Ｐゴシック" charset="-128"/>
+                </a:defRPr>
+              </a:lvl8pPr>
+              <a:lvl9pPr marL="3886200" indent="-228600" defTabSz="457200" eaLnBrk="0" fontAlgn="base" hangingPunct="0">
+                <a:spcBef>
+                  <a:spcPct val="0"/>
+                </a:spcBef>
+                <a:spcAft>
+                  <a:spcPct val="0"/>
+                </a:spcAft>
+                <a:defRPr sz="2400">
+                  <a:solidFill>
+                    <a:schemeClr val="tx1"/>
+                  </a:solidFill>
+                  <a:latin typeface="Calibri" charset="0"/>
+                  <a:ea typeface="ＭＳ Ｐゴシック" charset="-128"/>
+                </a:defRPr>
+              </a:lvl9pPr>
+            </a:lstStyle>
+            <a:p>
+              <a:pPr eaLnBrk="1" hangingPunct="1"/>
+              <a:r>
+                <a:rPr lang="en-US" altLang="en-US" sz="2000"/>
+                <a:t>MultipleChoiceQuestion</a:t>
+              </a:r>
+              <a:endParaRPr lang="en-US" altLang="en-US" sz="2000" dirty="0"/>
+            </a:p>
+          </p:txBody>
+        </p:sp>
+        <p:sp>
+          <p:nvSpPr>
+            <p:cNvPr id="51" name="TextBox 29">
+              <a:extLst>
+                <a:ext uri="{FF2B5EF4-FFF2-40B4-BE49-F238E27FC236}">
+                  <a16:creationId xmlns:a16="http://schemas.microsoft.com/office/drawing/2014/main" id="{9A3DB986-71F4-D74D-90AB-0008C6895020}"/>
+                </a:ext>
+              </a:extLst>
+            </p:cNvPr>
+            <p:cNvSpPr txBox="1">
+              <a:spLocks noChangeArrowheads="1"/>
+            </p:cNvSpPr>
+            <p:nvPr/>
+          </p:nvSpPr>
+          <p:spPr bwMode="auto">
+            <a:xfrm>
+              <a:off x="3897790" y="1712010"/>
+              <a:ext cx="3458441" cy="1938992"/>
+            </a:xfrm>
+            <a:prstGeom prst="rect">
+              <a:avLst/>
+            </a:prstGeom>
+            <a:noFill/>
+            <a:ln w="38100">
+              <a:solidFill>
+                <a:schemeClr val="tx1"/>
+              </a:solidFill>
+              <a:miter lim="800000"/>
+              <a:headEnd/>
+              <a:tailEnd/>
+            </a:ln>
+            <a:extLst>
+              <a:ext uri="{909E8E84-426E-40DD-AFC4-6F175D3DCCD1}">
+                <a14:hiddenFill xmlns:a14="http://schemas.microsoft.com/office/drawing/2010/main">
+                  <a:solidFill>
+                    <a:srgbClr val="FFFFFF"/>
+                  </a:solidFill>
+                </a14:hiddenFill>
+              </a:ext>
+            </a:extLst>
+          </p:spPr>
+          <p:txBody>
+            <a:bodyPr wrap="square">
+              <a:spAutoFit/>
+            </a:bodyPr>
+            <a:lstStyle>
+              <a:lvl1pPr eaLnBrk="0" hangingPunct="0">
+                <a:defRPr sz="2400">
+                  <a:solidFill>
+                    <a:schemeClr val="tx1"/>
+                  </a:solidFill>
+                  <a:latin typeface="Calibri" charset="0"/>
+                  <a:ea typeface="ＭＳ Ｐゴシック" charset="-128"/>
+                </a:defRPr>
+              </a:lvl1pPr>
+              <a:lvl2pPr marL="742950" indent="-285750" eaLnBrk="0" hangingPunct="0">
+                <a:defRPr sz="2400">
+                  <a:solidFill>
+                    <a:schemeClr val="tx1"/>
+                  </a:solidFill>
+                  <a:latin typeface="Calibri" charset="0"/>
+                  <a:ea typeface="ＭＳ Ｐゴシック" charset="-128"/>
+                </a:defRPr>
+              </a:lvl2pPr>
+              <a:lvl3pPr marL="1143000" indent="-228600" eaLnBrk="0" hangingPunct="0">
+                <a:defRPr sz="2400">
+                  <a:solidFill>
+                    <a:schemeClr val="tx1"/>
+                  </a:solidFill>
+                  <a:latin typeface="Calibri" charset="0"/>
+                  <a:ea typeface="ＭＳ Ｐゴシック" charset="-128"/>
+                </a:defRPr>
+              </a:lvl3pPr>
+              <a:lvl4pPr marL="1600200" indent="-228600" eaLnBrk="0" hangingPunct="0">
+                <a:defRPr sz="2400">
+                  <a:solidFill>
+                    <a:schemeClr val="tx1"/>
+                  </a:solidFill>
+                  <a:latin typeface="Calibri" charset="0"/>
+                  <a:ea typeface="ＭＳ Ｐゴシック" charset="-128"/>
+                </a:defRPr>
+              </a:lvl4pPr>
+              <a:lvl5pPr marL="2057400" indent="-228600" eaLnBrk="0" hangingPunct="0">
+                <a:defRPr sz="2400">
+                  <a:solidFill>
+                    <a:schemeClr val="tx1"/>
+                  </a:solidFill>
+                  <a:latin typeface="Calibri" charset="0"/>
+                  <a:ea typeface="ＭＳ Ｐゴシック" charset="-128"/>
+                </a:defRPr>
+              </a:lvl5pPr>
+              <a:lvl6pPr marL="2514600" indent="-228600" defTabSz="457200" eaLnBrk="0" fontAlgn="base" hangingPunct="0">
+                <a:spcBef>
+                  <a:spcPct val="0"/>
+                </a:spcBef>
+                <a:spcAft>
+                  <a:spcPct val="0"/>
+                </a:spcAft>
+                <a:defRPr sz="2400">
+                  <a:solidFill>
+                    <a:schemeClr val="tx1"/>
+                  </a:solidFill>
+                  <a:latin typeface="Calibri" charset="0"/>
+                  <a:ea typeface="ＭＳ Ｐゴシック" charset="-128"/>
+                </a:defRPr>
+              </a:lvl6pPr>
+              <a:lvl7pPr marL="2971800" indent="-228600" defTabSz="457200" eaLnBrk="0" fontAlgn="base" hangingPunct="0">
+                <a:spcBef>
+                  <a:spcPct val="0"/>
+                </a:spcBef>
+                <a:spcAft>
+                  <a:spcPct val="0"/>
+                </a:spcAft>
+                <a:defRPr sz="2400">
+                  <a:solidFill>
+                    <a:schemeClr val="tx1"/>
+                  </a:solidFill>
+                  <a:latin typeface="Calibri" charset="0"/>
+                  <a:ea typeface="ＭＳ Ｐゴシック" charset="-128"/>
+                </a:defRPr>
+              </a:lvl7pPr>
+              <a:lvl8pPr marL="3429000" indent="-228600" defTabSz="457200" eaLnBrk="0" fontAlgn="base" hangingPunct="0">
+                <a:spcBef>
+                  <a:spcPct val="0"/>
+                </a:spcBef>
+                <a:spcAft>
+                  <a:spcPct val="0"/>
+                </a:spcAft>
+                <a:defRPr sz="2400">
+                  <a:solidFill>
+                    <a:schemeClr val="tx1"/>
+                  </a:solidFill>
+                  <a:latin typeface="Calibri" charset="0"/>
+                  <a:ea typeface="ＭＳ Ｐゴシック" charset="-128"/>
+                </a:defRPr>
+              </a:lvl8pPr>
+              <a:lvl9pPr marL="3886200" indent="-228600" defTabSz="457200" eaLnBrk="0" fontAlgn="base" hangingPunct="0">
+                <a:spcBef>
+                  <a:spcPct val="0"/>
+                </a:spcBef>
+                <a:spcAft>
+                  <a:spcPct val="0"/>
+                </a:spcAft>
+                <a:defRPr sz="2400">
+                  <a:solidFill>
+                    <a:schemeClr val="tx1"/>
+                  </a:solidFill>
+                  <a:latin typeface="Calibri" charset="0"/>
+                  <a:ea typeface="ＭＳ Ｐゴシック" charset="-128"/>
+                </a:defRPr>
+              </a:lvl9pPr>
+            </a:lstStyle>
+            <a:p>
+              <a:pPr eaLnBrk="1" hangingPunct="1"/>
+              <a:r>
+                <a:rPr lang="en-US" altLang="en-US" sz="2000" dirty="0"/>
+                <a:t>question : string</a:t>
+              </a:r>
+            </a:p>
+            <a:p>
+              <a:pPr eaLnBrk="1" hangingPunct="1"/>
+              <a:r>
+                <a:rPr lang="en-US" altLang="en-US" sz="2000" dirty="0"/>
+                <a:t>answer : string</a:t>
+              </a:r>
+            </a:p>
+            <a:p>
+              <a:pPr eaLnBrk="1" hangingPunct="1"/>
+              <a:r>
+                <a:rPr lang="en-US" altLang="en-US" sz="2000" dirty="0"/>
+                <a:t>distractor_1 : string</a:t>
+              </a:r>
+            </a:p>
+            <a:p>
+              <a:pPr eaLnBrk="1" hangingPunct="1"/>
+              <a:r>
+                <a:rPr lang="en-US" altLang="en-US" sz="2000" dirty="0"/>
+                <a:t>distractor_2 : string</a:t>
+              </a:r>
+            </a:p>
+            <a:p>
+              <a:pPr eaLnBrk="1" hangingPunct="1"/>
+              <a:r>
+                <a:rPr lang="en-US" altLang="en-US" sz="2000" dirty="0"/>
+                <a:t>distractor_3 : string</a:t>
+              </a:r>
+            </a:p>
+            <a:p>
+              <a:pPr eaLnBrk="1" hangingPunct="1"/>
+              <a:r>
+                <a:rPr lang="en-US" altLang="en-US" sz="2000" dirty="0"/>
+                <a:t>distractor_4 : string</a:t>
+              </a:r>
+            </a:p>
+          </p:txBody>
+        </p:sp>
+      </p:grpSp>
+      <p:grpSp>
+        <p:nvGrpSpPr>
+          <p:cNvPr id="5" name="Group 4">
+            <a:extLst>
+              <a:ext uri="{FF2B5EF4-FFF2-40B4-BE49-F238E27FC236}">
+                <a16:creationId xmlns:a16="http://schemas.microsoft.com/office/drawing/2014/main" id="{17553D60-DE0D-0C45-BECD-732F87913EF7}"/>
+              </a:ext>
+            </a:extLst>
+          </p:cNvPr>
+          <p:cNvGrpSpPr/>
+          <p:nvPr/>
+        </p:nvGrpSpPr>
+        <p:grpSpPr>
+          <a:xfrm>
+            <a:off x="1612846" y="2259449"/>
+            <a:ext cx="2872287" cy="1107996"/>
+            <a:chOff x="3897790" y="1311900"/>
+            <a:chExt cx="3458441" cy="1107996"/>
+          </a:xfrm>
+        </p:grpSpPr>
+        <p:sp>
+          <p:nvSpPr>
+            <p:cNvPr id="6" name="TextBox 29">
+              <a:extLst>
+                <a:ext uri="{FF2B5EF4-FFF2-40B4-BE49-F238E27FC236}">
+                  <a16:creationId xmlns:a16="http://schemas.microsoft.com/office/drawing/2014/main" id="{F486DF5F-BEE6-6045-AC63-7E6477A3415B}"/>
+                </a:ext>
+              </a:extLst>
+            </p:cNvPr>
+            <p:cNvSpPr txBox="1">
+              <a:spLocks noChangeArrowheads="1"/>
+            </p:cNvSpPr>
+            <p:nvPr/>
+          </p:nvSpPr>
+          <p:spPr bwMode="auto">
+            <a:xfrm>
+              <a:off x="3897790" y="1311900"/>
+              <a:ext cx="3458441" cy="400110"/>
+            </a:xfrm>
+            <a:prstGeom prst="rect">
+              <a:avLst/>
+            </a:prstGeom>
+            <a:noFill/>
+            <a:ln w="38100">
+              <a:solidFill>
+                <a:schemeClr val="tx1"/>
+              </a:solidFill>
+              <a:miter lim="800000"/>
+              <a:headEnd/>
+              <a:tailEnd/>
+            </a:ln>
+            <a:extLst>
+              <a:ext uri="{909E8E84-426E-40DD-AFC4-6F175D3DCCD1}">
+                <a14:hiddenFill xmlns:a14="http://schemas.microsoft.com/office/drawing/2010/main">
+                  <a:solidFill>
+                    <a:srgbClr val="FFFFFF"/>
+                  </a:solidFill>
+                </a14:hiddenFill>
+              </a:ext>
+            </a:extLst>
+          </p:spPr>
+          <p:txBody>
+            <a:bodyPr wrap="square">
+              <a:spAutoFit/>
+            </a:bodyPr>
+            <a:lstStyle>
+              <a:lvl1pPr eaLnBrk="0" hangingPunct="0">
+                <a:defRPr sz="2400">
+                  <a:solidFill>
+                    <a:schemeClr val="tx1"/>
+                  </a:solidFill>
+                  <a:latin typeface="Calibri" charset="0"/>
+                  <a:ea typeface="ＭＳ Ｐゴシック" charset="-128"/>
+                </a:defRPr>
+              </a:lvl1pPr>
+              <a:lvl2pPr marL="742950" indent="-285750" eaLnBrk="0" hangingPunct="0">
+                <a:defRPr sz="2400">
+                  <a:solidFill>
+                    <a:schemeClr val="tx1"/>
+                  </a:solidFill>
+                  <a:latin typeface="Calibri" charset="0"/>
+                  <a:ea typeface="ＭＳ Ｐゴシック" charset="-128"/>
+                </a:defRPr>
+              </a:lvl2pPr>
+              <a:lvl3pPr marL="1143000" indent="-228600" eaLnBrk="0" hangingPunct="0">
+                <a:defRPr sz="2400">
+                  <a:solidFill>
+                    <a:schemeClr val="tx1"/>
+                  </a:solidFill>
+                  <a:latin typeface="Calibri" charset="0"/>
+                  <a:ea typeface="ＭＳ Ｐゴシック" charset="-128"/>
+                </a:defRPr>
+              </a:lvl3pPr>
+              <a:lvl4pPr marL="1600200" indent="-228600" eaLnBrk="0" hangingPunct="0">
+                <a:defRPr sz="2400">
+                  <a:solidFill>
+                    <a:schemeClr val="tx1"/>
+                  </a:solidFill>
+                  <a:latin typeface="Calibri" charset="0"/>
+                  <a:ea typeface="ＭＳ Ｐゴシック" charset="-128"/>
+                </a:defRPr>
+              </a:lvl4pPr>
+              <a:lvl5pPr marL="2057400" indent="-228600" eaLnBrk="0" hangingPunct="0">
+                <a:defRPr sz="2400">
+                  <a:solidFill>
+                    <a:schemeClr val="tx1"/>
+                  </a:solidFill>
+                  <a:latin typeface="Calibri" charset="0"/>
+                  <a:ea typeface="ＭＳ Ｐゴシック" charset="-128"/>
+                </a:defRPr>
+              </a:lvl5pPr>
+              <a:lvl6pPr marL="2514600" indent="-228600" defTabSz="457200" eaLnBrk="0" fontAlgn="base" hangingPunct="0">
+                <a:spcBef>
+                  <a:spcPct val="0"/>
+                </a:spcBef>
+                <a:spcAft>
+                  <a:spcPct val="0"/>
+                </a:spcAft>
+                <a:defRPr sz="2400">
+                  <a:solidFill>
+                    <a:schemeClr val="tx1"/>
+                  </a:solidFill>
+                  <a:latin typeface="Calibri" charset="0"/>
+                  <a:ea typeface="ＭＳ Ｐゴシック" charset="-128"/>
+                </a:defRPr>
+              </a:lvl6pPr>
+              <a:lvl7pPr marL="2971800" indent="-228600" defTabSz="457200" eaLnBrk="0" fontAlgn="base" hangingPunct="0">
+                <a:spcBef>
+                  <a:spcPct val="0"/>
+                </a:spcBef>
+                <a:spcAft>
+                  <a:spcPct val="0"/>
+                </a:spcAft>
+                <a:defRPr sz="2400">
+                  <a:solidFill>
+                    <a:schemeClr val="tx1"/>
+                  </a:solidFill>
+                  <a:latin typeface="Calibri" charset="0"/>
+                  <a:ea typeface="ＭＳ Ｐゴシック" charset="-128"/>
+                </a:defRPr>
+              </a:lvl7pPr>
+              <a:lvl8pPr marL="3429000" indent="-228600" defTabSz="457200" eaLnBrk="0" fontAlgn="base" hangingPunct="0">
+                <a:spcBef>
+                  <a:spcPct val="0"/>
+                </a:spcBef>
+                <a:spcAft>
+                  <a:spcPct val="0"/>
+                </a:spcAft>
+                <a:defRPr sz="2400">
+                  <a:solidFill>
+                    <a:schemeClr val="tx1"/>
+                  </a:solidFill>
+                  <a:latin typeface="Calibri" charset="0"/>
+                  <a:ea typeface="ＭＳ Ｐゴシック" charset="-128"/>
+                </a:defRPr>
+              </a:lvl8pPr>
+              <a:lvl9pPr marL="3886200" indent="-228600" defTabSz="457200" eaLnBrk="0" fontAlgn="base" hangingPunct="0">
+                <a:spcBef>
+                  <a:spcPct val="0"/>
+                </a:spcBef>
+                <a:spcAft>
+                  <a:spcPct val="0"/>
+                </a:spcAft>
+                <a:defRPr sz="2400">
+                  <a:solidFill>
+                    <a:schemeClr val="tx1"/>
+                  </a:solidFill>
+                  <a:latin typeface="Calibri" charset="0"/>
+                  <a:ea typeface="ＭＳ Ｐゴシック" charset="-128"/>
+                </a:defRPr>
+              </a:lvl9pPr>
+            </a:lstStyle>
+            <a:p>
+              <a:pPr eaLnBrk="1" hangingPunct="1"/>
+              <a:r>
+                <a:rPr lang="en-US" altLang="en-US" sz="2000" dirty="0"/>
+                <a:t>Quiz</a:t>
+              </a:r>
+            </a:p>
+          </p:txBody>
+        </p:sp>
+        <p:sp>
+          <p:nvSpPr>
+            <p:cNvPr id="7" name="TextBox 29">
+              <a:extLst>
+                <a:ext uri="{FF2B5EF4-FFF2-40B4-BE49-F238E27FC236}">
+                  <a16:creationId xmlns:a16="http://schemas.microsoft.com/office/drawing/2014/main" id="{7F9CCB82-B13A-9743-8F66-FF620E65F5C5}"/>
+                </a:ext>
+              </a:extLst>
+            </p:cNvPr>
+            <p:cNvSpPr txBox="1">
+              <a:spLocks noChangeArrowheads="1"/>
+            </p:cNvSpPr>
+            <p:nvPr/>
+          </p:nvSpPr>
+          <p:spPr bwMode="auto">
+            <a:xfrm>
+              <a:off x="3897790" y="1712010"/>
+              <a:ext cx="3458441" cy="707886"/>
+            </a:xfrm>
+            <a:prstGeom prst="rect">
+              <a:avLst/>
+            </a:prstGeom>
+            <a:noFill/>
+            <a:ln w="38100">
+              <a:solidFill>
+                <a:schemeClr val="tx1"/>
+              </a:solidFill>
+              <a:miter lim="800000"/>
+              <a:headEnd/>
+              <a:tailEnd/>
+            </a:ln>
+            <a:extLst>
+              <a:ext uri="{909E8E84-426E-40DD-AFC4-6F175D3DCCD1}">
+                <a14:hiddenFill xmlns:a14="http://schemas.microsoft.com/office/drawing/2010/main">
+                  <a:solidFill>
+                    <a:srgbClr val="FFFFFF"/>
+                  </a:solidFill>
+                </a14:hiddenFill>
+              </a:ext>
+            </a:extLst>
+          </p:spPr>
+          <p:txBody>
+            <a:bodyPr wrap="square">
+              <a:spAutoFit/>
+            </a:bodyPr>
+            <a:lstStyle>
+              <a:lvl1pPr eaLnBrk="0" hangingPunct="0">
+                <a:defRPr sz="2400">
+                  <a:solidFill>
+                    <a:schemeClr val="tx1"/>
+                  </a:solidFill>
+                  <a:latin typeface="Calibri" charset="0"/>
+                  <a:ea typeface="ＭＳ Ｐゴシック" charset="-128"/>
+                </a:defRPr>
+              </a:lvl1pPr>
+              <a:lvl2pPr marL="742950" indent="-285750" eaLnBrk="0" hangingPunct="0">
+                <a:defRPr sz="2400">
+                  <a:solidFill>
+                    <a:schemeClr val="tx1"/>
+                  </a:solidFill>
+                  <a:latin typeface="Calibri" charset="0"/>
+                  <a:ea typeface="ＭＳ Ｐゴシック" charset="-128"/>
+                </a:defRPr>
+              </a:lvl2pPr>
+              <a:lvl3pPr marL="1143000" indent="-228600" eaLnBrk="0" hangingPunct="0">
+                <a:defRPr sz="2400">
+                  <a:solidFill>
+                    <a:schemeClr val="tx1"/>
+                  </a:solidFill>
+                  <a:latin typeface="Calibri" charset="0"/>
+                  <a:ea typeface="ＭＳ Ｐゴシック" charset="-128"/>
+                </a:defRPr>
+              </a:lvl3pPr>
+              <a:lvl4pPr marL="1600200" indent="-228600" eaLnBrk="0" hangingPunct="0">
+                <a:defRPr sz="2400">
+                  <a:solidFill>
+                    <a:schemeClr val="tx1"/>
+                  </a:solidFill>
+                  <a:latin typeface="Calibri" charset="0"/>
+                  <a:ea typeface="ＭＳ Ｐゴシック" charset="-128"/>
+                </a:defRPr>
+              </a:lvl4pPr>
+              <a:lvl5pPr marL="2057400" indent="-228600" eaLnBrk="0" hangingPunct="0">
+                <a:defRPr sz="2400">
+                  <a:solidFill>
+                    <a:schemeClr val="tx1"/>
+                  </a:solidFill>
+                  <a:latin typeface="Calibri" charset="0"/>
+                  <a:ea typeface="ＭＳ Ｐゴシック" charset="-128"/>
+                </a:defRPr>
+              </a:lvl5pPr>
+              <a:lvl6pPr marL="2514600" indent="-228600" defTabSz="457200" eaLnBrk="0" fontAlgn="base" hangingPunct="0">
+                <a:spcBef>
+                  <a:spcPct val="0"/>
+                </a:spcBef>
+                <a:spcAft>
+                  <a:spcPct val="0"/>
+                </a:spcAft>
+                <a:defRPr sz="2400">
+                  <a:solidFill>
+                    <a:schemeClr val="tx1"/>
+                  </a:solidFill>
+                  <a:latin typeface="Calibri" charset="0"/>
+                  <a:ea typeface="ＭＳ Ｐゴシック" charset="-128"/>
+                </a:defRPr>
+              </a:lvl6pPr>
+              <a:lvl7pPr marL="2971800" indent="-228600" defTabSz="457200" eaLnBrk="0" fontAlgn="base" hangingPunct="0">
+                <a:spcBef>
+                  <a:spcPct val="0"/>
+                </a:spcBef>
+                <a:spcAft>
+                  <a:spcPct val="0"/>
+                </a:spcAft>
+                <a:defRPr sz="2400">
+                  <a:solidFill>
+                    <a:schemeClr val="tx1"/>
+                  </a:solidFill>
+                  <a:latin typeface="Calibri" charset="0"/>
+                  <a:ea typeface="ＭＳ Ｐゴシック" charset="-128"/>
+                </a:defRPr>
+              </a:lvl7pPr>
+              <a:lvl8pPr marL="3429000" indent="-228600" defTabSz="457200" eaLnBrk="0" fontAlgn="base" hangingPunct="0">
+                <a:spcBef>
+                  <a:spcPct val="0"/>
+                </a:spcBef>
+                <a:spcAft>
+                  <a:spcPct val="0"/>
+                </a:spcAft>
+                <a:defRPr sz="2400">
+                  <a:solidFill>
+                    <a:schemeClr val="tx1"/>
+                  </a:solidFill>
+                  <a:latin typeface="Calibri" charset="0"/>
+                  <a:ea typeface="ＭＳ Ｐゴシック" charset="-128"/>
+                </a:defRPr>
+              </a:lvl8pPr>
+              <a:lvl9pPr marL="3886200" indent="-228600" defTabSz="457200" eaLnBrk="0" fontAlgn="base" hangingPunct="0">
+                <a:spcBef>
+                  <a:spcPct val="0"/>
+                </a:spcBef>
+                <a:spcAft>
+                  <a:spcPct val="0"/>
+                </a:spcAft>
+                <a:defRPr sz="2400">
+                  <a:solidFill>
+                    <a:schemeClr val="tx1"/>
+                  </a:solidFill>
+                  <a:latin typeface="Calibri" charset="0"/>
+                  <a:ea typeface="ＭＳ Ｐゴシック" charset="-128"/>
+                </a:defRPr>
+              </a:lvl9pPr>
+            </a:lstStyle>
+            <a:p>
+              <a:pPr eaLnBrk="1" hangingPunct="1"/>
+              <a:r>
+                <a:rPr lang="en-US" altLang="en-US" sz="2000" dirty="0"/>
+                <a:t>title : string</a:t>
+              </a:r>
+            </a:p>
+            <a:p>
+              <a:pPr eaLnBrk="1" hangingPunct="1"/>
+              <a:r>
+                <a:rPr lang="en-US" altLang="en-US" sz="2000" dirty="0"/>
+                <a:t>description : text</a:t>
+              </a:r>
+            </a:p>
+          </p:txBody>
+        </p:sp>
+      </p:grpSp>
+      <p:cxnSp>
+        <p:nvCxnSpPr>
+          <p:cNvPr id="4" name="Straight Connector 3">
+            <a:extLst>
+              <a:ext uri="{FF2B5EF4-FFF2-40B4-BE49-F238E27FC236}">
+                <a16:creationId xmlns:a16="http://schemas.microsoft.com/office/drawing/2014/main" id="{53F90975-DC21-1E4E-9983-1D92EE59CFCF}"/>
+              </a:ext>
+            </a:extLst>
+          </p:cNvPr>
+          <p:cNvCxnSpPr>
+            <a:stCxn id="7" idx="3"/>
+          </p:cNvCxnSpPr>
+          <p:nvPr/>
+        </p:nvCxnSpPr>
+        <p:spPr>
+          <a:xfrm>
+            <a:off x="4485133" y="3013502"/>
+            <a:ext cx="3221734" cy="0"/>
+          </a:xfrm>
+          <a:prstGeom prst="line">
+            <a:avLst/>
+          </a:prstGeom>
+          <a:ln w="38100">
+            <a:solidFill>
+              <a:schemeClr val="tx1"/>
+            </a:solidFill>
+          </a:ln>
+        </p:spPr>
+        <p:style>
+          <a:lnRef idx="1">
+            <a:schemeClr val="accent1"/>
+          </a:lnRef>
+          <a:fillRef idx="0">
+            <a:schemeClr val="accent1"/>
+          </a:fillRef>
+          <a:effectRef idx="0">
+            <a:schemeClr val="accent1"/>
+          </a:effectRef>
+          <a:fontRef idx="minor">
+            <a:schemeClr val="tx1"/>
+          </a:fontRef>
+        </p:style>
+      </p:cxnSp>
+      <p:sp>
+        <p:nvSpPr>
+          <p:cNvPr id="8" name="TextBox 7">
+            <a:extLst>
+              <a:ext uri="{FF2B5EF4-FFF2-40B4-BE49-F238E27FC236}">
+                <a16:creationId xmlns:a16="http://schemas.microsoft.com/office/drawing/2014/main" id="{B2DEAD67-0DA9-0547-B18D-D0C4F801F4C9}"/>
+              </a:ext>
+            </a:extLst>
+          </p:cNvPr>
+          <p:cNvSpPr txBox="1"/>
+          <p:nvPr/>
+        </p:nvSpPr>
+        <p:spPr>
+          <a:xfrm>
+            <a:off x="5824130" y="2590309"/>
+            <a:ext cx="822661" cy="400110"/>
+          </a:xfrm>
+          <a:prstGeom prst="rect">
+            <a:avLst/>
+          </a:prstGeom>
+          <a:noFill/>
+        </p:spPr>
+        <p:txBody>
+          <a:bodyPr wrap="none" rtlCol="0">
+            <a:spAutoFit/>
+          </a:bodyPr>
+          <a:lstStyle/>
+          <a:p>
+            <a:r>
+              <a:rPr lang="en-US" sz="2000" dirty="0"/>
+              <a:t>has ▶︎</a:t>
+            </a:r>
+          </a:p>
+        </p:txBody>
+      </p:sp>
+      <p:sp>
+        <p:nvSpPr>
+          <p:cNvPr id="9" name="TextBox 8">
+            <a:extLst>
+              <a:ext uri="{FF2B5EF4-FFF2-40B4-BE49-F238E27FC236}">
+                <a16:creationId xmlns:a16="http://schemas.microsoft.com/office/drawing/2014/main" id="{39A1805D-E63F-BC47-9A92-D5ADB1D18DA5}"/>
+              </a:ext>
+            </a:extLst>
+          </p:cNvPr>
+          <p:cNvSpPr txBox="1"/>
+          <p:nvPr/>
+        </p:nvSpPr>
+        <p:spPr>
+          <a:xfrm>
+            <a:off x="6608180" y="2688587"/>
+            <a:ext cx="1095493" cy="707886"/>
+          </a:xfrm>
+          <a:prstGeom prst="rect">
+            <a:avLst/>
+          </a:prstGeom>
+          <a:noFill/>
+        </p:spPr>
+        <p:txBody>
+          <a:bodyPr wrap="none" rtlCol="0">
+            <a:spAutoFit/>
+          </a:bodyPr>
+          <a:lstStyle/>
+          <a:p>
+            <a:pPr algn="r"/>
+            <a:r>
+              <a:rPr lang="en-US" sz="2000" dirty="0"/>
+              <a:t>*</a:t>
+            </a:r>
+          </a:p>
+          <a:p>
+            <a:pPr algn="r"/>
+            <a:r>
+              <a:rPr lang="en-US" sz="2000" dirty="0"/>
+              <a:t>question</a:t>
+            </a:r>
+          </a:p>
+        </p:txBody>
+      </p:sp>
+      <p:sp>
+        <p:nvSpPr>
+          <p:cNvPr id="12" name="TextBox 11">
+            <a:extLst>
+              <a:ext uri="{FF2B5EF4-FFF2-40B4-BE49-F238E27FC236}">
+                <a16:creationId xmlns:a16="http://schemas.microsoft.com/office/drawing/2014/main" id="{60BA148A-124B-5D45-B44B-7B8B12D3BB6C}"/>
+              </a:ext>
+            </a:extLst>
+          </p:cNvPr>
+          <p:cNvSpPr txBox="1"/>
+          <p:nvPr/>
+        </p:nvSpPr>
+        <p:spPr>
+          <a:xfrm>
+            <a:off x="4499709" y="2688587"/>
+            <a:ext cx="614271" cy="707886"/>
+          </a:xfrm>
+          <a:prstGeom prst="rect">
+            <a:avLst/>
+          </a:prstGeom>
+          <a:noFill/>
+        </p:spPr>
+        <p:txBody>
+          <a:bodyPr wrap="none" rtlCol="0">
+            <a:spAutoFit/>
+          </a:bodyPr>
+          <a:lstStyle/>
+          <a:p>
+            <a:r>
+              <a:rPr lang="en-US" sz="2000" dirty="0"/>
+              <a:t>1</a:t>
+            </a:r>
+          </a:p>
+          <a:p>
+            <a:r>
+              <a:rPr lang="en-US" sz="2000" dirty="0"/>
+              <a:t>quiz</a:t>
+            </a:r>
+          </a:p>
+        </p:txBody>
+      </p:sp>
+    </p:spTree>
+    <p:extLst>
+      <p:ext uri="{BB962C8B-B14F-4D97-AF65-F5344CB8AC3E}">
+        <p14:creationId xmlns:p14="http://schemas.microsoft.com/office/powerpoint/2010/main" val="3202759766"/>
       </p:ext>
     </p:extLst>
   </p:cSld>
@@ -3616,7 +4668,46 @@
       </a:bgFillStyleLst>
     </a:fmtScheme>
   </a:themeElements>
-  <a:objectDefaults/>
+  <a:objectDefaults>
+    <a:lnDef>
+      <a:spPr>
+        <a:ln w="38100">
+          <a:solidFill>
+            <a:schemeClr val="tx1"/>
+          </a:solidFill>
+        </a:ln>
+      </a:spPr>
+      <a:bodyPr/>
+      <a:lstStyle/>
+      <a:style>
+        <a:lnRef idx="1">
+          <a:schemeClr val="accent1"/>
+        </a:lnRef>
+        <a:fillRef idx="0">
+          <a:schemeClr val="accent1"/>
+        </a:fillRef>
+        <a:effectRef idx="0">
+          <a:schemeClr val="accent1"/>
+        </a:effectRef>
+        <a:fontRef idx="minor">
+          <a:schemeClr val="tx1"/>
+        </a:fontRef>
+      </a:style>
+    </a:lnDef>
+    <a:txDef>
+      <a:spPr>
+        <a:noFill/>
+      </a:spPr>
+      <a:bodyPr wrap="none" rtlCol="0">
+        <a:spAutoFit/>
+      </a:bodyPr>
+      <a:lstStyle>
+        <a:defPPr algn="l">
+          <a:defRPr sz="2000" dirty="0" smtClean="0"/>
+        </a:defPPr>
+      </a:lstStyle>
+    </a:txDef>
+  </a:objectDefaults>
   <a:extraClrSchemeLst/>
   <a:extLst>
     <a:ext uri="{05A4C25C-085E-4340-85A3-A5531E510DB2}">

</xml_diff>

<commit_message>
Added model class and wireframe diagrams for Demo 13
</commit_message>
<xml_diff>
--- a/docs/model-class-diagram.pptx
+++ b/docs/model-class-diagram.pptx
@@ -9,6 +9,8 @@
     <p:sldId id="256" r:id="rId3"/>
     <p:sldId id="259" r:id="rId4"/>
     <p:sldId id="257" r:id="rId5"/>
+    <p:sldId id="260" r:id="rId6"/>
+    <p:sldId id="261" r:id="rId7"/>
   </p:sldIdLst>
   <p:sldSz cx="12192000" cy="6858000"/>
   <p:notesSz cx="6858000" cy="9144000"/>
@@ -246,7 +248,7 @@
           <a:p>
             <a:fld id="{E739BB41-DB51-AC40-8BC3-82550C14AA6F}" type="datetimeFigureOut">
               <a:rPr lang="en-US" smtClean="0"/>
-              <a:t>10/15/18</a:t>
+              <a:t>10/30/18</a:t>
             </a:fld>
             <a:endParaRPr lang="en-US"/>
           </a:p>
@@ -416,7 +418,7 @@
           <a:p>
             <a:fld id="{E739BB41-DB51-AC40-8BC3-82550C14AA6F}" type="datetimeFigureOut">
               <a:rPr lang="en-US" smtClean="0"/>
-              <a:t>10/15/18</a:t>
+              <a:t>10/30/18</a:t>
             </a:fld>
             <a:endParaRPr lang="en-US"/>
           </a:p>
@@ -596,7 +598,7 @@
           <a:p>
             <a:fld id="{E739BB41-DB51-AC40-8BC3-82550C14AA6F}" type="datetimeFigureOut">
               <a:rPr lang="en-US" smtClean="0"/>
-              <a:t>10/15/18</a:t>
+              <a:t>10/30/18</a:t>
             </a:fld>
             <a:endParaRPr lang="en-US"/>
           </a:p>
@@ -766,7 +768,7 @@
           <a:p>
             <a:fld id="{E739BB41-DB51-AC40-8BC3-82550C14AA6F}" type="datetimeFigureOut">
               <a:rPr lang="en-US" smtClean="0"/>
-              <a:t>10/15/18</a:t>
+              <a:t>10/30/18</a:t>
             </a:fld>
             <a:endParaRPr lang="en-US"/>
           </a:p>
@@ -1012,7 +1014,7 @@
           <a:p>
             <a:fld id="{E739BB41-DB51-AC40-8BC3-82550C14AA6F}" type="datetimeFigureOut">
               <a:rPr lang="en-US" smtClean="0"/>
-              <a:t>10/15/18</a:t>
+              <a:t>10/30/18</a:t>
             </a:fld>
             <a:endParaRPr lang="en-US"/>
           </a:p>
@@ -1244,7 +1246,7 @@
           <a:p>
             <a:fld id="{E739BB41-DB51-AC40-8BC3-82550C14AA6F}" type="datetimeFigureOut">
               <a:rPr lang="en-US" smtClean="0"/>
-              <a:t>10/15/18</a:t>
+              <a:t>10/30/18</a:t>
             </a:fld>
             <a:endParaRPr lang="en-US"/>
           </a:p>
@@ -1611,7 +1613,7 @@
           <a:p>
             <a:fld id="{E739BB41-DB51-AC40-8BC3-82550C14AA6F}" type="datetimeFigureOut">
               <a:rPr lang="en-US" smtClean="0"/>
-              <a:t>10/15/18</a:t>
+              <a:t>10/30/18</a:t>
             </a:fld>
             <a:endParaRPr lang="en-US"/>
           </a:p>
@@ -1729,7 +1731,7 @@
           <a:p>
             <a:fld id="{E739BB41-DB51-AC40-8BC3-82550C14AA6F}" type="datetimeFigureOut">
               <a:rPr lang="en-US" smtClean="0"/>
-              <a:t>10/15/18</a:t>
+              <a:t>10/30/18</a:t>
             </a:fld>
             <a:endParaRPr lang="en-US"/>
           </a:p>
@@ -1824,7 +1826,7 @@
           <a:p>
             <a:fld id="{E739BB41-DB51-AC40-8BC3-82550C14AA6F}" type="datetimeFigureOut">
               <a:rPr lang="en-US" smtClean="0"/>
-              <a:t>10/15/18</a:t>
+              <a:t>10/30/18</a:t>
             </a:fld>
             <a:endParaRPr lang="en-US"/>
           </a:p>
@@ -2101,7 +2103,7 @@
           <a:p>
             <a:fld id="{E739BB41-DB51-AC40-8BC3-82550C14AA6F}" type="datetimeFigureOut">
               <a:rPr lang="en-US" smtClean="0"/>
-              <a:t>10/15/18</a:t>
+              <a:t>10/30/18</a:t>
             </a:fld>
             <a:endParaRPr lang="en-US"/>
           </a:p>
@@ -2358,7 +2360,7 @@
           <a:p>
             <a:fld id="{E739BB41-DB51-AC40-8BC3-82550C14AA6F}" type="datetimeFigureOut">
               <a:rPr lang="en-US" smtClean="0"/>
-              <a:t>10/15/18</a:t>
+              <a:t>10/30/18</a:t>
             </a:fld>
             <a:endParaRPr lang="en-US"/>
           </a:p>
@@ -2571,7 +2573,7 @@
           <a:p>
             <a:fld id="{E739BB41-DB51-AC40-8BC3-82550C14AA6F}" type="datetimeFigureOut">
               <a:rPr lang="en-US" smtClean="0"/>
-              <a:t>10/15/18</a:t>
+              <a:t>10/30/18</a:t>
             </a:fld>
             <a:endParaRPr lang="en-US"/>
           </a:p>
@@ -3005,7 +3007,7 @@
             <a:pPr algn="ctr"/>
             <a:r>
               <a:rPr lang="en-US" dirty="0"/>
-              <a:t>demo-07-mvc-model</a:t>
+              <a:t>model-class-diagram-demo-07-mvc-model</a:t>
             </a:r>
           </a:p>
         </p:txBody>
@@ -3467,8 +3469,8 @@
         </p:nvSpPr>
         <p:spPr>
           <a:xfrm>
-            <a:off x="838200" y="2766219"/>
-            <a:ext cx="10515600" cy="1325563"/>
+            <a:off x="0" y="2766219"/>
+            <a:ext cx="12192000" cy="1325563"/>
           </a:xfrm>
         </p:spPr>
         <p:txBody>
@@ -3478,7 +3480,7 @@
             <a:pPr algn="ctr"/>
             <a:r>
               <a:rPr lang="en-US" dirty="0"/>
-              <a:t>demo-12-has-many-assoc</a:t>
+              <a:t>model-class-diagram-demo-12-has-many-assoc</a:t>
             </a:r>
           </a:p>
         </p:txBody>
@@ -4408,6 +4410,1506 @@
     <p:extLst>
       <p:ext uri="{BB962C8B-B14F-4D97-AF65-F5344CB8AC3E}">
         <p14:creationId xmlns:p14="http://schemas.microsoft.com/office/powerpoint/2010/main" val="3202759766"/>
+      </p:ext>
+    </p:extLst>
+  </p:cSld>
+  <p:clrMapOvr>
+    <a:masterClrMapping/>
+  </p:clrMapOvr>
+</p:sld>
+</file>
+
+<file path=ppt/slides/slide5.xml><?xml version="1.0" encoding="utf-8"?>
+<p:sld xmlns:a="http://schemas.openxmlformats.org/drawingml/2006/main" xmlns:r="http://schemas.openxmlformats.org/officeDocument/2006/relationships" xmlns:p="http://schemas.openxmlformats.org/presentationml/2006/main">
+  <p:cSld>
+    <p:spTree>
+      <p:nvGrpSpPr>
+        <p:cNvPr id="1" name=""/>
+        <p:cNvGrpSpPr/>
+        <p:nvPr/>
+      </p:nvGrpSpPr>
+      <p:grpSpPr>
+        <a:xfrm>
+          <a:off x="0" y="0"/>
+          <a:ext cx="0" cy="0"/>
+          <a:chOff x="0" y="0"/>
+          <a:chExt cx="0" cy="0"/>
+        </a:xfrm>
+      </p:grpSpPr>
+      <p:sp>
+        <p:nvSpPr>
+          <p:cNvPr id="2" name="Title 1">
+            <a:extLst>
+              <a:ext uri="{FF2B5EF4-FFF2-40B4-BE49-F238E27FC236}">
+                <a16:creationId xmlns:a16="http://schemas.microsoft.com/office/drawing/2014/main" id="{400BC608-ED53-9E46-95E6-23B44E45324D}"/>
+              </a:ext>
+            </a:extLst>
+          </p:cNvPr>
+          <p:cNvSpPr>
+            <a:spLocks noGrp="1"/>
+          </p:cNvSpPr>
+          <p:nvPr>
+            <p:ph type="title"/>
+          </p:nvPr>
+        </p:nvSpPr>
+        <p:spPr>
+          <a:xfrm>
+            <a:off x="838200" y="2766219"/>
+            <a:ext cx="10515600" cy="1325563"/>
+          </a:xfrm>
+        </p:spPr>
+        <p:txBody>
+          <a:bodyPr/>
+          <a:lstStyle/>
+          <a:p>
+            <a:pPr algn="ctr"/>
+            <a:r>
+              <a:rPr lang="en-US" dirty="0"/>
+              <a:t>model-class-diagram-demo-13-auth</a:t>
+            </a:r>
+          </a:p>
+        </p:txBody>
+      </p:sp>
+    </p:spTree>
+    <p:extLst>
+      <p:ext uri="{BB962C8B-B14F-4D97-AF65-F5344CB8AC3E}">
+        <p14:creationId xmlns:p14="http://schemas.microsoft.com/office/powerpoint/2010/main" val="353226350"/>
+      </p:ext>
+    </p:extLst>
+  </p:cSld>
+  <p:clrMapOvr>
+    <a:masterClrMapping/>
+  </p:clrMapOvr>
+</p:sld>
+</file>
+
+<file path=ppt/slides/slide6.xml><?xml version="1.0" encoding="utf-8"?>
+<p:sld xmlns:a="http://schemas.openxmlformats.org/drawingml/2006/main" xmlns:r="http://schemas.openxmlformats.org/officeDocument/2006/relationships" xmlns:p="http://schemas.openxmlformats.org/presentationml/2006/main">
+  <p:cSld>
+    <p:spTree>
+      <p:nvGrpSpPr>
+        <p:cNvPr id="1" name=""/>
+        <p:cNvGrpSpPr/>
+        <p:nvPr/>
+      </p:nvGrpSpPr>
+      <p:grpSpPr>
+        <a:xfrm>
+          <a:off x="0" y="0"/>
+          <a:ext cx="0" cy="0"/>
+          <a:chOff x="0" y="0"/>
+          <a:chExt cx="0" cy="0"/>
+        </a:xfrm>
+      </p:grpSpPr>
+      <p:grpSp>
+        <p:nvGrpSpPr>
+          <p:cNvPr id="2" name="Group 1">
+            <a:extLst>
+              <a:ext uri="{FF2B5EF4-FFF2-40B4-BE49-F238E27FC236}">
+                <a16:creationId xmlns:a16="http://schemas.microsoft.com/office/drawing/2014/main" id="{28D0630C-FB17-0E4C-A756-3B437772780F}"/>
+              </a:ext>
+            </a:extLst>
+          </p:cNvPr>
+          <p:cNvGrpSpPr/>
+          <p:nvPr/>
+        </p:nvGrpSpPr>
+        <p:grpSpPr>
+          <a:xfrm>
+            <a:off x="9215481" y="2259449"/>
+            <a:ext cx="2872287" cy="2339102"/>
+            <a:chOff x="3897790" y="1311900"/>
+            <a:chExt cx="3458441" cy="2339102"/>
+          </a:xfrm>
+        </p:grpSpPr>
+        <p:sp>
+          <p:nvSpPr>
+            <p:cNvPr id="50" name="TextBox 29">
+              <a:extLst>
+                <a:ext uri="{FF2B5EF4-FFF2-40B4-BE49-F238E27FC236}">
+                  <a16:creationId xmlns:a16="http://schemas.microsoft.com/office/drawing/2014/main" id="{EC5D1D39-01C2-544F-83B5-7EB087837FAC}"/>
+                </a:ext>
+              </a:extLst>
+            </p:cNvPr>
+            <p:cNvSpPr txBox="1">
+              <a:spLocks noChangeArrowheads="1"/>
+            </p:cNvSpPr>
+            <p:nvPr/>
+          </p:nvSpPr>
+          <p:spPr bwMode="auto">
+            <a:xfrm>
+              <a:off x="3897790" y="1311900"/>
+              <a:ext cx="3458441" cy="400110"/>
+            </a:xfrm>
+            <a:prstGeom prst="rect">
+              <a:avLst/>
+            </a:prstGeom>
+            <a:noFill/>
+            <a:ln w="38100">
+              <a:solidFill>
+                <a:schemeClr val="tx1"/>
+              </a:solidFill>
+              <a:miter lim="800000"/>
+              <a:headEnd/>
+              <a:tailEnd/>
+            </a:ln>
+            <a:extLst>
+              <a:ext uri="{909E8E84-426E-40DD-AFC4-6F175D3DCCD1}">
+                <a14:hiddenFill xmlns:a14="http://schemas.microsoft.com/office/drawing/2010/main">
+                  <a:solidFill>
+                    <a:srgbClr val="FFFFFF"/>
+                  </a:solidFill>
+                </a14:hiddenFill>
+              </a:ext>
+            </a:extLst>
+          </p:spPr>
+          <p:txBody>
+            <a:bodyPr wrap="square">
+              <a:spAutoFit/>
+            </a:bodyPr>
+            <a:lstStyle>
+              <a:lvl1pPr eaLnBrk="0" hangingPunct="0">
+                <a:defRPr sz="2400">
+                  <a:solidFill>
+                    <a:schemeClr val="tx1"/>
+                  </a:solidFill>
+                  <a:latin typeface="Calibri" charset="0"/>
+                  <a:ea typeface="ＭＳ Ｐゴシック" charset="-128"/>
+                </a:defRPr>
+              </a:lvl1pPr>
+              <a:lvl2pPr marL="742950" indent="-285750" eaLnBrk="0" hangingPunct="0">
+                <a:defRPr sz="2400">
+                  <a:solidFill>
+                    <a:schemeClr val="tx1"/>
+                  </a:solidFill>
+                  <a:latin typeface="Calibri" charset="0"/>
+                  <a:ea typeface="ＭＳ Ｐゴシック" charset="-128"/>
+                </a:defRPr>
+              </a:lvl2pPr>
+              <a:lvl3pPr marL="1143000" indent="-228600" eaLnBrk="0" hangingPunct="0">
+                <a:defRPr sz="2400">
+                  <a:solidFill>
+                    <a:schemeClr val="tx1"/>
+                  </a:solidFill>
+                  <a:latin typeface="Calibri" charset="0"/>
+                  <a:ea typeface="ＭＳ Ｐゴシック" charset="-128"/>
+                </a:defRPr>
+              </a:lvl3pPr>
+              <a:lvl4pPr marL="1600200" indent="-228600" eaLnBrk="0" hangingPunct="0">
+                <a:defRPr sz="2400">
+                  <a:solidFill>
+                    <a:schemeClr val="tx1"/>
+                  </a:solidFill>
+                  <a:latin typeface="Calibri" charset="0"/>
+                  <a:ea typeface="ＭＳ Ｐゴシック" charset="-128"/>
+                </a:defRPr>
+              </a:lvl4pPr>
+              <a:lvl5pPr marL="2057400" indent="-228600" eaLnBrk="0" hangingPunct="0">
+                <a:defRPr sz="2400">
+                  <a:solidFill>
+                    <a:schemeClr val="tx1"/>
+                  </a:solidFill>
+                  <a:latin typeface="Calibri" charset="0"/>
+                  <a:ea typeface="ＭＳ Ｐゴシック" charset="-128"/>
+                </a:defRPr>
+              </a:lvl5pPr>
+              <a:lvl6pPr marL="2514600" indent="-228600" defTabSz="457200" eaLnBrk="0" fontAlgn="base" hangingPunct="0">
+                <a:spcBef>
+                  <a:spcPct val="0"/>
+                </a:spcBef>
+                <a:spcAft>
+                  <a:spcPct val="0"/>
+                </a:spcAft>
+                <a:defRPr sz="2400">
+                  <a:solidFill>
+                    <a:schemeClr val="tx1"/>
+                  </a:solidFill>
+                  <a:latin typeface="Calibri" charset="0"/>
+                  <a:ea typeface="ＭＳ Ｐゴシック" charset="-128"/>
+                </a:defRPr>
+              </a:lvl6pPr>
+              <a:lvl7pPr marL="2971800" indent="-228600" defTabSz="457200" eaLnBrk="0" fontAlgn="base" hangingPunct="0">
+                <a:spcBef>
+                  <a:spcPct val="0"/>
+                </a:spcBef>
+                <a:spcAft>
+                  <a:spcPct val="0"/>
+                </a:spcAft>
+                <a:defRPr sz="2400">
+                  <a:solidFill>
+                    <a:schemeClr val="tx1"/>
+                  </a:solidFill>
+                  <a:latin typeface="Calibri" charset="0"/>
+                  <a:ea typeface="ＭＳ Ｐゴシック" charset="-128"/>
+                </a:defRPr>
+              </a:lvl7pPr>
+              <a:lvl8pPr marL="3429000" indent="-228600" defTabSz="457200" eaLnBrk="0" fontAlgn="base" hangingPunct="0">
+                <a:spcBef>
+                  <a:spcPct val="0"/>
+                </a:spcBef>
+                <a:spcAft>
+                  <a:spcPct val="0"/>
+                </a:spcAft>
+                <a:defRPr sz="2400">
+                  <a:solidFill>
+                    <a:schemeClr val="tx1"/>
+                  </a:solidFill>
+                  <a:latin typeface="Calibri" charset="0"/>
+                  <a:ea typeface="ＭＳ Ｐゴシック" charset="-128"/>
+                </a:defRPr>
+              </a:lvl8pPr>
+              <a:lvl9pPr marL="3886200" indent="-228600" defTabSz="457200" eaLnBrk="0" fontAlgn="base" hangingPunct="0">
+                <a:spcBef>
+                  <a:spcPct val="0"/>
+                </a:spcBef>
+                <a:spcAft>
+                  <a:spcPct val="0"/>
+                </a:spcAft>
+                <a:defRPr sz="2400">
+                  <a:solidFill>
+                    <a:schemeClr val="tx1"/>
+                  </a:solidFill>
+                  <a:latin typeface="Calibri" charset="0"/>
+                  <a:ea typeface="ＭＳ Ｐゴシック" charset="-128"/>
+                </a:defRPr>
+              </a:lvl9pPr>
+            </a:lstStyle>
+            <a:p>
+              <a:pPr eaLnBrk="1" hangingPunct="1"/>
+              <a:r>
+                <a:rPr lang="en-US" altLang="en-US" sz="2000"/>
+                <a:t>MultipleChoiceQuestion</a:t>
+              </a:r>
+              <a:endParaRPr lang="en-US" altLang="en-US" sz="2000" dirty="0"/>
+            </a:p>
+          </p:txBody>
+        </p:sp>
+        <p:sp>
+          <p:nvSpPr>
+            <p:cNvPr id="51" name="TextBox 29">
+              <a:extLst>
+                <a:ext uri="{FF2B5EF4-FFF2-40B4-BE49-F238E27FC236}">
+                  <a16:creationId xmlns:a16="http://schemas.microsoft.com/office/drawing/2014/main" id="{9A3DB986-71F4-D74D-90AB-0008C6895020}"/>
+                </a:ext>
+              </a:extLst>
+            </p:cNvPr>
+            <p:cNvSpPr txBox="1">
+              <a:spLocks noChangeArrowheads="1"/>
+            </p:cNvSpPr>
+            <p:nvPr/>
+          </p:nvSpPr>
+          <p:spPr bwMode="auto">
+            <a:xfrm>
+              <a:off x="3897790" y="1712010"/>
+              <a:ext cx="3458441" cy="1938992"/>
+            </a:xfrm>
+            <a:prstGeom prst="rect">
+              <a:avLst/>
+            </a:prstGeom>
+            <a:noFill/>
+            <a:ln w="38100">
+              <a:solidFill>
+                <a:schemeClr val="tx1"/>
+              </a:solidFill>
+              <a:miter lim="800000"/>
+              <a:headEnd/>
+              <a:tailEnd/>
+            </a:ln>
+            <a:extLst>
+              <a:ext uri="{909E8E84-426E-40DD-AFC4-6F175D3DCCD1}">
+                <a14:hiddenFill xmlns:a14="http://schemas.microsoft.com/office/drawing/2010/main">
+                  <a:solidFill>
+                    <a:srgbClr val="FFFFFF"/>
+                  </a:solidFill>
+                </a14:hiddenFill>
+              </a:ext>
+            </a:extLst>
+          </p:spPr>
+          <p:txBody>
+            <a:bodyPr wrap="square">
+              <a:spAutoFit/>
+            </a:bodyPr>
+            <a:lstStyle>
+              <a:lvl1pPr eaLnBrk="0" hangingPunct="0">
+                <a:defRPr sz="2400">
+                  <a:solidFill>
+                    <a:schemeClr val="tx1"/>
+                  </a:solidFill>
+                  <a:latin typeface="Calibri" charset="0"/>
+                  <a:ea typeface="ＭＳ Ｐゴシック" charset="-128"/>
+                </a:defRPr>
+              </a:lvl1pPr>
+              <a:lvl2pPr marL="742950" indent="-285750" eaLnBrk="0" hangingPunct="0">
+                <a:defRPr sz="2400">
+                  <a:solidFill>
+                    <a:schemeClr val="tx1"/>
+                  </a:solidFill>
+                  <a:latin typeface="Calibri" charset="0"/>
+                  <a:ea typeface="ＭＳ Ｐゴシック" charset="-128"/>
+                </a:defRPr>
+              </a:lvl2pPr>
+              <a:lvl3pPr marL="1143000" indent="-228600" eaLnBrk="0" hangingPunct="0">
+                <a:defRPr sz="2400">
+                  <a:solidFill>
+                    <a:schemeClr val="tx1"/>
+                  </a:solidFill>
+                  <a:latin typeface="Calibri" charset="0"/>
+                  <a:ea typeface="ＭＳ Ｐゴシック" charset="-128"/>
+                </a:defRPr>
+              </a:lvl3pPr>
+              <a:lvl4pPr marL="1600200" indent="-228600" eaLnBrk="0" hangingPunct="0">
+                <a:defRPr sz="2400">
+                  <a:solidFill>
+                    <a:schemeClr val="tx1"/>
+                  </a:solidFill>
+                  <a:latin typeface="Calibri" charset="0"/>
+                  <a:ea typeface="ＭＳ Ｐゴシック" charset="-128"/>
+                </a:defRPr>
+              </a:lvl4pPr>
+              <a:lvl5pPr marL="2057400" indent="-228600" eaLnBrk="0" hangingPunct="0">
+                <a:defRPr sz="2400">
+                  <a:solidFill>
+                    <a:schemeClr val="tx1"/>
+                  </a:solidFill>
+                  <a:latin typeface="Calibri" charset="0"/>
+                  <a:ea typeface="ＭＳ Ｐゴシック" charset="-128"/>
+                </a:defRPr>
+              </a:lvl5pPr>
+              <a:lvl6pPr marL="2514600" indent="-228600" defTabSz="457200" eaLnBrk="0" fontAlgn="base" hangingPunct="0">
+                <a:spcBef>
+                  <a:spcPct val="0"/>
+                </a:spcBef>
+                <a:spcAft>
+                  <a:spcPct val="0"/>
+                </a:spcAft>
+                <a:defRPr sz="2400">
+                  <a:solidFill>
+                    <a:schemeClr val="tx1"/>
+                  </a:solidFill>
+                  <a:latin typeface="Calibri" charset="0"/>
+                  <a:ea typeface="ＭＳ Ｐゴシック" charset="-128"/>
+                </a:defRPr>
+              </a:lvl6pPr>
+              <a:lvl7pPr marL="2971800" indent="-228600" defTabSz="457200" eaLnBrk="0" fontAlgn="base" hangingPunct="0">
+                <a:spcBef>
+                  <a:spcPct val="0"/>
+                </a:spcBef>
+                <a:spcAft>
+                  <a:spcPct val="0"/>
+                </a:spcAft>
+                <a:defRPr sz="2400">
+                  <a:solidFill>
+                    <a:schemeClr val="tx1"/>
+                  </a:solidFill>
+                  <a:latin typeface="Calibri" charset="0"/>
+                  <a:ea typeface="ＭＳ Ｐゴシック" charset="-128"/>
+                </a:defRPr>
+              </a:lvl7pPr>
+              <a:lvl8pPr marL="3429000" indent="-228600" defTabSz="457200" eaLnBrk="0" fontAlgn="base" hangingPunct="0">
+                <a:spcBef>
+                  <a:spcPct val="0"/>
+                </a:spcBef>
+                <a:spcAft>
+                  <a:spcPct val="0"/>
+                </a:spcAft>
+                <a:defRPr sz="2400">
+                  <a:solidFill>
+                    <a:schemeClr val="tx1"/>
+                  </a:solidFill>
+                  <a:latin typeface="Calibri" charset="0"/>
+                  <a:ea typeface="ＭＳ Ｐゴシック" charset="-128"/>
+                </a:defRPr>
+              </a:lvl8pPr>
+              <a:lvl9pPr marL="3886200" indent="-228600" defTabSz="457200" eaLnBrk="0" fontAlgn="base" hangingPunct="0">
+                <a:spcBef>
+                  <a:spcPct val="0"/>
+                </a:spcBef>
+                <a:spcAft>
+                  <a:spcPct val="0"/>
+                </a:spcAft>
+                <a:defRPr sz="2400">
+                  <a:solidFill>
+                    <a:schemeClr val="tx1"/>
+                  </a:solidFill>
+                  <a:latin typeface="Calibri" charset="0"/>
+                  <a:ea typeface="ＭＳ Ｐゴシック" charset="-128"/>
+                </a:defRPr>
+              </a:lvl9pPr>
+            </a:lstStyle>
+            <a:p>
+              <a:pPr eaLnBrk="1" hangingPunct="1"/>
+              <a:r>
+                <a:rPr lang="en-US" altLang="en-US" sz="2000" dirty="0"/>
+                <a:t>question : string</a:t>
+              </a:r>
+            </a:p>
+            <a:p>
+              <a:pPr eaLnBrk="1" hangingPunct="1"/>
+              <a:r>
+                <a:rPr lang="en-US" altLang="en-US" sz="2000" dirty="0"/>
+                <a:t>answer : string</a:t>
+              </a:r>
+            </a:p>
+            <a:p>
+              <a:pPr eaLnBrk="1" hangingPunct="1"/>
+              <a:r>
+                <a:rPr lang="en-US" altLang="en-US" sz="2000" dirty="0"/>
+                <a:t>distractor_1 : string</a:t>
+              </a:r>
+            </a:p>
+            <a:p>
+              <a:pPr eaLnBrk="1" hangingPunct="1"/>
+              <a:r>
+                <a:rPr lang="en-US" altLang="en-US" sz="2000" dirty="0"/>
+                <a:t>distractor_2 : string</a:t>
+              </a:r>
+            </a:p>
+            <a:p>
+              <a:pPr eaLnBrk="1" hangingPunct="1"/>
+              <a:r>
+                <a:rPr lang="en-US" altLang="en-US" sz="2000" dirty="0"/>
+                <a:t>distractor_3 : string</a:t>
+              </a:r>
+            </a:p>
+            <a:p>
+              <a:pPr eaLnBrk="1" hangingPunct="1"/>
+              <a:r>
+                <a:rPr lang="en-US" altLang="en-US" sz="2000" dirty="0"/>
+                <a:t>distractor_4 : string</a:t>
+              </a:r>
+            </a:p>
+          </p:txBody>
+        </p:sp>
+      </p:grpSp>
+      <p:grpSp>
+        <p:nvGrpSpPr>
+          <p:cNvPr id="5" name="Group 4">
+            <a:extLst>
+              <a:ext uri="{FF2B5EF4-FFF2-40B4-BE49-F238E27FC236}">
+                <a16:creationId xmlns:a16="http://schemas.microsoft.com/office/drawing/2014/main" id="{17553D60-DE0D-0C45-BECD-732F87913EF7}"/>
+              </a:ext>
+            </a:extLst>
+          </p:cNvPr>
+          <p:cNvGrpSpPr/>
+          <p:nvPr/>
+        </p:nvGrpSpPr>
+        <p:grpSpPr>
+          <a:xfrm>
+            <a:off x="4664356" y="2259449"/>
+            <a:ext cx="1947219" cy="1107996"/>
+            <a:chOff x="3897790" y="1311900"/>
+            <a:chExt cx="3458441" cy="1107996"/>
+          </a:xfrm>
+        </p:grpSpPr>
+        <p:sp>
+          <p:nvSpPr>
+            <p:cNvPr id="6" name="TextBox 29">
+              <a:extLst>
+                <a:ext uri="{FF2B5EF4-FFF2-40B4-BE49-F238E27FC236}">
+                  <a16:creationId xmlns:a16="http://schemas.microsoft.com/office/drawing/2014/main" id="{F486DF5F-BEE6-6045-AC63-7E6477A3415B}"/>
+                </a:ext>
+              </a:extLst>
+            </p:cNvPr>
+            <p:cNvSpPr txBox="1">
+              <a:spLocks noChangeArrowheads="1"/>
+            </p:cNvSpPr>
+            <p:nvPr/>
+          </p:nvSpPr>
+          <p:spPr bwMode="auto">
+            <a:xfrm>
+              <a:off x="3897790" y="1311900"/>
+              <a:ext cx="3458441" cy="400110"/>
+            </a:xfrm>
+            <a:prstGeom prst="rect">
+              <a:avLst/>
+            </a:prstGeom>
+            <a:noFill/>
+            <a:ln w="38100">
+              <a:solidFill>
+                <a:schemeClr val="tx1"/>
+              </a:solidFill>
+              <a:miter lim="800000"/>
+              <a:headEnd/>
+              <a:tailEnd/>
+            </a:ln>
+            <a:extLst>
+              <a:ext uri="{909E8E84-426E-40DD-AFC4-6F175D3DCCD1}">
+                <a14:hiddenFill xmlns:a14="http://schemas.microsoft.com/office/drawing/2010/main">
+                  <a:solidFill>
+                    <a:srgbClr val="FFFFFF"/>
+                  </a:solidFill>
+                </a14:hiddenFill>
+              </a:ext>
+            </a:extLst>
+          </p:spPr>
+          <p:txBody>
+            <a:bodyPr wrap="square">
+              <a:spAutoFit/>
+            </a:bodyPr>
+            <a:lstStyle>
+              <a:lvl1pPr eaLnBrk="0" hangingPunct="0">
+                <a:defRPr sz="2400">
+                  <a:solidFill>
+                    <a:schemeClr val="tx1"/>
+                  </a:solidFill>
+                  <a:latin typeface="Calibri" charset="0"/>
+                  <a:ea typeface="ＭＳ Ｐゴシック" charset="-128"/>
+                </a:defRPr>
+              </a:lvl1pPr>
+              <a:lvl2pPr marL="742950" indent="-285750" eaLnBrk="0" hangingPunct="0">
+                <a:defRPr sz="2400">
+                  <a:solidFill>
+                    <a:schemeClr val="tx1"/>
+                  </a:solidFill>
+                  <a:latin typeface="Calibri" charset="0"/>
+                  <a:ea typeface="ＭＳ Ｐゴシック" charset="-128"/>
+                </a:defRPr>
+              </a:lvl2pPr>
+              <a:lvl3pPr marL="1143000" indent="-228600" eaLnBrk="0" hangingPunct="0">
+                <a:defRPr sz="2400">
+                  <a:solidFill>
+                    <a:schemeClr val="tx1"/>
+                  </a:solidFill>
+                  <a:latin typeface="Calibri" charset="0"/>
+                  <a:ea typeface="ＭＳ Ｐゴシック" charset="-128"/>
+                </a:defRPr>
+              </a:lvl3pPr>
+              <a:lvl4pPr marL="1600200" indent="-228600" eaLnBrk="0" hangingPunct="0">
+                <a:defRPr sz="2400">
+                  <a:solidFill>
+                    <a:schemeClr val="tx1"/>
+                  </a:solidFill>
+                  <a:latin typeface="Calibri" charset="0"/>
+                  <a:ea typeface="ＭＳ Ｐゴシック" charset="-128"/>
+                </a:defRPr>
+              </a:lvl4pPr>
+              <a:lvl5pPr marL="2057400" indent="-228600" eaLnBrk="0" hangingPunct="0">
+                <a:defRPr sz="2400">
+                  <a:solidFill>
+                    <a:schemeClr val="tx1"/>
+                  </a:solidFill>
+                  <a:latin typeface="Calibri" charset="0"/>
+                  <a:ea typeface="ＭＳ Ｐゴシック" charset="-128"/>
+                </a:defRPr>
+              </a:lvl5pPr>
+              <a:lvl6pPr marL="2514600" indent="-228600" defTabSz="457200" eaLnBrk="0" fontAlgn="base" hangingPunct="0">
+                <a:spcBef>
+                  <a:spcPct val="0"/>
+                </a:spcBef>
+                <a:spcAft>
+                  <a:spcPct val="0"/>
+                </a:spcAft>
+                <a:defRPr sz="2400">
+                  <a:solidFill>
+                    <a:schemeClr val="tx1"/>
+                  </a:solidFill>
+                  <a:latin typeface="Calibri" charset="0"/>
+                  <a:ea typeface="ＭＳ Ｐゴシック" charset="-128"/>
+                </a:defRPr>
+              </a:lvl6pPr>
+              <a:lvl7pPr marL="2971800" indent="-228600" defTabSz="457200" eaLnBrk="0" fontAlgn="base" hangingPunct="0">
+                <a:spcBef>
+                  <a:spcPct val="0"/>
+                </a:spcBef>
+                <a:spcAft>
+                  <a:spcPct val="0"/>
+                </a:spcAft>
+                <a:defRPr sz="2400">
+                  <a:solidFill>
+                    <a:schemeClr val="tx1"/>
+                  </a:solidFill>
+                  <a:latin typeface="Calibri" charset="0"/>
+                  <a:ea typeface="ＭＳ Ｐゴシック" charset="-128"/>
+                </a:defRPr>
+              </a:lvl7pPr>
+              <a:lvl8pPr marL="3429000" indent="-228600" defTabSz="457200" eaLnBrk="0" fontAlgn="base" hangingPunct="0">
+                <a:spcBef>
+                  <a:spcPct val="0"/>
+                </a:spcBef>
+                <a:spcAft>
+                  <a:spcPct val="0"/>
+                </a:spcAft>
+                <a:defRPr sz="2400">
+                  <a:solidFill>
+                    <a:schemeClr val="tx1"/>
+                  </a:solidFill>
+                  <a:latin typeface="Calibri" charset="0"/>
+                  <a:ea typeface="ＭＳ Ｐゴシック" charset="-128"/>
+                </a:defRPr>
+              </a:lvl8pPr>
+              <a:lvl9pPr marL="3886200" indent="-228600" defTabSz="457200" eaLnBrk="0" fontAlgn="base" hangingPunct="0">
+                <a:spcBef>
+                  <a:spcPct val="0"/>
+                </a:spcBef>
+                <a:spcAft>
+                  <a:spcPct val="0"/>
+                </a:spcAft>
+                <a:defRPr sz="2400">
+                  <a:solidFill>
+                    <a:schemeClr val="tx1"/>
+                  </a:solidFill>
+                  <a:latin typeface="Calibri" charset="0"/>
+                  <a:ea typeface="ＭＳ Ｐゴシック" charset="-128"/>
+                </a:defRPr>
+              </a:lvl9pPr>
+            </a:lstStyle>
+            <a:p>
+              <a:pPr eaLnBrk="1" hangingPunct="1"/>
+              <a:r>
+                <a:rPr lang="en-US" altLang="en-US" sz="2000" dirty="0"/>
+                <a:t>Quiz</a:t>
+              </a:r>
+            </a:p>
+          </p:txBody>
+        </p:sp>
+        <p:sp>
+          <p:nvSpPr>
+            <p:cNvPr id="7" name="TextBox 29">
+              <a:extLst>
+                <a:ext uri="{FF2B5EF4-FFF2-40B4-BE49-F238E27FC236}">
+                  <a16:creationId xmlns:a16="http://schemas.microsoft.com/office/drawing/2014/main" id="{7F9CCB82-B13A-9743-8F66-FF620E65F5C5}"/>
+                </a:ext>
+              </a:extLst>
+            </p:cNvPr>
+            <p:cNvSpPr txBox="1">
+              <a:spLocks noChangeArrowheads="1"/>
+            </p:cNvSpPr>
+            <p:nvPr/>
+          </p:nvSpPr>
+          <p:spPr bwMode="auto">
+            <a:xfrm>
+              <a:off x="3897790" y="1712010"/>
+              <a:ext cx="3458441" cy="707886"/>
+            </a:xfrm>
+            <a:prstGeom prst="rect">
+              <a:avLst/>
+            </a:prstGeom>
+            <a:noFill/>
+            <a:ln w="38100">
+              <a:solidFill>
+                <a:schemeClr val="tx1"/>
+              </a:solidFill>
+              <a:miter lim="800000"/>
+              <a:headEnd/>
+              <a:tailEnd/>
+            </a:ln>
+            <a:extLst>
+              <a:ext uri="{909E8E84-426E-40DD-AFC4-6F175D3DCCD1}">
+                <a14:hiddenFill xmlns:a14="http://schemas.microsoft.com/office/drawing/2010/main">
+                  <a:solidFill>
+                    <a:srgbClr val="FFFFFF"/>
+                  </a:solidFill>
+                </a14:hiddenFill>
+              </a:ext>
+            </a:extLst>
+          </p:spPr>
+          <p:txBody>
+            <a:bodyPr wrap="square">
+              <a:spAutoFit/>
+            </a:bodyPr>
+            <a:lstStyle>
+              <a:lvl1pPr eaLnBrk="0" hangingPunct="0">
+                <a:defRPr sz="2400">
+                  <a:solidFill>
+                    <a:schemeClr val="tx1"/>
+                  </a:solidFill>
+                  <a:latin typeface="Calibri" charset="0"/>
+                  <a:ea typeface="ＭＳ Ｐゴシック" charset="-128"/>
+                </a:defRPr>
+              </a:lvl1pPr>
+              <a:lvl2pPr marL="742950" indent="-285750" eaLnBrk="0" hangingPunct="0">
+                <a:defRPr sz="2400">
+                  <a:solidFill>
+                    <a:schemeClr val="tx1"/>
+                  </a:solidFill>
+                  <a:latin typeface="Calibri" charset="0"/>
+                  <a:ea typeface="ＭＳ Ｐゴシック" charset="-128"/>
+                </a:defRPr>
+              </a:lvl2pPr>
+              <a:lvl3pPr marL="1143000" indent="-228600" eaLnBrk="0" hangingPunct="0">
+                <a:defRPr sz="2400">
+                  <a:solidFill>
+                    <a:schemeClr val="tx1"/>
+                  </a:solidFill>
+                  <a:latin typeface="Calibri" charset="0"/>
+                  <a:ea typeface="ＭＳ Ｐゴシック" charset="-128"/>
+                </a:defRPr>
+              </a:lvl3pPr>
+              <a:lvl4pPr marL="1600200" indent="-228600" eaLnBrk="0" hangingPunct="0">
+                <a:defRPr sz="2400">
+                  <a:solidFill>
+                    <a:schemeClr val="tx1"/>
+                  </a:solidFill>
+                  <a:latin typeface="Calibri" charset="0"/>
+                  <a:ea typeface="ＭＳ Ｐゴシック" charset="-128"/>
+                </a:defRPr>
+              </a:lvl4pPr>
+              <a:lvl5pPr marL="2057400" indent="-228600" eaLnBrk="0" hangingPunct="0">
+                <a:defRPr sz="2400">
+                  <a:solidFill>
+                    <a:schemeClr val="tx1"/>
+                  </a:solidFill>
+                  <a:latin typeface="Calibri" charset="0"/>
+                  <a:ea typeface="ＭＳ Ｐゴシック" charset="-128"/>
+                </a:defRPr>
+              </a:lvl5pPr>
+              <a:lvl6pPr marL="2514600" indent="-228600" defTabSz="457200" eaLnBrk="0" fontAlgn="base" hangingPunct="0">
+                <a:spcBef>
+                  <a:spcPct val="0"/>
+                </a:spcBef>
+                <a:spcAft>
+                  <a:spcPct val="0"/>
+                </a:spcAft>
+                <a:defRPr sz="2400">
+                  <a:solidFill>
+                    <a:schemeClr val="tx1"/>
+                  </a:solidFill>
+                  <a:latin typeface="Calibri" charset="0"/>
+                  <a:ea typeface="ＭＳ Ｐゴシック" charset="-128"/>
+                </a:defRPr>
+              </a:lvl6pPr>
+              <a:lvl7pPr marL="2971800" indent="-228600" defTabSz="457200" eaLnBrk="0" fontAlgn="base" hangingPunct="0">
+                <a:spcBef>
+                  <a:spcPct val="0"/>
+                </a:spcBef>
+                <a:spcAft>
+                  <a:spcPct val="0"/>
+                </a:spcAft>
+                <a:defRPr sz="2400">
+                  <a:solidFill>
+                    <a:schemeClr val="tx1"/>
+                  </a:solidFill>
+                  <a:latin typeface="Calibri" charset="0"/>
+                  <a:ea typeface="ＭＳ Ｐゴシック" charset="-128"/>
+                </a:defRPr>
+              </a:lvl7pPr>
+              <a:lvl8pPr marL="3429000" indent="-228600" defTabSz="457200" eaLnBrk="0" fontAlgn="base" hangingPunct="0">
+                <a:spcBef>
+                  <a:spcPct val="0"/>
+                </a:spcBef>
+                <a:spcAft>
+                  <a:spcPct val="0"/>
+                </a:spcAft>
+                <a:defRPr sz="2400">
+                  <a:solidFill>
+                    <a:schemeClr val="tx1"/>
+                  </a:solidFill>
+                  <a:latin typeface="Calibri" charset="0"/>
+                  <a:ea typeface="ＭＳ Ｐゴシック" charset="-128"/>
+                </a:defRPr>
+              </a:lvl8pPr>
+              <a:lvl9pPr marL="3886200" indent="-228600" defTabSz="457200" eaLnBrk="0" fontAlgn="base" hangingPunct="0">
+                <a:spcBef>
+                  <a:spcPct val="0"/>
+                </a:spcBef>
+                <a:spcAft>
+                  <a:spcPct val="0"/>
+                </a:spcAft>
+                <a:defRPr sz="2400">
+                  <a:solidFill>
+                    <a:schemeClr val="tx1"/>
+                  </a:solidFill>
+                  <a:latin typeface="Calibri" charset="0"/>
+                  <a:ea typeface="ＭＳ Ｐゴシック" charset="-128"/>
+                </a:defRPr>
+              </a:lvl9pPr>
+            </a:lstStyle>
+            <a:p>
+              <a:pPr eaLnBrk="1" hangingPunct="1"/>
+              <a:r>
+                <a:rPr lang="en-US" altLang="en-US" sz="2000" dirty="0"/>
+                <a:t>title : string</a:t>
+              </a:r>
+            </a:p>
+            <a:p>
+              <a:pPr eaLnBrk="1" hangingPunct="1"/>
+              <a:r>
+                <a:rPr lang="en-US" altLang="en-US" sz="2000" dirty="0"/>
+                <a:t>description : text</a:t>
+              </a:r>
+            </a:p>
+          </p:txBody>
+        </p:sp>
+      </p:grpSp>
+      <p:cxnSp>
+        <p:nvCxnSpPr>
+          <p:cNvPr id="4" name="Straight Connector 3">
+            <a:extLst>
+              <a:ext uri="{FF2B5EF4-FFF2-40B4-BE49-F238E27FC236}">
+                <a16:creationId xmlns:a16="http://schemas.microsoft.com/office/drawing/2014/main" id="{53F90975-DC21-1E4E-9983-1D92EE59CFCF}"/>
+              </a:ext>
+            </a:extLst>
+          </p:cNvPr>
+          <p:cNvCxnSpPr>
+            <a:cxnSpLocks/>
+            <a:stCxn id="7" idx="3"/>
+          </p:cNvCxnSpPr>
+          <p:nvPr/>
+        </p:nvCxnSpPr>
+        <p:spPr>
+          <a:xfrm>
+            <a:off x="6611575" y="3013502"/>
+            <a:ext cx="2603906" cy="0"/>
+          </a:xfrm>
+          <a:prstGeom prst="line">
+            <a:avLst/>
+          </a:prstGeom>
+          <a:ln w="38100">
+            <a:solidFill>
+              <a:schemeClr val="tx1"/>
+            </a:solidFill>
+          </a:ln>
+        </p:spPr>
+        <p:style>
+          <a:lnRef idx="1">
+            <a:schemeClr val="accent1"/>
+          </a:lnRef>
+          <a:fillRef idx="0">
+            <a:schemeClr val="accent1"/>
+          </a:fillRef>
+          <a:effectRef idx="0">
+            <a:schemeClr val="accent1"/>
+          </a:effectRef>
+          <a:fontRef idx="minor">
+            <a:schemeClr val="tx1"/>
+          </a:fontRef>
+        </p:style>
+      </p:cxnSp>
+      <p:sp>
+        <p:nvSpPr>
+          <p:cNvPr id="8" name="TextBox 7">
+            <a:extLst>
+              <a:ext uri="{FF2B5EF4-FFF2-40B4-BE49-F238E27FC236}">
+                <a16:creationId xmlns:a16="http://schemas.microsoft.com/office/drawing/2014/main" id="{B2DEAD67-0DA9-0547-B18D-D0C4F801F4C9}"/>
+              </a:ext>
+            </a:extLst>
+          </p:cNvPr>
+          <p:cNvSpPr txBox="1"/>
+          <p:nvPr/>
+        </p:nvSpPr>
+        <p:spPr>
+          <a:xfrm>
+            <a:off x="7502197" y="2641978"/>
+            <a:ext cx="822661" cy="400110"/>
+          </a:xfrm>
+          <a:prstGeom prst="rect">
+            <a:avLst/>
+          </a:prstGeom>
+          <a:noFill/>
+        </p:spPr>
+        <p:txBody>
+          <a:bodyPr wrap="none" rtlCol="0">
+            <a:spAutoFit/>
+          </a:bodyPr>
+          <a:lstStyle/>
+          <a:p>
+            <a:r>
+              <a:rPr lang="en-US" sz="2000" dirty="0"/>
+              <a:t>has ▶︎</a:t>
+            </a:r>
+          </a:p>
+        </p:txBody>
+      </p:sp>
+      <p:sp>
+        <p:nvSpPr>
+          <p:cNvPr id="9" name="TextBox 8">
+            <a:extLst>
+              <a:ext uri="{FF2B5EF4-FFF2-40B4-BE49-F238E27FC236}">
+                <a16:creationId xmlns:a16="http://schemas.microsoft.com/office/drawing/2014/main" id="{39A1805D-E63F-BC47-9A92-D5ADB1D18DA5}"/>
+              </a:ext>
+            </a:extLst>
+          </p:cNvPr>
+          <p:cNvSpPr txBox="1"/>
+          <p:nvPr/>
+        </p:nvSpPr>
+        <p:spPr>
+          <a:xfrm>
+            <a:off x="8158599" y="2656945"/>
+            <a:ext cx="1095493" cy="707886"/>
+          </a:xfrm>
+          <a:prstGeom prst="rect">
+            <a:avLst/>
+          </a:prstGeom>
+          <a:noFill/>
+        </p:spPr>
+        <p:txBody>
+          <a:bodyPr wrap="none" rtlCol="0">
+            <a:spAutoFit/>
+          </a:bodyPr>
+          <a:lstStyle/>
+          <a:p>
+            <a:pPr algn="r"/>
+            <a:r>
+              <a:rPr lang="en-US" sz="2000" dirty="0"/>
+              <a:t>*</a:t>
+            </a:r>
+          </a:p>
+          <a:p>
+            <a:pPr algn="r"/>
+            <a:r>
+              <a:rPr lang="en-US" sz="2000" dirty="0"/>
+              <a:t>question</a:t>
+            </a:r>
+          </a:p>
+        </p:txBody>
+      </p:sp>
+      <p:sp>
+        <p:nvSpPr>
+          <p:cNvPr id="12" name="TextBox 11">
+            <a:extLst>
+              <a:ext uri="{FF2B5EF4-FFF2-40B4-BE49-F238E27FC236}">
+                <a16:creationId xmlns:a16="http://schemas.microsoft.com/office/drawing/2014/main" id="{60BA148A-124B-5D45-B44B-7B8B12D3BB6C}"/>
+              </a:ext>
+            </a:extLst>
+          </p:cNvPr>
+          <p:cNvSpPr txBox="1"/>
+          <p:nvPr/>
+        </p:nvSpPr>
+        <p:spPr>
+          <a:xfrm>
+            <a:off x="6617414" y="2654170"/>
+            <a:ext cx="614271" cy="707886"/>
+          </a:xfrm>
+          <a:prstGeom prst="rect">
+            <a:avLst/>
+          </a:prstGeom>
+          <a:noFill/>
+        </p:spPr>
+        <p:txBody>
+          <a:bodyPr wrap="none" rtlCol="0">
+            <a:spAutoFit/>
+          </a:bodyPr>
+          <a:lstStyle/>
+          <a:p>
+            <a:r>
+              <a:rPr lang="en-US" sz="2000" dirty="0"/>
+              <a:t>1</a:t>
+            </a:r>
+          </a:p>
+          <a:p>
+            <a:r>
+              <a:rPr lang="en-US" sz="2000" dirty="0"/>
+              <a:t>quiz</a:t>
+            </a:r>
+          </a:p>
+        </p:txBody>
+      </p:sp>
+      <p:grpSp>
+        <p:nvGrpSpPr>
+          <p:cNvPr id="13" name="Group 12">
+            <a:extLst>
+              <a:ext uri="{FF2B5EF4-FFF2-40B4-BE49-F238E27FC236}">
+                <a16:creationId xmlns:a16="http://schemas.microsoft.com/office/drawing/2014/main" id="{AD597AF0-32CA-0140-981F-57F887EB1D75}"/>
+              </a:ext>
+            </a:extLst>
+          </p:cNvPr>
+          <p:cNvGrpSpPr/>
+          <p:nvPr/>
+        </p:nvGrpSpPr>
+        <p:grpSpPr>
+          <a:xfrm>
+            <a:off x="113231" y="2259449"/>
+            <a:ext cx="1947218" cy="1107996"/>
+            <a:chOff x="3897790" y="1311900"/>
+            <a:chExt cx="3458441" cy="1107996"/>
+          </a:xfrm>
+        </p:grpSpPr>
+        <p:sp>
+          <p:nvSpPr>
+            <p:cNvPr id="14" name="TextBox 29">
+              <a:extLst>
+                <a:ext uri="{FF2B5EF4-FFF2-40B4-BE49-F238E27FC236}">
+                  <a16:creationId xmlns:a16="http://schemas.microsoft.com/office/drawing/2014/main" id="{1F026FC9-5657-AE46-8EDE-5B1826BCF973}"/>
+                </a:ext>
+              </a:extLst>
+            </p:cNvPr>
+            <p:cNvSpPr txBox="1">
+              <a:spLocks noChangeArrowheads="1"/>
+            </p:cNvSpPr>
+            <p:nvPr/>
+          </p:nvSpPr>
+          <p:spPr bwMode="auto">
+            <a:xfrm>
+              <a:off x="3897790" y="1311900"/>
+              <a:ext cx="3458441" cy="400110"/>
+            </a:xfrm>
+            <a:prstGeom prst="rect">
+              <a:avLst/>
+            </a:prstGeom>
+            <a:noFill/>
+            <a:ln w="38100">
+              <a:solidFill>
+                <a:schemeClr val="tx1"/>
+              </a:solidFill>
+              <a:miter lim="800000"/>
+              <a:headEnd/>
+              <a:tailEnd/>
+            </a:ln>
+            <a:extLst>
+              <a:ext uri="{909E8E84-426E-40DD-AFC4-6F175D3DCCD1}">
+                <a14:hiddenFill xmlns:a14="http://schemas.microsoft.com/office/drawing/2010/main">
+                  <a:solidFill>
+                    <a:srgbClr val="FFFFFF"/>
+                  </a:solidFill>
+                </a14:hiddenFill>
+              </a:ext>
+            </a:extLst>
+          </p:spPr>
+          <p:txBody>
+            <a:bodyPr wrap="square">
+              <a:spAutoFit/>
+            </a:bodyPr>
+            <a:lstStyle>
+              <a:lvl1pPr eaLnBrk="0" hangingPunct="0">
+                <a:defRPr sz="2400">
+                  <a:solidFill>
+                    <a:schemeClr val="tx1"/>
+                  </a:solidFill>
+                  <a:latin typeface="Calibri" charset="0"/>
+                  <a:ea typeface="ＭＳ Ｐゴシック" charset="-128"/>
+                </a:defRPr>
+              </a:lvl1pPr>
+              <a:lvl2pPr marL="742950" indent="-285750" eaLnBrk="0" hangingPunct="0">
+                <a:defRPr sz="2400">
+                  <a:solidFill>
+                    <a:schemeClr val="tx1"/>
+                  </a:solidFill>
+                  <a:latin typeface="Calibri" charset="0"/>
+                  <a:ea typeface="ＭＳ Ｐゴシック" charset="-128"/>
+                </a:defRPr>
+              </a:lvl2pPr>
+              <a:lvl3pPr marL="1143000" indent="-228600" eaLnBrk="0" hangingPunct="0">
+                <a:defRPr sz="2400">
+                  <a:solidFill>
+                    <a:schemeClr val="tx1"/>
+                  </a:solidFill>
+                  <a:latin typeface="Calibri" charset="0"/>
+                  <a:ea typeface="ＭＳ Ｐゴシック" charset="-128"/>
+                </a:defRPr>
+              </a:lvl3pPr>
+              <a:lvl4pPr marL="1600200" indent="-228600" eaLnBrk="0" hangingPunct="0">
+                <a:defRPr sz="2400">
+                  <a:solidFill>
+                    <a:schemeClr val="tx1"/>
+                  </a:solidFill>
+                  <a:latin typeface="Calibri" charset="0"/>
+                  <a:ea typeface="ＭＳ Ｐゴシック" charset="-128"/>
+                </a:defRPr>
+              </a:lvl4pPr>
+              <a:lvl5pPr marL="2057400" indent="-228600" eaLnBrk="0" hangingPunct="0">
+                <a:defRPr sz="2400">
+                  <a:solidFill>
+                    <a:schemeClr val="tx1"/>
+                  </a:solidFill>
+                  <a:latin typeface="Calibri" charset="0"/>
+                  <a:ea typeface="ＭＳ Ｐゴシック" charset="-128"/>
+                </a:defRPr>
+              </a:lvl5pPr>
+              <a:lvl6pPr marL="2514600" indent="-228600" defTabSz="457200" eaLnBrk="0" fontAlgn="base" hangingPunct="0">
+                <a:spcBef>
+                  <a:spcPct val="0"/>
+                </a:spcBef>
+                <a:spcAft>
+                  <a:spcPct val="0"/>
+                </a:spcAft>
+                <a:defRPr sz="2400">
+                  <a:solidFill>
+                    <a:schemeClr val="tx1"/>
+                  </a:solidFill>
+                  <a:latin typeface="Calibri" charset="0"/>
+                  <a:ea typeface="ＭＳ Ｐゴシック" charset="-128"/>
+                </a:defRPr>
+              </a:lvl6pPr>
+              <a:lvl7pPr marL="2971800" indent="-228600" defTabSz="457200" eaLnBrk="0" fontAlgn="base" hangingPunct="0">
+                <a:spcBef>
+                  <a:spcPct val="0"/>
+                </a:spcBef>
+                <a:spcAft>
+                  <a:spcPct val="0"/>
+                </a:spcAft>
+                <a:defRPr sz="2400">
+                  <a:solidFill>
+                    <a:schemeClr val="tx1"/>
+                  </a:solidFill>
+                  <a:latin typeface="Calibri" charset="0"/>
+                  <a:ea typeface="ＭＳ Ｐゴシック" charset="-128"/>
+                </a:defRPr>
+              </a:lvl7pPr>
+              <a:lvl8pPr marL="3429000" indent="-228600" defTabSz="457200" eaLnBrk="0" fontAlgn="base" hangingPunct="0">
+                <a:spcBef>
+                  <a:spcPct val="0"/>
+                </a:spcBef>
+                <a:spcAft>
+                  <a:spcPct val="0"/>
+                </a:spcAft>
+                <a:defRPr sz="2400">
+                  <a:solidFill>
+                    <a:schemeClr val="tx1"/>
+                  </a:solidFill>
+                  <a:latin typeface="Calibri" charset="0"/>
+                  <a:ea typeface="ＭＳ Ｐゴシック" charset="-128"/>
+                </a:defRPr>
+              </a:lvl8pPr>
+              <a:lvl9pPr marL="3886200" indent="-228600" defTabSz="457200" eaLnBrk="0" fontAlgn="base" hangingPunct="0">
+                <a:spcBef>
+                  <a:spcPct val="0"/>
+                </a:spcBef>
+                <a:spcAft>
+                  <a:spcPct val="0"/>
+                </a:spcAft>
+                <a:defRPr sz="2400">
+                  <a:solidFill>
+                    <a:schemeClr val="tx1"/>
+                  </a:solidFill>
+                  <a:latin typeface="Calibri" charset="0"/>
+                  <a:ea typeface="ＭＳ Ｐゴシック" charset="-128"/>
+                </a:defRPr>
+              </a:lvl9pPr>
+            </a:lstStyle>
+            <a:p>
+              <a:pPr eaLnBrk="1" hangingPunct="1"/>
+              <a:r>
+                <a:rPr lang="en-US" altLang="en-US" sz="2000" dirty="0"/>
+                <a:t>User</a:t>
+              </a:r>
+            </a:p>
+          </p:txBody>
+        </p:sp>
+        <p:sp>
+          <p:nvSpPr>
+            <p:cNvPr id="15" name="TextBox 29">
+              <a:extLst>
+                <a:ext uri="{FF2B5EF4-FFF2-40B4-BE49-F238E27FC236}">
+                  <a16:creationId xmlns:a16="http://schemas.microsoft.com/office/drawing/2014/main" id="{46F7DD71-38B3-EF4C-BF9F-357C02020E31}"/>
+                </a:ext>
+              </a:extLst>
+            </p:cNvPr>
+            <p:cNvSpPr txBox="1">
+              <a:spLocks noChangeArrowheads="1"/>
+            </p:cNvSpPr>
+            <p:nvPr/>
+          </p:nvSpPr>
+          <p:spPr bwMode="auto">
+            <a:xfrm>
+              <a:off x="3897790" y="1712010"/>
+              <a:ext cx="3458441" cy="707886"/>
+            </a:xfrm>
+            <a:prstGeom prst="rect">
+              <a:avLst/>
+            </a:prstGeom>
+            <a:noFill/>
+            <a:ln w="38100">
+              <a:solidFill>
+                <a:schemeClr val="tx1"/>
+              </a:solidFill>
+              <a:miter lim="800000"/>
+              <a:headEnd/>
+              <a:tailEnd/>
+            </a:ln>
+            <a:extLst>
+              <a:ext uri="{909E8E84-426E-40DD-AFC4-6F175D3DCCD1}">
+                <a14:hiddenFill xmlns:a14="http://schemas.microsoft.com/office/drawing/2010/main">
+                  <a:solidFill>
+                    <a:srgbClr val="FFFFFF"/>
+                  </a:solidFill>
+                </a14:hiddenFill>
+              </a:ext>
+            </a:extLst>
+          </p:spPr>
+          <p:txBody>
+            <a:bodyPr wrap="square">
+              <a:spAutoFit/>
+            </a:bodyPr>
+            <a:lstStyle>
+              <a:lvl1pPr eaLnBrk="0" hangingPunct="0">
+                <a:defRPr sz="2400">
+                  <a:solidFill>
+                    <a:schemeClr val="tx1"/>
+                  </a:solidFill>
+                  <a:latin typeface="Calibri" charset="0"/>
+                  <a:ea typeface="ＭＳ Ｐゴシック" charset="-128"/>
+                </a:defRPr>
+              </a:lvl1pPr>
+              <a:lvl2pPr marL="742950" indent="-285750" eaLnBrk="0" hangingPunct="0">
+                <a:defRPr sz="2400">
+                  <a:solidFill>
+                    <a:schemeClr val="tx1"/>
+                  </a:solidFill>
+                  <a:latin typeface="Calibri" charset="0"/>
+                  <a:ea typeface="ＭＳ Ｐゴシック" charset="-128"/>
+                </a:defRPr>
+              </a:lvl2pPr>
+              <a:lvl3pPr marL="1143000" indent="-228600" eaLnBrk="0" hangingPunct="0">
+                <a:defRPr sz="2400">
+                  <a:solidFill>
+                    <a:schemeClr val="tx1"/>
+                  </a:solidFill>
+                  <a:latin typeface="Calibri" charset="0"/>
+                  <a:ea typeface="ＭＳ Ｐゴシック" charset="-128"/>
+                </a:defRPr>
+              </a:lvl3pPr>
+              <a:lvl4pPr marL="1600200" indent="-228600" eaLnBrk="0" hangingPunct="0">
+                <a:defRPr sz="2400">
+                  <a:solidFill>
+                    <a:schemeClr val="tx1"/>
+                  </a:solidFill>
+                  <a:latin typeface="Calibri" charset="0"/>
+                  <a:ea typeface="ＭＳ Ｐゴシック" charset="-128"/>
+                </a:defRPr>
+              </a:lvl4pPr>
+              <a:lvl5pPr marL="2057400" indent="-228600" eaLnBrk="0" hangingPunct="0">
+                <a:defRPr sz="2400">
+                  <a:solidFill>
+                    <a:schemeClr val="tx1"/>
+                  </a:solidFill>
+                  <a:latin typeface="Calibri" charset="0"/>
+                  <a:ea typeface="ＭＳ Ｐゴシック" charset="-128"/>
+                </a:defRPr>
+              </a:lvl5pPr>
+              <a:lvl6pPr marL="2514600" indent="-228600" defTabSz="457200" eaLnBrk="0" fontAlgn="base" hangingPunct="0">
+                <a:spcBef>
+                  <a:spcPct val="0"/>
+                </a:spcBef>
+                <a:spcAft>
+                  <a:spcPct val="0"/>
+                </a:spcAft>
+                <a:defRPr sz="2400">
+                  <a:solidFill>
+                    <a:schemeClr val="tx1"/>
+                  </a:solidFill>
+                  <a:latin typeface="Calibri" charset="0"/>
+                  <a:ea typeface="ＭＳ Ｐゴシック" charset="-128"/>
+                </a:defRPr>
+              </a:lvl6pPr>
+              <a:lvl7pPr marL="2971800" indent="-228600" defTabSz="457200" eaLnBrk="0" fontAlgn="base" hangingPunct="0">
+                <a:spcBef>
+                  <a:spcPct val="0"/>
+                </a:spcBef>
+                <a:spcAft>
+                  <a:spcPct val="0"/>
+                </a:spcAft>
+                <a:defRPr sz="2400">
+                  <a:solidFill>
+                    <a:schemeClr val="tx1"/>
+                  </a:solidFill>
+                  <a:latin typeface="Calibri" charset="0"/>
+                  <a:ea typeface="ＭＳ Ｐゴシック" charset="-128"/>
+                </a:defRPr>
+              </a:lvl7pPr>
+              <a:lvl8pPr marL="3429000" indent="-228600" defTabSz="457200" eaLnBrk="0" fontAlgn="base" hangingPunct="0">
+                <a:spcBef>
+                  <a:spcPct val="0"/>
+                </a:spcBef>
+                <a:spcAft>
+                  <a:spcPct val="0"/>
+                </a:spcAft>
+                <a:defRPr sz="2400">
+                  <a:solidFill>
+                    <a:schemeClr val="tx1"/>
+                  </a:solidFill>
+                  <a:latin typeface="Calibri" charset="0"/>
+                  <a:ea typeface="ＭＳ Ｐゴシック" charset="-128"/>
+                </a:defRPr>
+              </a:lvl8pPr>
+              <a:lvl9pPr marL="3886200" indent="-228600" defTabSz="457200" eaLnBrk="0" fontAlgn="base" hangingPunct="0">
+                <a:spcBef>
+                  <a:spcPct val="0"/>
+                </a:spcBef>
+                <a:spcAft>
+                  <a:spcPct val="0"/>
+                </a:spcAft>
+                <a:defRPr sz="2400">
+                  <a:solidFill>
+                    <a:schemeClr val="tx1"/>
+                  </a:solidFill>
+                  <a:latin typeface="Calibri" charset="0"/>
+                  <a:ea typeface="ＭＳ Ｐゴシック" charset="-128"/>
+                </a:defRPr>
+              </a:lvl9pPr>
+            </a:lstStyle>
+            <a:p>
+              <a:pPr eaLnBrk="1" hangingPunct="1"/>
+              <a:r>
+                <a:rPr lang="en-US" altLang="en-US" sz="2000" dirty="0"/>
+                <a:t>email : string</a:t>
+              </a:r>
+            </a:p>
+            <a:p>
+              <a:pPr eaLnBrk="1" hangingPunct="1"/>
+              <a:r>
+                <a:rPr lang="en-US" altLang="en-US" sz="2000" dirty="0"/>
+                <a:t>...</a:t>
+              </a:r>
+            </a:p>
+          </p:txBody>
+        </p:sp>
+      </p:grpSp>
+      <p:cxnSp>
+        <p:nvCxnSpPr>
+          <p:cNvPr id="17" name="Straight Connector 16">
+            <a:extLst>
+              <a:ext uri="{FF2B5EF4-FFF2-40B4-BE49-F238E27FC236}">
+                <a16:creationId xmlns:a16="http://schemas.microsoft.com/office/drawing/2014/main" id="{11700EBA-4FF2-4546-B8A6-AB85841D1254}"/>
+              </a:ext>
+            </a:extLst>
+          </p:cNvPr>
+          <p:cNvCxnSpPr>
+            <a:cxnSpLocks/>
+            <a:stCxn id="15" idx="3"/>
+            <a:endCxn id="7" idx="1"/>
+          </p:cNvCxnSpPr>
+          <p:nvPr/>
+        </p:nvCxnSpPr>
+        <p:spPr>
+          <a:xfrm>
+            <a:off x="2060449" y="3013502"/>
+            <a:ext cx="2603907" cy="0"/>
+          </a:xfrm>
+          <a:prstGeom prst="line">
+            <a:avLst/>
+          </a:prstGeom>
+          <a:ln w="38100">
+            <a:solidFill>
+              <a:schemeClr val="tx1"/>
+            </a:solidFill>
+          </a:ln>
+        </p:spPr>
+        <p:style>
+          <a:lnRef idx="1">
+            <a:schemeClr val="accent1"/>
+          </a:lnRef>
+          <a:fillRef idx="0">
+            <a:schemeClr val="accent1"/>
+          </a:fillRef>
+          <a:effectRef idx="0">
+            <a:schemeClr val="accent1"/>
+          </a:effectRef>
+          <a:fontRef idx="minor">
+            <a:schemeClr val="tx1"/>
+          </a:fontRef>
+        </p:style>
+      </p:cxnSp>
+      <p:sp>
+        <p:nvSpPr>
+          <p:cNvPr id="21" name="TextBox 20">
+            <a:extLst>
+              <a:ext uri="{FF2B5EF4-FFF2-40B4-BE49-F238E27FC236}">
+                <a16:creationId xmlns:a16="http://schemas.microsoft.com/office/drawing/2014/main" id="{0C10D20A-F47E-3D43-9963-C47489DAB695}"/>
+              </a:ext>
+            </a:extLst>
+          </p:cNvPr>
+          <p:cNvSpPr txBox="1"/>
+          <p:nvPr/>
+        </p:nvSpPr>
+        <p:spPr>
+          <a:xfrm>
+            <a:off x="3025262" y="2644753"/>
+            <a:ext cx="822661" cy="400110"/>
+          </a:xfrm>
+          <a:prstGeom prst="rect">
+            <a:avLst/>
+          </a:prstGeom>
+          <a:noFill/>
+        </p:spPr>
+        <p:txBody>
+          <a:bodyPr wrap="none" rtlCol="0">
+            <a:spAutoFit/>
+          </a:bodyPr>
+          <a:lstStyle/>
+          <a:p>
+            <a:r>
+              <a:rPr lang="en-US" sz="2000" dirty="0"/>
+              <a:t>has ▶︎</a:t>
+            </a:r>
+          </a:p>
+        </p:txBody>
+      </p:sp>
+      <p:sp>
+        <p:nvSpPr>
+          <p:cNvPr id="22" name="TextBox 21">
+            <a:extLst>
+              <a:ext uri="{FF2B5EF4-FFF2-40B4-BE49-F238E27FC236}">
+                <a16:creationId xmlns:a16="http://schemas.microsoft.com/office/drawing/2014/main" id="{48014A44-43C8-BF4A-BE47-E8A68DCD7DB5}"/>
+              </a:ext>
+            </a:extLst>
+          </p:cNvPr>
+          <p:cNvSpPr txBox="1"/>
+          <p:nvPr/>
+        </p:nvSpPr>
+        <p:spPr>
+          <a:xfrm>
+            <a:off x="4050084" y="2656945"/>
+            <a:ext cx="614271" cy="707886"/>
+          </a:xfrm>
+          <a:prstGeom prst="rect">
+            <a:avLst/>
+          </a:prstGeom>
+          <a:noFill/>
+        </p:spPr>
+        <p:txBody>
+          <a:bodyPr wrap="none" rtlCol="0">
+            <a:spAutoFit/>
+          </a:bodyPr>
+          <a:lstStyle/>
+          <a:p>
+            <a:pPr algn="r"/>
+            <a:r>
+              <a:rPr lang="en-US" sz="2000" dirty="0"/>
+              <a:t>*</a:t>
+            </a:r>
+          </a:p>
+          <a:p>
+            <a:pPr algn="r"/>
+            <a:r>
+              <a:rPr lang="en-US" sz="2000" dirty="0"/>
+              <a:t>quiz</a:t>
+            </a:r>
+          </a:p>
+        </p:txBody>
+      </p:sp>
+      <p:sp>
+        <p:nvSpPr>
+          <p:cNvPr id="23" name="TextBox 22">
+            <a:extLst>
+              <a:ext uri="{FF2B5EF4-FFF2-40B4-BE49-F238E27FC236}">
+                <a16:creationId xmlns:a16="http://schemas.microsoft.com/office/drawing/2014/main" id="{2F668590-178B-0C4A-BB41-0C9E7E8E93E2}"/>
+              </a:ext>
+            </a:extLst>
+          </p:cNvPr>
+          <p:cNvSpPr txBox="1"/>
+          <p:nvPr/>
+        </p:nvSpPr>
+        <p:spPr>
+          <a:xfrm>
+            <a:off x="2060449" y="2654170"/>
+            <a:ext cx="854721" cy="707886"/>
+          </a:xfrm>
+          <a:prstGeom prst="rect">
+            <a:avLst/>
+          </a:prstGeom>
+          <a:noFill/>
+        </p:spPr>
+        <p:txBody>
+          <a:bodyPr wrap="none" rtlCol="0">
+            <a:spAutoFit/>
+          </a:bodyPr>
+          <a:lstStyle/>
+          <a:p>
+            <a:r>
+              <a:rPr lang="en-US" sz="2000" dirty="0"/>
+              <a:t>1</a:t>
+            </a:r>
+          </a:p>
+          <a:p>
+            <a:r>
+              <a:rPr lang="en-US" sz="2000" dirty="0"/>
+              <a:t>owner</a:t>
+            </a:r>
+          </a:p>
+        </p:txBody>
+      </p:sp>
+    </p:spTree>
+    <p:extLst>
+      <p:ext uri="{BB962C8B-B14F-4D97-AF65-F5344CB8AC3E}">
+        <p14:creationId xmlns:p14="http://schemas.microsoft.com/office/powerpoint/2010/main" val="1936898171"/>
       </p:ext>
     </p:extLst>
   </p:cSld>

</xml_diff>

<commit_message>
Updated diagrams for Demo 14
</commit_message>
<xml_diff>
--- a/docs/model-class-diagram.pptx
+++ b/docs/model-class-diagram.pptx
@@ -11,6 +11,8 @@
     <p:sldId id="257" r:id="rId5"/>
     <p:sldId id="260" r:id="rId6"/>
     <p:sldId id="261" r:id="rId7"/>
+    <p:sldId id="262" r:id="rId8"/>
+    <p:sldId id="263" r:id="rId9"/>
   </p:sldIdLst>
   <p:sldSz cx="12192000" cy="6858000"/>
   <p:notesSz cx="6858000" cy="9144000"/>
@@ -248,7 +250,7 @@
           <a:p>
             <a:fld id="{E739BB41-DB51-AC40-8BC3-82550C14AA6F}" type="datetimeFigureOut">
               <a:rPr lang="en-US" smtClean="0"/>
-              <a:t>10/30/18</a:t>
+              <a:t>11/15/18</a:t>
             </a:fld>
             <a:endParaRPr lang="en-US"/>
           </a:p>
@@ -418,7 +420,7 @@
           <a:p>
             <a:fld id="{E739BB41-DB51-AC40-8BC3-82550C14AA6F}" type="datetimeFigureOut">
               <a:rPr lang="en-US" smtClean="0"/>
-              <a:t>10/30/18</a:t>
+              <a:t>11/15/18</a:t>
             </a:fld>
             <a:endParaRPr lang="en-US"/>
           </a:p>
@@ -598,7 +600,7 @@
           <a:p>
             <a:fld id="{E739BB41-DB51-AC40-8BC3-82550C14AA6F}" type="datetimeFigureOut">
               <a:rPr lang="en-US" smtClean="0"/>
-              <a:t>10/30/18</a:t>
+              <a:t>11/15/18</a:t>
             </a:fld>
             <a:endParaRPr lang="en-US"/>
           </a:p>
@@ -768,7 +770,7 @@
           <a:p>
             <a:fld id="{E739BB41-DB51-AC40-8BC3-82550C14AA6F}" type="datetimeFigureOut">
               <a:rPr lang="en-US" smtClean="0"/>
-              <a:t>10/30/18</a:t>
+              <a:t>11/15/18</a:t>
             </a:fld>
             <a:endParaRPr lang="en-US"/>
           </a:p>
@@ -1014,7 +1016,7 @@
           <a:p>
             <a:fld id="{E739BB41-DB51-AC40-8BC3-82550C14AA6F}" type="datetimeFigureOut">
               <a:rPr lang="en-US" smtClean="0"/>
-              <a:t>10/30/18</a:t>
+              <a:t>11/15/18</a:t>
             </a:fld>
             <a:endParaRPr lang="en-US"/>
           </a:p>
@@ -1246,7 +1248,7 @@
           <a:p>
             <a:fld id="{E739BB41-DB51-AC40-8BC3-82550C14AA6F}" type="datetimeFigureOut">
               <a:rPr lang="en-US" smtClean="0"/>
-              <a:t>10/30/18</a:t>
+              <a:t>11/15/18</a:t>
             </a:fld>
             <a:endParaRPr lang="en-US"/>
           </a:p>
@@ -1613,7 +1615,7 @@
           <a:p>
             <a:fld id="{E739BB41-DB51-AC40-8BC3-82550C14AA6F}" type="datetimeFigureOut">
               <a:rPr lang="en-US" smtClean="0"/>
-              <a:t>10/30/18</a:t>
+              <a:t>11/15/18</a:t>
             </a:fld>
             <a:endParaRPr lang="en-US"/>
           </a:p>
@@ -1731,7 +1733,7 @@
           <a:p>
             <a:fld id="{E739BB41-DB51-AC40-8BC3-82550C14AA6F}" type="datetimeFigureOut">
               <a:rPr lang="en-US" smtClean="0"/>
-              <a:t>10/30/18</a:t>
+              <a:t>11/15/18</a:t>
             </a:fld>
             <a:endParaRPr lang="en-US"/>
           </a:p>
@@ -1826,7 +1828,7 @@
           <a:p>
             <a:fld id="{E739BB41-DB51-AC40-8BC3-82550C14AA6F}" type="datetimeFigureOut">
               <a:rPr lang="en-US" smtClean="0"/>
-              <a:t>10/30/18</a:t>
+              <a:t>11/15/18</a:t>
             </a:fld>
             <a:endParaRPr lang="en-US"/>
           </a:p>
@@ -2103,7 +2105,7 @@
           <a:p>
             <a:fld id="{E739BB41-DB51-AC40-8BC3-82550C14AA6F}" type="datetimeFigureOut">
               <a:rPr lang="en-US" smtClean="0"/>
-              <a:t>10/30/18</a:t>
+              <a:t>11/15/18</a:t>
             </a:fld>
             <a:endParaRPr lang="en-US"/>
           </a:p>
@@ -2360,7 +2362,7 @@
           <a:p>
             <a:fld id="{E739BB41-DB51-AC40-8BC3-82550C14AA6F}" type="datetimeFigureOut">
               <a:rPr lang="en-US" smtClean="0"/>
-              <a:t>10/30/18</a:t>
+              <a:t>11/15/18</a:t>
             </a:fld>
             <a:endParaRPr lang="en-US"/>
           </a:p>
@@ -2573,7 +2575,7 @@
           <a:p>
             <a:fld id="{E739BB41-DB51-AC40-8BC3-82550C14AA6F}" type="datetimeFigureOut">
               <a:rPr lang="en-US" smtClean="0"/>
-              <a:t>10/30/18</a:t>
+              <a:t>11/15/18</a:t>
             </a:fld>
             <a:endParaRPr lang="en-US"/>
           </a:p>
@@ -5919,6 +5921,2008 @@
 </p:sld>
 </file>
 
+<file path=ppt/slides/slide7.xml><?xml version="1.0" encoding="utf-8"?>
+<p:sld xmlns:a="http://schemas.openxmlformats.org/drawingml/2006/main" xmlns:r="http://schemas.openxmlformats.org/officeDocument/2006/relationships" xmlns:p="http://schemas.openxmlformats.org/presentationml/2006/main">
+  <p:cSld>
+    <p:spTree>
+      <p:nvGrpSpPr>
+        <p:cNvPr id="1" name=""/>
+        <p:cNvGrpSpPr/>
+        <p:nvPr/>
+      </p:nvGrpSpPr>
+      <p:grpSpPr>
+        <a:xfrm>
+          <a:off x="0" y="0"/>
+          <a:ext cx="0" cy="0"/>
+          <a:chOff x="0" y="0"/>
+          <a:chExt cx="0" cy="0"/>
+        </a:xfrm>
+      </p:grpSpPr>
+      <p:sp>
+        <p:nvSpPr>
+          <p:cNvPr id="2" name="Title 1">
+            <a:extLst>
+              <a:ext uri="{FF2B5EF4-FFF2-40B4-BE49-F238E27FC236}">
+                <a16:creationId xmlns:a16="http://schemas.microsoft.com/office/drawing/2014/main" id="{400BC608-ED53-9E46-95E6-23B44E45324D}"/>
+              </a:ext>
+            </a:extLst>
+          </p:cNvPr>
+          <p:cNvSpPr>
+            <a:spLocks noGrp="1"/>
+          </p:cNvSpPr>
+          <p:nvPr>
+            <p:ph type="title"/>
+          </p:nvPr>
+        </p:nvSpPr>
+        <p:spPr>
+          <a:xfrm>
+            <a:off x="0" y="2766219"/>
+            <a:ext cx="12192000" cy="1325563"/>
+          </a:xfrm>
+        </p:spPr>
+        <p:txBody>
+          <a:bodyPr/>
+          <a:lstStyle/>
+          <a:p>
+            <a:pPr algn="ctr"/>
+            <a:r>
+              <a:rPr lang="en-US" dirty="0"/>
+              <a:t>model-class-diagram-demo-14-many-to-many-assoc</a:t>
+            </a:r>
+          </a:p>
+        </p:txBody>
+      </p:sp>
+    </p:spTree>
+    <p:extLst>
+      <p:ext uri="{BB962C8B-B14F-4D97-AF65-F5344CB8AC3E}">
+        <p14:creationId xmlns:p14="http://schemas.microsoft.com/office/powerpoint/2010/main" val="1658723495"/>
+      </p:ext>
+    </p:extLst>
+  </p:cSld>
+  <p:clrMapOvr>
+    <a:masterClrMapping/>
+  </p:clrMapOvr>
+</p:sld>
+</file>
+
+<file path=ppt/slides/slide8.xml><?xml version="1.0" encoding="utf-8"?>
+<p:sld xmlns:a="http://schemas.openxmlformats.org/drawingml/2006/main" xmlns:r="http://schemas.openxmlformats.org/officeDocument/2006/relationships" xmlns:p="http://schemas.openxmlformats.org/presentationml/2006/main">
+  <p:cSld>
+    <p:spTree>
+      <p:nvGrpSpPr>
+        <p:cNvPr id="1" name=""/>
+        <p:cNvGrpSpPr/>
+        <p:nvPr/>
+      </p:nvGrpSpPr>
+      <p:grpSpPr>
+        <a:xfrm>
+          <a:off x="0" y="0"/>
+          <a:ext cx="0" cy="0"/>
+          <a:chOff x="0" y="0"/>
+          <a:chExt cx="0" cy="0"/>
+        </a:xfrm>
+      </p:grpSpPr>
+      <p:grpSp>
+        <p:nvGrpSpPr>
+          <p:cNvPr id="2" name="Group 1">
+            <a:extLst>
+              <a:ext uri="{FF2B5EF4-FFF2-40B4-BE49-F238E27FC236}">
+                <a16:creationId xmlns:a16="http://schemas.microsoft.com/office/drawing/2014/main" id="{28D0630C-FB17-0E4C-A756-3B437772780F}"/>
+              </a:ext>
+            </a:extLst>
+          </p:cNvPr>
+          <p:cNvGrpSpPr/>
+          <p:nvPr/>
+        </p:nvGrpSpPr>
+        <p:grpSpPr>
+          <a:xfrm>
+            <a:off x="9215481" y="2259449"/>
+            <a:ext cx="2872287" cy="2339102"/>
+            <a:chOff x="3897790" y="1311900"/>
+            <a:chExt cx="3458441" cy="2339102"/>
+          </a:xfrm>
+        </p:grpSpPr>
+        <p:sp>
+          <p:nvSpPr>
+            <p:cNvPr id="50" name="TextBox 29">
+              <a:extLst>
+                <a:ext uri="{FF2B5EF4-FFF2-40B4-BE49-F238E27FC236}">
+                  <a16:creationId xmlns:a16="http://schemas.microsoft.com/office/drawing/2014/main" id="{EC5D1D39-01C2-544F-83B5-7EB087837FAC}"/>
+                </a:ext>
+              </a:extLst>
+            </p:cNvPr>
+            <p:cNvSpPr txBox="1">
+              <a:spLocks noChangeArrowheads="1"/>
+            </p:cNvSpPr>
+            <p:nvPr/>
+          </p:nvSpPr>
+          <p:spPr bwMode="auto">
+            <a:xfrm>
+              <a:off x="3897790" y="1311900"/>
+              <a:ext cx="3458441" cy="400110"/>
+            </a:xfrm>
+            <a:prstGeom prst="rect">
+              <a:avLst/>
+            </a:prstGeom>
+            <a:noFill/>
+            <a:ln w="38100">
+              <a:solidFill>
+                <a:schemeClr val="tx1"/>
+              </a:solidFill>
+              <a:miter lim="800000"/>
+              <a:headEnd/>
+              <a:tailEnd/>
+            </a:ln>
+            <a:extLst>
+              <a:ext uri="{909E8E84-426E-40DD-AFC4-6F175D3DCCD1}">
+                <a14:hiddenFill xmlns:a14="http://schemas.microsoft.com/office/drawing/2010/main">
+                  <a:solidFill>
+                    <a:srgbClr val="FFFFFF"/>
+                  </a:solidFill>
+                </a14:hiddenFill>
+              </a:ext>
+            </a:extLst>
+          </p:spPr>
+          <p:txBody>
+            <a:bodyPr wrap="square">
+              <a:spAutoFit/>
+            </a:bodyPr>
+            <a:lstStyle>
+              <a:lvl1pPr eaLnBrk="0" hangingPunct="0">
+                <a:defRPr sz="2400">
+                  <a:solidFill>
+                    <a:schemeClr val="tx1"/>
+                  </a:solidFill>
+                  <a:latin typeface="Calibri" charset="0"/>
+                  <a:ea typeface="ＭＳ Ｐゴシック" charset="-128"/>
+                </a:defRPr>
+              </a:lvl1pPr>
+              <a:lvl2pPr marL="742950" indent="-285750" eaLnBrk="0" hangingPunct="0">
+                <a:defRPr sz="2400">
+                  <a:solidFill>
+                    <a:schemeClr val="tx1"/>
+                  </a:solidFill>
+                  <a:latin typeface="Calibri" charset="0"/>
+                  <a:ea typeface="ＭＳ Ｐゴシック" charset="-128"/>
+                </a:defRPr>
+              </a:lvl2pPr>
+              <a:lvl3pPr marL="1143000" indent="-228600" eaLnBrk="0" hangingPunct="0">
+                <a:defRPr sz="2400">
+                  <a:solidFill>
+                    <a:schemeClr val="tx1"/>
+                  </a:solidFill>
+                  <a:latin typeface="Calibri" charset="0"/>
+                  <a:ea typeface="ＭＳ Ｐゴシック" charset="-128"/>
+                </a:defRPr>
+              </a:lvl3pPr>
+              <a:lvl4pPr marL="1600200" indent="-228600" eaLnBrk="0" hangingPunct="0">
+                <a:defRPr sz="2400">
+                  <a:solidFill>
+                    <a:schemeClr val="tx1"/>
+                  </a:solidFill>
+                  <a:latin typeface="Calibri" charset="0"/>
+                  <a:ea typeface="ＭＳ Ｐゴシック" charset="-128"/>
+                </a:defRPr>
+              </a:lvl4pPr>
+              <a:lvl5pPr marL="2057400" indent="-228600" eaLnBrk="0" hangingPunct="0">
+                <a:defRPr sz="2400">
+                  <a:solidFill>
+                    <a:schemeClr val="tx1"/>
+                  </a:solidFill>
+                  <a:latin typeface="Calibri" charset="0"/>
+                  <a:ea typeface="ＭＳ Ｐゴシック" charset="-128"/>
+                </a:defRPr>
+              </a:lvl5pPr>
+              <a:lvl6pPr marL="2514600" indent="-228600" defTabSz="457200" eaLnBrk="0" fontAlgn="base" hangingPunct="0">
+                <a:spcBef>
+                  <a:spcPct val="0"/>
+                </a:spcBef>
+                <a:spcAft>
+                  <a:spcPct val="0"/>
+                </a:spcAft>
+                <a:defRPr sz="2400">
+                  <a:solidFill>
+                    <a:schemeClr val="tx1"/>
+                  </a:solidFill>
+                  <a:latin typeface="Calibri" charset="0"/>
+                  <a:ea typeface="ＭＳ Ｐゴシック" charset="-128"/>
+                </a:defRPr>
+              </a:lvl6pPr>
+              <a:lvl7pPr marL="2971800" indent="-228600" defTabSz="457200" eaLnBrk="0" fontAlgn="base" hangingPunct="0">
+                <a:spcBef>
+                  <a:spcPct val="0"/>
+                </a:spcBef>
+                <a:spcAft>
+                  <a:spcPct val="0"/>
+                </a:spcAft>
+                <a:defRPr sz="2400">
+                  <a:solidFill>
+                    <a:schemeClr val="tx1"/>
+                  </a:solidFill>
+                  <a:latin typeface="Calibri" charset="0"/>
+                  <a:ea typeface="ＭＳ Ｐゴシック" charset="-128"/>
+                </a:defRPr>
+              </a:lvl7pPr>
+              <a:lvl8pPr marL="3429000" indent="-228600" defTabSz="457200" eaLnBrk="0" fontAlgn="base" hangingPunct="0">
+                <a:spcBef>
+                  <a:spcPct val="0"/>
+                </a:spcBef>
+                <a:spcAft>
+                  <a:spcPct val="0"/>
+                </a:spcAft>
+                <a:defRPr sz="2400">
+                  <a:solidFill>
+                    <a:schemeClr val="tx1"/>
+                  </a:solidFill>
+                  <a:latin typeface="Calibri" charset="0"/>
+                  <a:ea typeface="ＭＳ Ｐゴシック" charset="-128"/>
+                </a:defRPr>
+              </a:lvl8pPr>
+              <a:lvl9pPr marL="3886200" indent="-228600" defTabSz="457200" eaLnBrk="0" fontAlgn="base" hangingPunct="0">
+                <a:spcBef>
+                  <a:spcPct val="0"/>
+                </a:spcBef>
+                <a:spcAft>
+                  <a:spcPct val="0"/>
+                </a:spcAft>
+                <a:defRPr sz="2400">
+                  <a:solidFill>
+                    <a:schemeClr val="tx1"/>
+                  </a:solidFill>
+                  <a:latin typeface="Calibri" charset="0"/>
+                  <a:ea typeface="ＭＳ Ｐゴシック" charset="-128"/>
+                </a:defRPr>
+              </a:lvl9pPr>
+            </a:lstStyle>
+            <a:p>
+              <a:pPr eaLnBrk="1" hangingPunct="1"/>
+              <a:r>
+                <a:rPr lang="en-US" altLang="en-US" sz="2000"/>
+                <a:t>MultipleChoiceQuestion</a:t>
+              </a:r>
+              <a:endParaRPr lang="en-US" altLang="en-US" sz="2000" dirty="0"/>
+            </a:p>
+          </p:txBody>
+        </p:sp>
+        <p:sp>
+          <p:nvSpPr>
+            <p:cNvPr id="51" name="TextBox 29">
+              <a:extLst>
+                <a:ext uri="{FF2B5EF4-FFF2-40B4-BE49-F238E27FC236}">
+                  <a16:creationId xmlns:a16="http://schemas.microsoft.com/office/drawing/2014/main" id="{9A3DB986-71F4-D74D-90AB-0008C6895020}"/>
+                </a:ext>
+              </a:extLst>
+            </p:cNvPr>
+            <p:cNvSpPr txBox="1">
+              <a:spLocks noChangeArrowheads="1"/>
+            </p:cNvSpPr>
+            <p:nvPr/>
+          </p:nvSpPr>
+          <p:spPr bwMode="auto">
+            <a:xfrm>
+              <a:off x="3897790" y="1712010"/>
+              <a:ext cx="3458441" cy="1938992"/>
+            </a:xfrm>
+            <a:prstGeom prst="rect">
+              <a:avLst/>
+            </a:prstGeom>
+            <a:noFill/>
+            <a:ln w="38100">
+              <a:solidFill>
+                <a:schemeClr val="tx1"/>
+              </a:solidFill>
+              <a:miter lim="800000"/>
+              <a:headEnd/>
+              <a:tailEnd/>
+            </a:ln>
+            <a:extLst>
+              <a:ext uri="{909E8E84-426E-40DD-AFC4-6F175D3DCCD1}">
+                <a14:hiddenFill xmlns:a14="http://schemas.microsoft.com/office/drawing/2010/main">
+                  <a:solidFill>
+                    <a:srgbClr val="FFFFFF"/>
+                  </a:solidFill>
+                </a14:hiddenFill>
+              </a:ext>
+            </a:extLst>
+          </p:spPr>
+          <p:txBody>
+            <a:bodyPr wrap="square">
+              <a:spAutoFit/>
+            </a:bodyPr>
+            <a:lstStyle>
+              <a:lvl1pPr eaLnBrk="0" hangingPunct="0">
+                <a:defRPr sz="2400">
+                  <a:solidFill>
+                    <a:schemeClr val="tx1"/>
+                  </a:solidFill>
+                  <a:latin typeface="Calibri" charset="0"/>
+                  <a:ea typeface="ＭＳ Ｐゴシック" charset="-128"/>
+                </a:defRPr>
+              </a:lvl1pPr>
+              <a:lvl2pPr marL="742950" indent="-285750" eaLnBrk="0" hangingPunct="0">
+                <a:defRPr sz="2400">
+                  <a:solidFill>
+                    <a:schemeClr val="tx1"/>
+                  </a:solidFill>
+                  <a:latin typeface="Calibri" charset="0"/>
+                  <a:ea typeface="ＭＳ Ｐゴシック" charset="-128"/>
+                </a:defRPr>
+              </a:lvl2pPr>
+              <a:lvl3pPr marL="1143000" indent="-228600" eaLnBrk="0" hangingPunct="0">
+                <a:defRPr sz="2400">
+                  <a:solidFill>
+                    <a:schemeClr val="tx1"/>
+                  </a:solidFill>
+                  <a:latin typeface="Calibri" charset="0"/>
+                  <a:ea typeface="ＭＳ Ｐゴシック" charset="-128"/>
+                </a:defRPr>
+              </a:lvl3pPr>
+              <a:lvl4pPr marL="1600200" indent="-228600" eaLnBrk="0" hangingPunct="0">
+                <a:defRPr sz="2400">
+                  <a:solidFill>
+                    <a:schemeClr val="tx1"/>
+                  </a:solidFill>
+                  <a:latin typeface="Calibri" charset="0"/>
+                  <a:ea typeface="ＭＳ Ｐゴシック" charset="-128"/>
+                </a:defRPr>
+              </a:lvl4pPr>
+              <a:lvl5pPr marL="2057400" indent="-228600" eaLnBrk="0" hangingPunct="0">
+                <a:defRPr sz="2400">
+                  <a:solidFill>
+                    <a:schemeClr val="tx1"/>
+                  </a:solidFill>
+                  <a:latin typeface="Calibri" charset="0"/>
+                  <a:ea typeface="ＭＳ Ｐゴシック" charset="-128"/>
+                </a:defRPr>
+              </a:lvl5pPr>
+              <a:lvl6pPr marL="2514600" indent="-228600" defTabSz="457200" eaLnBrk="0" fontAlgn="base" hangingPunct="0">
+                <a:spcBef>
+                  <a:spcPct val="0"/>
+                </a:spcBef>
+                <a:spcAft>
+                  <a:spcPct val="0"/>
+                </a:spcAft>
+                <a:defRPr sz="2400">
+                  <a:solidFill>
+                    <a:schemeClr val="tx1"/>
+                  </a:solidFill>
+                  <a:latin typeface="Calibri" charset="0"/>
+                  <a:ea typeface="ＭＳ Ｐゴシック" charset="-128"/>
+                </a:defRPr>
+              </a:lvl6pPr>
+              <a:lvl7pPr marL="2971800" indent="-228600" defTabSz="457200" eaLnBrk="0" fontAlgn="base" hangingPunct="0">
+                <a:spcBef>
+                  <a:spcPct val="0"/>
+                </a:spcBef>
+                <a:spcAft>
+                  <a:spcPct val="0"/>
+                </a:spcAft>
+                <a:defRPr sz="2400">
+                  <a:solidFill>
+                    <a:schemeClr val="tx1"/>
+                  </a:solidFill>
+                  <a:latin typeface="Calibri" charset="0"/>
+                  <a:ea typeface="ＭＳ Ｐゴシック" charset="-128"/>
+                </a:defRPr>
+              </a:lvl7pPr>
+              <a:lvl8pPr marL="3429000" indent="-228600" defTabSz="457200" eaLnBrk="0" fontAlgn="base" hangingPunct="0">
+                <a:spcBef>
+                  <a:spcPct val="0"/>
+                </a:spcBef>
+                <a:spcAft>
+                  <a:spcPct val="0"/>
+                </a:spcAft>
+                <a:defRPr sz="2400">
+                  <a:solidFill>
+                    <a:schemeClr val="tx1"/>
+                  </a:solidFill>
+                  <a:latin typeface="Calibri" charset="0"/>
+                  <a:ea typeface="ＭＳ Ｐゴシック" charset="-128"/>
+                </a:defRPr>
+              </a:lvl8pPr>
+              <a:lvl9pPr marL="3886200" indent="-228600" defTabSz="457200" eaLnBrk="0" fontAlgn="base" hangingPunct="0">
+                <a:spcBef>
+                  <a:spcPct val="0"/>
+                </a:spcBef>
+                <a:spcAft>
+                  <a:spcPct val="0"/>
+                </a:spcAft>
+                <a:defRPr sz="2400">
+                  <a:solidFill>
+                    <a:schemeClr val="tx1"/>
+                  </a:solidFill>
+                  <a:latin typeface="Calibri" charset="0"/>
+                  <a:ea typeface="ＭＳ Ｐゴシック" charset="-128"/>
+                </a:defRPr>
+              </a:lvl9pPr>
+            </a:lstStyle>
+            <a:p>
+              <a:pPr eaLnBrk="1" hangingPunct="1"/>
+              <a:r>
+                <a:rPr lang="en-US" altLang="en-US" sz="2000" dirty="0"/>
+                <a:t>question : string</a:t>
+              </a:r>
+            </a:p>
+            <a:p>
+              <a:pPr eaLnBrk="1" hangingPunct="1"/>
+              <a:r>
+                <a:rPr lang="en-US" altLang="en-US" sz="2000" dirty="0"/>
+                <a:t>answer : string</a:t>
+              </a:r>
+            </a:p>
+            <a:p>
+              <a:pPr eaLnBrk="1" hangingPunct="1"/>
+              <a:r>
+                <a:rPr lang="en-US" altLang="en-US" sz="2000" dirty="0"/>
+                <a:t>distractor_1 : string</a:t>
+              </a:r>
+            </a:p>
+            <a:p>
+              <a:pPr eaLnBrk="1" hangingPunct="1"/>
+              <a:r>
+                <a:rPr lang="en-US" altLang="en-US" sz="2000" dirty="0"/>
+                <a:t>distractor_2 : string</a:t>
+              </a:r>
+            </a:p>
+            <a:p>
+              <a:pPr eaLnBrk="1" hangingPunct="1"/>
+              <a:r>
+                <a:rPr lang="en-US" altLang="en-US" sz="2000" dirty="0"/>
+                <a:t>distractor_3 : string</a:t>
+              </a:r>
+            </a:p>
+            <a:p>
+              <a:pPr eaLnBrk="1" hangingPunct="1"/>
+              <a:r>
+                <a:rPr lang="en-US" altLang="en-US" sz="2000" dirty="0"/>
+                <a:t>distractor_4 : string</a:t>
+              </a:r>
+            </a:p>
+          </p:txBody>
+        </p:sp>
+      </p:grpSp>
+      <p:grpSp>
+        <p:nvGrpSpPr>
+          <p:cNvPr id="5" name="Group 4">
+            <a:extLst>
+              <a:ext uri="{FF2B5EF4-FFF2-40B4-BE49-F238E27FC236}">
+                <a16:creationId xmlns:a16="http://schemas.microsoft.com/office/drawing/2014/main" id="{17553D60-DE0D-0C45-BECD-732F87913EF7}"/>
+              </a:ext>
+            </a:extLst>
+          </p:cNvPr>
+          <p:cNvGrpSpPr/>
+          <p:nvPr/>
+        </p:nvGrpSpPr>
+        <p:grpSpPr>
+          <a:xfrm>
+            <a:off x="4664356" y="2259449"/>
+            <a:ext cx="1947219" cy="1107996"/>
+            <a:chOff x="3897790" y="1311900"/>
+            <a:chExt cx="3458441" cy="1107996"/>
+          </a:xfrm>
+        </p:grpSpPr>
+        <p:sp>
+          <p:nvSpPr>
+            <p:cNvPr id="6" name="TextBox 29">
+              <a:extLst>
+                <a:ext uri="{FF2B5EF4-FFF2-40B4-BE49-F238E27FC236}">
+                  <a16:creationId xmlns:a16="http://schemas.microsoft.com/office/drawing/2014/main" id="{F486DF5F-BEE6-6045-AC63-7E6477A3415B}"/>
+                </a:ext>
+              </a:extLst>
+            </p:cNvPr>
+            <p:cNvSpPr txBox="1">
+              <a:spLocks noChangeArrowheads="1"/>
+            </p:cNvSpPr>
+            <p:nvPr/>
+          </p:nvSpPr>
+          <p:spPr bwMode="auto">
+            <a:xfrm>
+              <a:off x="3897790" y="1311900"/>
+              <a:ext cx="3458441" cy="400110"/>
+            </a:xfrm>
+            <a:prstGeom prst="rect">
+              <a:avLst/>
+            </a:prstGeom>
+            <a:noFill/>
+            <a:ln w="38100">
+              <a:solidFill>
+                <a:schemeClr val="tx1"/>
+              </a:solidFill>
+              <a:miter lim="800000"/>
+              <a:headEnd/>
+              <a:tailEnd/>
+            </a:ln>
+            <a:extLst>
+              <a:ext uri="{909E8E84-426E-40DD-AFC4-6F175D3DCCD1}">
+                <a14:hiddenFill xmlns:a14="http://schemas.microsoft.com/office/drawing/2010/main">
+                  <a:solidFill>
+                    <a:srgbClr val="FFFFFF"/>
+                  </a:solidFill>
+                </a14:hiddenFill>
+              </a:ext>
+            </a:extLst>
+          </p:spPr>
+          <p:txBody>
+            <a:bodyPr wrap="square">
+              <a:spAutoFit/>
+            </a:bodyPr>
+            <a:lstStyle>
+              <a:lvl1pPr eaLnBrk="0" hangingPunct="0">
+                <a:defRPr sz="2400">
+                  <a:solidFill>
+                    <a:schemeClr val="tx1"/>
+                  </a:solidFill>
+                  <a:latin typeface="Calibri" charset="0"/>
+                  <a:ea typeface="ＭＳ Ｐゴシック" charset="-128"/>
+                </a:defRPr>
+              </a:lvl1pPr>
+              <a:lvl2pPr marL="742950" indent="-285750" eaLnBrk="0" hangingPunct="0">
+                <a:defRPr sz="2400">
+                  <a:solidFill>
+                    <a:schemeClr val="tx1"/>
+                  </a:solidFill>
+                  <a:latin typeface="Calibri" charset="0"/>
+                  <a:ea typeface="ＭＳ Ｐゴシック" charset="-128"/>
+                </a:defRPr>
+              </a:lvl2pPr>
+              <a:lvl3pPr marL="1143000" indent="-228600" eaLnBrk="0" hangingPunct="0">
+                <a:defRPr sz="2400">
+                  <a:solidFill>
+                    <a:schemeClr val="tx1"/>
+                  </a:solidFill>
+                  <a:latin typeface="Calibri" charset="0"/>
+                  <a:ea typeface="ＭＳ Ｐゴシック" charset="-128"/>
+                </a:defRPr>
+              </a:lvl3pPr>
+              <a:lvl4pPr marL="1600200" indent="-228600" eaLnBrk="0" hangingPunct="0">
+                <a:defRPr sz="2400">
+                  <a:solidFill>
+                    <a:schemeClr val="tx1"/>
+                  </a:solidFill>
+                  <a:latin typeface="Calibri" charset="0"/>
+                  <a:ea typeface="ＭＳ Ｐゴシック" charset="-128"/>
+                </a:defRPr>
+              </a:lvl4pPr>
+              <a:lvl5pPr marL="2057400" indent="-228600" eaLnBrk="0" hangingPunct="0">
+                <a:defRPr sz="2400">
+                  <a:solidFill>
+                    <a:schemeClr val="tx1"/>
+                  </a:solidFill>
+                  <a:latin typeface="Calibri" charset="0"/>
+                  <a:ea typeface="ＭＳ Ｐゴシック" charset="-128"/>
+                </a:defRPr>
+              </a:lvl5pPr>
+              <a:lvl6pPr marL="2514600" indent="-228600" defTabSz="457200" eaLnBrk="0" fontAlgn="base" hangingPunct="0">
+                <a:spcBef>
+                  <a:spcPct val="0"/>
+                </a:spcBef>
+                <a:spcAft>
+                  <a:spcPct val="0"/>
+                </a:spcAft>
+                <a:defRPr sz="2400">
+                  <a:solidFill>
+                    <a:schemeClr val="tx1"/>
+                  </a:solidFill>
+                  <a:latin typeface="Calibri" charset="0"/>
+                  <a:ea typeface="ＭＳ Ｐゴシック" charset="-128"/>
+                </a:defRPr>
+              </a:lvl6pPr>
+              <a:lvl7pPr marL="2971800" indent="-228600" defTabSz="457200" eaLnBrk="0" fontAlgn="base" hangingPunct="0">
+                <a:spcBef>
+                  <a:spcPct val="0"/>
+                </a:spcBef>
+                <a:spcAft>
+                  <a:spcPct val="0"/>
+                </a:spcAft>
+                <a:defRPr sz="2400">
+                  <a:solidFill>
+                    <a:schemeClr val="tx1"/>
+                  </a:solidFill>
+                  <a:latin typeface="Calibri" charset="0"/>
+                  <a:ea typeface="ＭＳ Ｐゴシック" charset="-128"/>
+                </a:defRPr>
+              </a:lvl7pPr>
+              <a:lvl8pPr marL="3429000" indent="-228600" defTabSz="457200" eaLnBrk="0" fontAlgn="base" hangingPunct="0">
+                <a:spcBef>
+                  <a:spcPct val="0"/>
+                </a:spcBef>
+                <a:spcAft>
+                  <a:spcPct val="0"/>
+                </a:spcAft>
+                <a:defRPr sz="2400">
+                  <a:solidFill>
+                    <a:schemeClr val="tx1"/>
+                  </a:solidFill>
+                  <a:latin typeface="Calibri" charset="0"/>
+                  <a:ea typeface="ＭＳ Ｐゴシック" charset="-128"/>
+                </a:defRPr>
+              </a:lvl8pPr>
+              <a:lvl9pPr marL="3886200" indent="-228600" defTabSz="457200" eaLnBrk="0" fontAlgn="base" hangingPunct="0">
+                <a:spcBef>
+                  <a:spcPct val="0"/>
+                </a:spcBef>
+                <a:spcAft>
+                  <a:spcPct val="0"/>
+                </a:spcAft>
+                <a:defRPr sz="2400">
+                  <a:solidFill>
+                    <a:schemeClr val="tx1"/>
+                  </a:solidFill>
+                  <a:latin typeface="Calibri" charset="0"/>
+                  <a:ea typeface="ＭＳ Ｐゴシック" charset="-128"/>
+                </a:defRPr>
+              </a:lvl9pPr>
+            </a:lstStyle>
+            <a:p>
+              <a:pPr eaLnBrk="1" hangingPunct="1"/>
+              <a:r>
+                <a:rPr lang="en-US" altLang="en-US" sz="2000" dirty="0"/>
+                <a:t>Quiz</a:t>
+              </a:r>
+            </a:p>
+          </p:txBody>
+        </p:sp>
+        <p:sp>
+          <p:nvSpPr>
+            <p:cNvPr id="7" name="TextBox 29">
+              <a:extLst>
+                <a:ext uri="{FF2B5EF4-FFF2-40B4-BE49-F238E27FC236}">
+                  <a16:creationId xmlns:a16="http://schemas.microsoft.com/office/drawing/2014/main" id="{7F9CCB82-B13A-9743-8F66-FF620E65F5C5}"/>
+                </a:ext>
+              </a:extLst>
+            </p:cNvPr>
+            <p:cNvSpPr txBox="1">
+              <a:spLocks noChangeArrowheads="1"/>
+            </p:cNvSpPr>
+            <p:nvPr/>
+          </p:nvSpPr>
+          <p:spPr bwMode="auto">
+            <a:xfrm>
+              <a:off x="3897790" y="1712010"/>
+              <a:ext cx="3458441" cy="707886"/>
+            </a:xfrm>
+            <a:prstGeom prst="rect">
+              <a:avLst/>
+            </a:prstGeom>
+            <a:noFill/>
+            <a:ln w="38100">
+              <a:solidFill>
+                <a:schemeClr val="tx1"/>
+              </a:solidFill>
+              <a:miter lim="800000"/>
+              <a:headEnd/>
+              <a:tailEnd/>
+            </a:ln>
+            <a:extLst>
+              <a:ext uri="{909E8E84-426E-40DD-AFC4-6F175D3DCCD1}">
+                <a14:hiddenFill xmlns:a14="http://schemas.microsoft.com/office/drawing/2010/main">
+                  <a:solidFill>
+                    <a:srgbClr val="FFFFFF"/>
+                  </a:solidFill>
+                </a14:hiddenFill>
+              </a:ext>
+            </a:extLst>
+          </p:spPr>
+          <p:txBody>
+            <a:bodyPr wrap="square">
+              <a:spAutoFit/>
+            </a:bodyPr>
+            <a:lstStyle>
+              <a:lvl1pPr eaLnBrk="0" hangingPunct="0">
+                <a:defRPr sz="2400">
+                  <a:solidFill>
+                    <a:schemeClr val="tx1"/>
+                  </a:solidFill>
+                  <a:latin typeface="Calibri" charset="0"/>
+                  <a:ea typeface="ＭＳ Ｐゴシック" charset="-128"/>
+                </a:defRPr>
+              </a:lvl1pPr>
+              <a:lvl2pPr marL="742950" indent="-285750" eaLnBrk="0" hangingPunct="0">
+                <a:defRPr sz="2400">
+                  <a:solidFill>
+                    <a:schemeClr val="tx1"/>
+                  </a:solidFill>
+                  <a:latin typeface="Calibri" charset="0"/>
+                  <a:ea typeface="ＭＳ Ｐゴシック" charset="-128"/>
+                </a:defRPr>
+              </a:lvl2pPr>
+              <a:lvl3pPr marL="1143000" indent="-228600" eaLnBrk="0" hangingPunct="0">
+                <a:defRPr sz="2400">
+                  <a:solidFill>
+                    <a:schemeClr val="tx1"/>
+                  </a:solidFill>
+                  <a:latin typeface="Calibri" charset="0"/>
+                  <a:ea typeface="ＭＳ Ｐゴシック" charset="-128"/>
+                </a:defRPr>
+              </a:lvl3pPr>
+              <a:lvl4pPr marL="1600200" indent="-228600" eaLnBrk="0" hangingPunct="0">
+                <a:defRPr sz="2400">
+                  <a:solidFill>
+                    <a:schemeClr val="tx1"/>
+                  </a:solidFill>
+                  <a:latin typeface="Calibri" charset="0"/>
+                  <a:ea typeface="ＭＳ Ｐゴシック" charset="-128"/>
+                </a:defRPr>
+              </a:lvl4pPr>
+              <a:lvl5pPr marL="2057400" indent="-228600" eaLnBrk="0" hangingPunct="0">
+                <a:defRPr sz="2400">
+                  <a:solidFill>
+                    <a:schemeClr val="tx1"/>
+                  </a:solidFill>
+                  <a:latin typeface="Calibri" charset="0"/>
+                  <a:ea typeface="ＭＳ Ｐゴシック" charset="-128"/>
+                </a:defRPr>
+              </a:lvl5pPr>
+              <a:lvl6pPr marL="2514600" indent="-228600" defTabSz="457200" eaLnBrk="0" fontAlgn="base" hangingPunct="0">
+                <a:spcBef>
+                  <a:spcPct val="0"/>
+                </a:spcBef>
+                <a:spcAft>
+                  <a:spcPct val="0"/>
+                </a:spcAft>
+                <a:defRPr sz="2400">
+                  <a:solidFill>
+                    <a:schemeClr val="tx1"/>
+                  </a:solidFill>
+                  <a:latin typeface="Calibri" charset="0"/>
+                  <a:ea typeface="ＭＳ Ｐゴシック" charset="-128"/>
+                </a:defRPr>
+              </a:lvl6pPr>
+              <a:lvl7pPr marL="2971800" indent="-228600" defTabSz="457200" eaLnBrk="0" fontAlgn="base" hangingPunct="0">
+                <a:spcBef>
+                  <a:spcPct val="0"/>
+                </a:spcBef>
+                <a:spcAft>
+                  <a:spcPct val="0"/>
+                </a:spcAft>
+                <a:defRPr sz="2400">
+                  <a:solidFill>
+                    <a:schemeClr val="tx1"/>
+                  </a:solidFill>
+                  <a:latin typeface="Calibri" charset="0"/>
+                  <a:ea typeface="ＭＳ Ｐゴシック" charset="-128"/>
+                </a:defRPr>
+              </a:lvl7pPr>
+              <a:lvl8pPr marL="3429000" indent="-228600" defTabSz="457200" eaLnBrk="0" fontAlgn="base" hangingPunct="0">
+                <a:spcBef>
+                  <a:spcPct val="0"/>
+                </a:spcBef>
+                <a:spcAft>
+                  <a:spcPct val="0"/>
+                </a:spcAft>
+                <a:defRPr sz="2400">
+                  <a:solidFill>
+                    <a:schemeClr val="tx1"/>
+                  </a:solidFill>
+                  <a:latin typeface="Calibri" charset="0"/>
+                  <a:ea typeface="ＭＳ Ｐゴシック" charset="-128"/>
+                </a:defRPr>
+              </a:lvl8pPr>
+              <a:lvl9pPr marL="3886200" indent="-228600" defTabSz="457200" eaLnBrk="0" fontAlgn="base" hangingPunct="0">
+                <a:spcBef>
+                  <a:spcPct val="0"/>
+                </a:spcBef>
+                <a:spcAft>
+                  <a:spcPct val="0"/>
+                </a:spcAft>
+                <a:defRPr sz="2400">
+                  <a:solidFill>
+                    <a:schemeClr val="tx1"/>
+                  </a:solidFill>
+                  <a:latin typeface="Calibri" charset="0"/>
+                  <a:ea typeface="ＭＳ Ｐゴシック" charset="-128"/>
+                </a:defRPr>
+              </a:lvl9pPr>
+            </a:lstStyle>
+            <a:p>
+              <a:pPr eaLnBrk="1" hangingPunct="1"/>
+              <a:r>
+                <a:rPr lang="en-US" altLang="en-US" sz="2000" dirty="0"/>
+                <a:t>title : string</a:t>
+              </a:r>
+            </a:p>
+            <a:p>
+              <a:pPr eaLnBrk="1" hangingPunct="1"/>
+              <a:r>
+                <a:rPr lang="en-US" altLang="en-US" sz="2000" dirty="0"/>
+                <a:t>description : text</a:t>
+              </a:r>
+            </a:p>
+          </p:txBody>
+        </p:sp>
+      </p:grpSp>
+      <p:cxnSp>
+        <p:nvCxnSpPr>
+          <p:cNvPr id="4" name="Straight Connector 3">
+            <a:extLst>
+              <a:ext uri="{FF2B5EF4-FFF2-40B4-BE49-F238E27FC236}">
+                <a16:creationId xmlns:a16="http://schemas.microsoft.com/office/drawing/2014/main" id="{53F90975-DC21-1E4E-9983-1D92EE59CFCF}"/>
+              </a:ext>
+            </a:extLst>
+          </p:cNvPr>
+          <p:cNvCxnSpPr>
+            <a:cxnSpLocks/>
+            <a:stCxn id="7" idx="3"/>
+          </p:cNvCxnSpPr>
+          <p:nvPr/>
+        </p:nvCxnSpPr>
+        <p:spPr>
+          <a:xfrm>
+            <a:off x="6611575" y="3013502"/>
+            <a:ext cx="2603906" cy="0"/>
+          </a:xfrm>
+          <a:prstGeom prst="line">
+            <a:avLst/>
+          </a:prstGeom>
+          <a:ln w="38100">
+            <a:solidFill>
+              <a:schemeClr val="tx1"/>
+            </a:solidFill>
+          </a:ln>
+        </p:spPr>
+        <p:style>
+          <a:lnRef idx="1">
+            <a:schemeClr val="accent1"/>
+          </a:lnRef>
+          <a:fillRef idx="0">
+            <a:schemeClr val="accent1"/>
+          </a:fillRef>
+          <a:effectRef idx="0">
+            <a:schemeClr val="accent1"/>
+          </a:effectRef>
+          <a:fontRef idx="minor">
+            <a:schemeClr val="tx1"/>
+          </a:fontRef>
+        </p:style>
+      </p:cxnSp>
+      <p:sp>
+        <p:nvSpPr>
+          <p:cNvPr id="8" name="TextBox 7">
+            <a:extLst>
+              <a:ext uri="{FF2B5EF4-FFF2-40B4-BE49-F238E27FC236}">
+                <a16:creationId xmlns:a16="http://schemas.microsoft.com/office/drawing/2014/main" id="{B2DEAD67-0DA9-0547-B18D-D0C4F801F4C9}"/>
+              </a:ext>
+            </a:extLst>
+          </p:cNvPr>
+          <p:cNvSpPr txBox="1"/>
+          <p:nvPr/>
+        </p:nvSpPr>
+        <p:spPr>
+          <a:xfrm>
+            <a:off x="7502197" y="2641978"/>
+            <a:ext cx="822661" cy="400110"/>
+          </a:xfrm>
+          <a:prstGeom prst="rect">
+            <a:avLst/>
+          </a:prstGeom>
+          <a:noFill/>
+        </p:spPr>
+        <p:txBody>
+          <a:bodyPr wrap="none" rtlCol="0">
+            <a:spAutoFit/>
+          </a:bodyPr>
+          <a:lstStyle/>
+          <a:p>
+            <a:r>
+              <a:rPr lang="en-US" sz="2000" dirty="0"/>
+              <a:t>has ▶︎</a:t>
+            </a:r>
+          </a:p>
+        </p:txBody>
+      </p:sp>
+      <p:sp>
+        <p:nvSpPr>
+          <p:cNvPr id="9" name="TextBox 8">
+            <a:extLst>
+              <a:ext uri="{FF2B5EF4-FFF2-40B4-BE49-F238E27FC236}">
+                <a16:creationId xmlns:a16="http://schemas.microsoft.com/office/drawing/2014/main" id="{39A1805D-E63F-BC47-9A92-D5ADB1D18DA5}"/>
+              </a:ext>
+            </a:extLst>
+          </p:cNvPr>
+          <p:cNvSpPr txBox="1"/>
+          <p:nvPr/>
+        </p:nvSpPr>
+        <p:spPr>
+          <a:xfrm>
+            <a:off x="8158599" y="2656945"/>
+            <a:ext cx="1095493" cy="707886"/>
+          </a:xfrm>
+          <a:prstGeom prst="rect">
+            <a:avLst/>
+          </a:prstGeom>
+          <a:noFill/>
+        </p:spPr>
+        <p:txBody>
+          <a:bodyPr wrap="none" rtlCol="0">
+            <a:spAutoFit/>
+          </a:bodyPr>
+          <a:lstStyle/>
+          <a:p>
+            <a:pPr algn="r"/>
+            <a:r>
+              <a:rPr lang="en-US" sz="2000" dirty="0"/>
+              <a:t>*</a:t>
+            </a:r>
+          </a:p>
+          <a:p>
+            <a:pPr algn="r"/>
+            <a:r>
+              <a:rPr lang="en-US" sz="2000" dirty="0"/>
+              <a:t>question</a:t>
+            </a:r>
+          </a:p>
+        </p:txBody>
+      </p:sp>
+      <p:sp>
+        <p:nvSpPr>
+          <p:cNvPr id="12" name="TextBox 11">
+            <a:extLst>
+              <a:ext uri="{FF2B5EF4-FFF2-40B4-BE49-F238E27FC236}">
+                <a16:creationId xmlns:a16="http://schemas.microsoft.com/office/drawing/2014/main" id="{60BA148A-124B-5D45-B44B-7B8B12D3BB6C}"/>
+              </a:ext>
+            </a:extLst>
+          </p:cNvPr>
+          <p:cNvSpPr txBox="1"/>
+          <p:nvPr/>
+        </p:nvSpPr>
+        <p:spPr>
+          <a:xfrm>
+            <a:off x="6617414" y="2654170"/>
+            <a:ext cx="614271" cy="707886"/>
+          </a:xfrm>
+          <a:prstGeom prst="rect">
+            <a:avLst/>
+          </a:prstGeom>
+          <a:noFill/>
+        </p:spPr>
+        <p:txBody>
+          <a:bodyPr wrap="none" rtlCol="0">
+            <a:spAutoFit/>
+          </a:bodyPr>
+          <a:lstStyle/>
+          <a:p>
+            <a:r>
+              <a:rPr lang="en-US" sz="2000" dirty="0"/>
+              <a:t>1</a:t>
+            </a:r>
+          </a:p>
+          <a:p>
+            <a:r>
+              <a:rPr lang="en-US" sz="2000" dirty="0"/>
+              <a:t>quiz</a:t>
+            </a:r>
+          </a:p>
+        </p:txBody>
+      </p:sp>
+      <p:grpSp>
+        <p:nvGrpSpPr>
+          <p:cNvPr id="13" name="Group 12">
+            <a:extLst>
+              <a:ext uri="{FF2B5EF4-FFF2-40B4-BE49-F238E27FC236}">
+                <a16:creationId xmlns:a16="http://schemas.microsoft.com/office/drawing/2014/main" id="{AD597AF0-32CA-0140-981F-57F887EB1D75}"/>
+              </a:ext>
+            </a:extLst>
+          </p:cNvPr>
+          <p:cNvGrpSpPr/>
+          <p:nvPr/>
+        </p:nvGrpSpPr>
+        <p:grpSpPr>
+          <a:xfrm>
+            <a:off x="113231" y="2259449"/>
+            <a:ext cx="1947218" cy="1107996"/>
+            <a:chOff x="3897790" y="1311900"/>
+            <a:chExt cx="3458441" cy="1107996"/>
+          </a:xfrm>
+        </p:grpSpPr>
+        <p:sp>
+          <p:nvSpPr>
+            <p:cNvPr id="14" name="TextBox 29">
+              <a:extLst>
+                <a:ext uri="{FF2B5EF4-FFF2-40B4-BE49-F238E27FC236}">
+                  <a16:creationId xmlns:a16="http://schemas.microsoft.com/office/drawing/2014/main" id="{1F026FC9-5657-AE46-8EDE-5B1826BCF973}"/>
+                </a:ext>
+              </a:extLst>
+            </p:cNvPr>
+            <p:cNvSpPr txBox="1">
+              <a:spLocks noChangeArrowheads="1"/>
+            </p:cNvSpPr>
+            <p:nvPr/>
+          </p:nvSpPr>
+          <p:spPr bwMode="auto">
+            <a:xfrm>
+              <a:off x="3897790" y="1311900"/>
+              <a:ext cx="3458441" cy="400110"/>
+            </a:xfrm>
+            <a:prstGeom prst="rect">
+              <a:avLst/>
+            </a:prstGeom>
+            <a:noFill/>
+            <a:ln w="38100">
+              <a:solidFill>
+                <a:schemeClr val="tx1"/>
+              </a:solidFill>
+              <a:miter lim="800000"/>
+              <a:headEnd/>
+              <a:tailEnd/>
+            </a:ln>
+            <a:extLst>
+              <a:ext uri="{909E8E84-426E-40DD-AFC4-6F175D3DCCD1}">
+                <a14:hiddenFill xmlns:a14="http://schemas.microsoft.com/office/drawing/2010/main">
+                  <a:solidFill>
+                    <a:srgbClr val="FFFFFF"/>
+                  </a:solidFill>
+                </a14:hiddenFill>
+              </a:ext>
+            </a:extLst>
+          </p:spPr>
+          <p:txBody>
+            <a:bodyPr wrap="square">
+              <a:spAutoFit/>
+            </a:bodyPr>
+            <a:lstStyle>
+              <a:lvl1pPr eaLnBrk="0" hangingPunct="0">
+                <a:defRPr sz="2400">
+                  <a:solidFill>
+                    <a:schemeClr val="tx1"/>
+                  </a:solidFill>
+                  <a:latin typeface="Calibri" charset="0"/>
+                  <a:ea typeface="ＭＳ Ｐゴシック" charset="-128"/>
+                </a:defRPr>
+              </a:lvl1pPr>
+              <a:lvl2pPr marL="742950" indent="-285750" eaLnBrk="0" hangingPunct="0">
+                <a:defRPr sz="2400">
+                  <a:solidFill>
+                    <a:schemeClr val="tx1"/>
+                  </a:solidFill>
+                  <a:latin typeface="Calibri" charset="0"/>
+                  <a:ea typeface="ＭＳ Ｐゴシック" charset="-128"/>
+                </a:defRPr>
+              </a:lvl2pPr>
+              <a:lvl3pPr marL="1143000" indent="-228600" eaLnBrk="0" hangingPunct="0">
+                <a:defRPr sz="2400">
+                  <a:solidFill>
+                    <a:schemeClr val="tx1"/>
+                  </a:solidFill>
+                  <a:latin typeface="Calibri" charset="0"/>
+                  <a:ea typeface="ＭＳ Ｐゴシック" charset="-128"/>
+                </a:defRPr>
+              </a:lvl3pPr>
+              <a:lvl4pPr marL="1600200" indent="-228600" eaLnBrk="0" hangingPunct="0">
+                <a:defRPr sz="2400">
+                  <a:solidFill>
+                    <a:schemeClr val="tx1"/>
+                  </a:solidFill>
+                  <a:latin typeface="Calibri" charset="0"/>
+                  <a:ea typeface="ＭＳ Ｐゴシック" charset="-128"/>
+                </a:defRPr>
+              </a:lvl4pPr>
+              <a:lvl5pPr marL="2057400" indent="-228600" eaLnBrk="0" hangingPunct="0">
+                <a:defRPr sz="2400">
+                  <a:solidFill>
+                    <a:schemeClr val="tx1"/>
+                  </a:solidFill>
+                  <a:latin typeface="Calibri" charset="0"/>
+                  <a:ea typeface="ＭＳ Ｐゴシック" charset="-128"/>
+                </a:defRPr>
+              </a:lvl5pPr>
+              <a:lvl6pPr marL="2514600" indent="-228600" defTabSz="457200" eaLnBrk="0" fontAlgn="base" hangingPunct="0">
+                <a:spcBef>
+                  <a:spcPct val="0"/>
+                </a:spcBef>
+                <a:spcAft>
+                  <a:spcPct val="0"/>
+                </a:spcAft>
+                <a:defRPr sz="2400">
+                  <a:solidFill>
+                    <a:schemeClr val="tx1"/>
+                  </a:solidFill>
+                  <a:latin typeface="Calibri" charset="0"/>
+                  <a:ea typeface="ＭＳ Ｐゴシック" charset="-128"/>
+                </a:defRPr>
+              </a:lvl6pPr>
+              <a:lvl7pPr marL="2971800" indent="-228600" defTabSz="457200" eaLnBrk="0" fontAlgn="base" hangingPunct="0">
+                <a:spcBef>
+                  <a:spcPct val="0"/>
+                </a:spcBef>
+                <a:spcAft>
+                  <a:spcPct val="0"/>
+                </a:spcAft>
+                <a:defRPr sz="2400">
+                  <a:solidFill>
+                    <a:schemeClr val="tx1"/>
+                  </a:solidFill>
+                  <a:latin typeface="Calibri" charset="0"/>
+                  <a:ea typeface="ＭＳ Ｐゴシック" charset="-128"/>
+                </a:defRPr>
+              </a:lvl7pPr>
+              <a:lvl8pPr marL="3429000" indent="-228600" defTabSz="457200" eaLnBrk="0" fontAlgn="base" hangingPunct="0">
+                <a:spcBef>
+                  <a:spcPct val="0"/>
+                </a:spcBef>
+                <a:spcAft>
+                  <a:spcPct val="0"/>
+                </a:spcAft>
+                <a:defRPr sz="2400">
+                  <a:solidFill>
+                    <a:schemeClr val="tx1"/>
+                  </a:solidFill>
+                  <a:latin typeface="Calibri" charset="0"/>
+                  <a:ea typeface="ＭＳ Ｐゴシック" charset="-128"/>
+                </a:defRPr>
+              </a:lvl8pPr>
+              <a:lvl9pPr marL="3886200" indent="-228600" defTabSz="457200" eaLnBrk="0" fontAlgn="base" hangingPunct="0">
+                <a:spcBef>
+                  <a:spcPct val="0"/>
+                </a:spcBef>
+                <a:spcAft>
+                  <a:spcPct val="0"/>
+                </a:spcAft>
+                <a:defRPr sz="2400">
+                  <a:solidFill>
+                    <a:schemeClr val="tx1"/>
+                  </a:solidFill>
+                  <a:latin typeface="Calibri" charset="0"/>
+                  <a:ea typeface="ＭＳ Ｐゴシック" charset="-128"/>
+                </a:defRPr>
+              </a:lvl9pPr>
+            </a:lstStyle>
+            <a:p>
+              <a:pPr eaLnBrk="1" hangingPunct="1"/>
+              <a:r>
+                <a:rPr lang="en-US" altLang="en-US" sz="2000" dirty="0"/>
+                <a:t>User</a:t>
+              </a:r>
+            </a:p>
+          </p:txBody>
+        </p:sp>
+        <p:sp>
+          <p:nvSpPr>
+            <p:cNvPr id="15" name="TextBox 29">
+              <a:extLst>
+                <a:ext uri="{FF2B5EF4-FFF2-40B4-BE49-F238E27FC236}">
+                  <a16:creationId xmlns:a16="http://schemas.microsoft.com/office/drawing/2014/main" id="{46F7DD71-38B3-EF4C-BF9F-357C02020E31}"/>
+                </a:ext>
+              </a:extLst>
+            </p:cNvPr>
+            <p:cNvSpPr txBox="1">
+              <a:spLocks noChangeArrowheads="1"/>
+            </p:cNvSpPr>
+            <p:nvPr/>
+          </p:nvSpPr>
+          <p:spPr bwMode="auto">
+            <a:xfrm>
+              <a:off x="3897790" y="1712010"/>
+              <a:ext cx="3458441" cy="707886"/>
+            </a:xfrm>
+            <a:prstGeom prst="rect">
+              <a:avLst/>
+            </a:prstGeom>
+            <a:noFill/>
+            <a:ln w="38100">
+              <a:solidFill>
+                <a:schemeClr val="tx1"/>
+              </a:solidFill>
+              <a:miter lim="800000"/>
+              <a:headEnd/>
+              <a:tailEnd/>
+            </a:ln>
+            <a:extLst>
+              <a:ext uri="{909E8E84-426E-40DD-AFC4-6F175D3DCCD1}">
+                <a14:hiddenFill xmlns:a14="http://schemas.microsoft.com/office/drawing/2010/main">
+                  <a:solidFill>
+                    <a:srgbClr val="FFFFFF"/>
+                  </a:solidFill>
+                </a14:hiddenFill>
+              </a:ext>
+            </a:extLst>
+          </p:spPr>
+          <p:txBody>
+            <a:bodyPr wrap="square">
+              <a:spAutoFit/>
+            </a:bodyPr>
+            <a:lstStyle>
+              <a:lvl1pPr eaLnBrk="0" hangingPunct="0">
+                <a:defRPr sz="2400">
+                  <a:solidFill>
+                    <a:schemeClr val="tx1"/>
+                  </a:solidFill>
+                  <a:latin typeface="Calibri" charset="0"/>
+                  <a:ea typeface="ＭＳ Ｐゴシック" charset="-128"/>
+                </a:defRPr>
+              </a:lvl1pPr>
+              <a:lvl2pPr marL="742950" indent="-285750" eaLnBrk="0" hangingPunct="0">
+                <a:defRPr sz="2400">
+                  <a:solidFill>
+                    <a:schemeClr val="tx1"/>
+                  </a:solidFill>
+                  <a:latin typeface="Calibri" charset="0"/>
+                  <a:ea typeface="ＭＳ Ｐゴシック" charset="-128"/>
+                </a:defRPr>
+              </a:lvl2pPr>
+              <a:lvl3pPr marL="1143000" indent="-228600" eaLnBrk="0" hangingPunct="0">
+                <a:defRPr sz="2400">
+                  <a:solidFill>
+                    <a:schemeClr val="tx1"/>
+                  </a:solidFill>
+                  <a:latin typeface="Calibri" charset="0"/>
+                  <a:ea typeface="ＭＳ Ｐゴシック" charset="-128"/>
+                </a:defRPr>
+              </a:lvl3pPr>
+              <a:lvl4pPr marL="1600200" indent="-228600" eaLnBrk="0" hangingPunct="0">
+                <a:defRPr sz="2400">
+                  <a:solidFill>
+                    <a:schemeClr val="tx1"/>
+                  </a:solidFill>
+                  <a:latin typeface="Calibri" charset="0"/>
+                  <a:ea typeface="ＭＳ Ｐゴシック" charset="-128"/>
+                </a:defRPr>
+              </a:lvl4pPr>
+              <a:lvl5pPr marL="2057400" indent="-228600" eaLnBrk="0" hangingPunct="0">
+                <a:defRPr sz="2400">
+                  <a:solidFill>
+                    <a:schemeClr val="tx1"/>
+                  </a:solidFill>
+                  <a:latin typeface="Calibri" charset="0"/>
+                  <a:ea typeface="ＭＳ Ｐゴシック" charset="-128"/>
+                </a:defRPr>
+              </a:lvl5pPr>
+              <a:lvl6pPr marL="2514600" indent="-228600" defTabSz="457200" eaLnBrk="0" fontAlgn="base" hangingPunct="0">
+                <a:spcBef>
+                  <a:spcPct val="0"/>
+                </a:spcBef>
+                <a:spcAft>
+                  <a:spcPct val="0"/>
+                </a:spcAft>
+                <a:defRPr sz="2400">
+                  <a:solidFill>
+                    <a:schemeClr val="tx1"/>
+                  </a:solidFill>
+                  <a:latin typeface="Calibri" charset="0"/>
+                  <a:ea typeface="ＭＳ Ｐゴシック" charset="-128"/>
+                </a:defRPr>
+              </a:lvl6pPr>
+              <a:lvl7pPr marL="2971800" indent="-228600" defTabSz="457200" eaLnBrk="0" fontAlgn="base" hangingPunct="0">
+                <a:spcBef>
+                  <a:spcPct val="0"/>
+                </a:spcBef>
+                <a:spcAft>
+                  <a:spcPct val="0"/>
+                </a:spcAft>
+                <a:defRPr sz="2400">
+                  <a:solidFill>
+                    <a:schemeClr val="tx1"/>
+                  </a:solidFill>
+                  <a:latin typeface="Calibri" charset="0"/>
+                  <a:ea typeface="ＭＳ Ｐゴシック" charset="-128"/>
+                </a:defRPr>
+              </a:lvl7pPr>
+              <a:lvl8pPr marL="3429000" indent="-228600" defTabSz="457200" eaLnBrk="0" fontAlgn="base" hangingPunct="0">
+                <a:spcBef>
+                  <a:spcPct val="0"/>
+                </a:spcBef>
+                <a:spcAft>
+                  <a:spcPct val="0"/>
+                </a:spcAft>
+                <a:defRPr sz="2400">
+                  <a:solidFill>
+                    <a:schemeClr val="tx1"/>
+                  </a:solidFill>
+                  <a:latin typeface="Calibri" charset="0"/>
+                  <a:ea typeface="ＭＳ Ｐゴシック" charset="-128"/>
+                </a:defRPr>
+              </a:lvl8pPr>
+              <a:lvl9pPr marL="3886200" indent="-228600" defTabSz="457200" eaLnBrk="0" fontAlgn="base" hangingPunct="0">
+                <a:spcBef>
+                  <a:spcPct val="0"/>
+                </a:spcBef>
+                <a:spcAft>
+                  <a:spcPct val="0"/>
+                </a:spcAft>
+                <a:defRPr sz="2400">
+                  <a:solidFill>
+                    <a:schemeClr val="tx1"/>
+                  </a:solidFill>
+                  <a:latin typeface="Calibri" charset="0"/>
+                  <a:ea typeface="ＭＳ Ｐゴシック" charset="-128"/>
+                </a:defRPr>
+              </a:lvl9pPr>
+            </a:lstStyle>
+            <a:p>
+              <a:pPr eaLnBrk="1" hangingPunct="1"/>
+              <a:r>
+                <a:rPr lang="en-US" altLang="en-US" sz="2000" dirty="0"/>
+                <a:t>email : string</a:t>
+              </a:r>
+            </a:p>
+            <a:p>
+              <a:pPr eaLnBrk="1" hangingPunct="1"/>
+              <a:r>
+                <a:rPr lang="en-US" altLang="en-US" sz="2000" dirty="0"/>
+                <a:t>...</a:t>
+              </a:r>
+            </a:p>
+          </p:txBody>
+        </p:sp>
+      </p:grpSp>
+      <p:cxnSp>
+        <p:nvCxnSpPr>
+          <p:cNvPr id="17" name="Straight Connector 16">
+            <a:extLst>
+              <a:ext uri="{FF2B5EF4-FFF2-40B4-BE49-F238E27FC236}">
+                <a16:creationId xmlns:a16="http://schemas.microsoft.com/office/drawing/2014/main" id="{11700EBA-4FF2-4546-B8A6-AB85841D1254}"/>
+              </a:ext>
+            </a:extLst>
+          </p:cNvPr>
+          <p:cNvCxnSpPr>
+            <a:cxnSpLocks/>
+            <a:stCxn id="15" idx="3"/>
+            <a:endCxn id="7" idx="1"/>
+          </p:cNvCxnSpPr>
+          <p:nvPr/>
+        </p:nvCxnSpPr>
+        <p:spPr>
+          <a:xfrm>
+            <a:off x="2060449" y="3013502"/>
+            <a:ext cx="2603907" cy="0"/>
+          </a:xfrm>
+          <a:prstGeom prst="line">
+            <a:avLst/>
+          </a:prstGeom>
+          <a:ln w="38100">
+            <a:solidFill>
+              <a:schemeClr val="tx1"/>
+            </a:solidFill>
+          </a:ln>
+        </p:spPr>
+        <p:style>
+          <a:lnRef idx="1">
+            <a:schemeClr val="accent1"/>
+          </a:lnRef>
+          <a:fillRef idx="0">
+            <a:schemeClr val="accent1"/>
+          </a:fillRef>
+          <a:effectRef idx="0">
+            <a:schemeClr val="accent1"/>
+          </a:effectRef>
+          <a:fontRef idx="minor">
+            <a:schemeClr val="tx1"/>
+          </a:fontRef>
+        </p:style>
+      </p:cxnSp>
+      <p:sp>
+        <p:nvSpPr>
+          <p:cNvPr id="21" name="TextBox 20">
+            <a:extLst>
+              <a:ext uri="{FF2B5EF4-FFF2-40B4-BE49-F238E27FC236}">
+                <a16:creationId xmlns:a16="http://schemas.microsoft.com/office/drawing/2014/main" id="{0C10D20A-F47E-3D43-9963-C47489DAB695}"/>
+              </a:ext>
+            </a:extLst>
+          </p:cNvPr>
+          <p:cNvSpPr txBox="1"/>
+          <p:nvPr/>
+        </p:nvSpPr>
+        <p:spPr>
+          <a:xfrm>
+            <a:off x="3025262" y="2644753"/>
+            <a:ext cx="822661" cy="400110"/>
+          </a:xfrm>
+          <a:prstGeom prst="rect">
+            <a:avLst/>
+          </a:prstGeom>
+          <a:noFill/>
+        </p:spPr>
+        <p:txBody>
+          <a:bodyPr wrap="none" rtlCol="0">
+            <a:spAutoFit/>
+          </a:bodyPr>
+          <a:lstStyle/>
+          <a:p>
+            <a:r>
+              <a:rPr lang="en-US" sz="2000" dirty="0"/>
+              <a:t>has ▶︎</a:t>
+            </a:r>
+          </a:p>
+        </p:txBody>
+      </p:sp>
+      <p:sp>
+        <p:nvSpPr>
+          <p:cNvPr id="22" name="TextBox 21">
+            <a:extLst>
+              <a:ext uri="{FF2B5EF4-FFF2-40B4-BE49-F238E27FC236}">
+                <a16:creationId xmlns:a16="http://schemas.microsoft.com/office/drawing/2014/main" id="{48014A44-43C8-BF4A-BE47-E8A68DCD7DB5}"/>
+              </a:ext>
+            </a:extLst>
+          </p:cNvPr>
+          <p:cNvSpPr txBox="1"/>
+          <p:nvPr/>
+        </p:nvSpPr>
+        <p:spPr>
+          <a:xfrm>
+            <a:off x="4050084" y="2656945"/>
+            <a:ext cx="614271" cy="707886"/>
+          </a:xfrm>
+          <a:prstGeom prst="rect">
+            <a:avLst/>
+          </a:prstGeom>
+          <a:noFill/>
+        </p:spPr>
+        <p:txBody>
+          <a:bodyPr wrap="none" rtlCol="0">
+            <a:spAutoFit/>
+          </a:bodyPr>
+          <a:lstStyle/>
+          <a:p>
+            <a:pPr algn="r"/>
+            <a:r>
+              <a:rPr lang="en-US" sz="2000" dirty="0"/>
+              <a:t>*</a:t>
+            </a:r>
+          </a:p>
+          <a:p>
+            <a:pPr algn="r"/>
+            <a:r>
+              <a:rPr lang="en-US" sz="2000" dirty="0"/>
+              <a:t>quiz</a:t>
+            </a:r>
+          </a:p>
+        </p:txBody>
+      </p:sp>
+      <p:sp>
+        <p:nvSpPr>
+          <p:cNvPr id="23" name="TextBox 22">
+            <a:extLst>
+              <a:ext uri="{FF2B5EF4-FFF2-40B4-BE49-F238E27FC236}">
+                <a16:creationId xmlns:a16="http://schemas.microsoft.com/office/drawing/2014/main" id="{2F668590-178B-0C4A-BB41-0C9E7E8E93E2}"/>
+              </a:ext>
+            </a:extLst>
+          </p:cNvPr>
+          <p:cNvSpPr txBox="1"/>
+          <p:nvPr/>
+        </p:nvSpPr>
+        <p:spPr>
+          <a:xfrm>
+            <a:off x="2060449" y="2654170"/>
+            <a:ext cx="854721" cy="707886"/>
+          </a:xfrm>
+          <a:prstGeom prst="rect">
+            <a:avLst/>
+          </a:prstGeom>
+          <a:noFill/>
+        </p:spPr>
+        <p:txBody>
+          <a:bodyPr wrap="none" rtlCol="0">
+            <a:spAutoFit/>
+          </a:bodyPr>
+          <a:lstStyle/>
+          <a:p>
+            <a:r>
+              <a:rPr lang="en-US" sz="2000" dirty="0"/>
+              <a:t>1</a:t>
+            </a:r>
+          </a:p>
+          <a:p>
+            <a:r>
+              <a:rPr lang="en-US" sz="2000" dirty="0"/>
+              <a:t>owner</a:t>
+            </a:r>
+          </a:p>
+        </p:txBody>
+      </p:sp>
+      <p:cxnSp>
+        <p:nvCxnSpPr>
+          <p:cNvPr id="10" name="Elbow Connector 9">
+            <a:extLst>
+              <a:ext uri="{FF2B5EF4-FFF2-40B4-BE49-F238E27FC236}">
+                <a16:creationId xmlns:a16="http://schemas.microsoft.com/office/drawing/2014/main" id="{85092E11-E401-BA4C-A7C3-7E0B0F89B617}"/>
+              </a:ext>
+            </a:extLst>
+          </p:cNvPr>
+          <p:cNvCxnSpPr>
+            <a:stCxn id="15" idx="2"/>
+            <a:endCxn id="7" idx="2"/>
+          </p:cNvCxnSpPr>
+          <p:nvPr/>
+        </p:nvCxnSpPr>
+        <p:spPr>
+          <a:xfrm rot="16200000" flipH="1">
+            <a:off x="3362403" y="1091882"/>
+            <a:ext cx="12700" cy="4551126"/>
+          </a:xfrm>
+          <a:prstGeom prst="bentConnector3">
+            <a:avLst>
+              <a:gd name="adj1" fmla="val 5843835"/>
+            </a:avLst>
+          </a:prstGeom>
+          <a:ln w="38100">
+            <a:solidFill>
+              <a:schemeClr val="tx1"/>
+            </a:solidFill>
+          </a:ln>
+        </p:spPr>
+        <p:style>
+          <a:lnRef idx="1">
+            <a:schemeClr val="accent1"/>
+          </a:lnRef>
+          <a:fillRef idx="0">
+            <a:schemeClr val="accent1"/>
+          </a:fillRef>
+          <a:effectRef idx="0">
+            <a:schemeClr val="accent1"/>
+          </a:effectRef>
+          <a:fontRef idx="minor">
+            <a:schemeClr val="tx1"/>
+          </a:fontRef>
+        </p:style>
+      </p:cxnSp>
+      <p:sp>
+        <p:nvSpPr>
+          <p:cNvPr id="24" name="TextBox 23">
+            <a:extLst>
+              <a:ext uri="{FF2B5EF4-FFF2-40B4-BE49-F238E27FC236}">
+                <a16:creationId xmlns:a16="http://schemas.microsoft.com/office/drawing/2014/main" id="{F1D944FB-6B92-6047-B6F8-0E01668E2499}"/>
+              </a:ext>
+            </a:extLst>
+          </p:cNvPr>
+          <p:cNvSpPr txBox="1"/>
+          <p:nvPr/>
+        </p:nvSpPr>
+        <p:spPr>
+          <a:xfrm>
+            <a:off x="5381751" y="3385027"/>
+            <a:ext cx="1229824" cy="400110"/>
+          </a:xfrm>
+          <a:prstGeom prst="rect">
+            <a:avLst/>
+          </a:prstGeom>
+          <a:noFill/>
+        </p:spPr>
+        <p:txBody>
+          <a:bodyPr wrap="none" rtlCol="0">
+            <a:spAutoFit/>
+          </a:bodyPr>
+          <a:lstStyle/>
+          <a:p>
+            <a:pPr algn="r"/>
+            <a:r>
+              <a:rPr lang="en-US" sz="2000" dirty="0"/>
+              <a:t>*  favorite</a:t>
+            </a:r>
+          </a:p>
+        </p:txBody>
+      </p:sp>
+      <p:sp>
+        <p:nvSpPr>
+          <p:cNvPr id="25" name="TextBox 24">
+            <a:extLst>
+              <a:ext uri="{FF2B5EF4-FFF2-40B4-BE49-F238E27FC236}">
+                <a16:creationId xmlns:a16="http://schemas.microsoft.com/office/drawing/2014/main" id="{8CBF8C9E-103C-2F44-A564-61E3C090F105}"/>
+              </a:ext>
+            </a:extLst>
+          </p:cNvPr>
+          <p:cNvSpPr txBox="1"/>
+          <p:nvPr/>
+        </p:nvSpPr>
+        <p:spPr>
+          <a:xfrm>
+            <a:off x="830625" y="3386146"/>
+            <a:ext cx="760144" cy="400110"/>
+          </a:xfrm>
+          <a:prstGeom prst="rect">
+            <a:avLst/>
+          </a:prstGeom>
+          <a:noFill/>
+        </p:spPr>
+        <p:txBody>
+          <a:bodyPr wrap="none" rtlCol="0">
+            <a:spAutoFit/>
+          </a:bodyPr>
+          <a:lstStyle/>
+          <a:p>
+            <a:r>
+              <a:rPr lang="en-US" sz="2000" dirty="0"/>
+              <a:t>*  fan</a:t>
+            </a:r>
+          </a:p>
+        </p:txBody>
+      </p:sp>
+      <p:grpSp>
+        <p:nvGrpSpPr>
+          <p:cNvPr id="26" name="Group 25">
+            <a:extLst>
+              <a:ext uri="{FF2B5EF4-FFF2-40B4-BE49-F238E27FC236}">
+                <a16:creationId xmlns:a16="http://schemas.microsoft.com/office/drawing/2014/main" id="{8F45B5BC-7D00-B842-9159-31E57C8FFDB9}"/>
+              </a:ext>
+            </a:extLst>
+          </p:cNvPr>
+          <p:cNvGrpSpPr/>
+          <p:nvPr/>
+        </p:nvGrpSpPr>
+        <p:grpSpPr>
+          <a:xfrm>
+            <a:off x="2343293" y="4992211"/>
+            <a:ext cx="1947218" cy="800220"/>
+            <a:chOff x="3897790" y="1311900"/>
+            <a:chExt cx="3458441" cy="800220"/>
+          </a:xfrm>
+        </p:grpSpPr>
+        <p:sp>
+          <p:nvSpPr>
+            <p:cNvPr id="27" name="TextBox 29">
+              <a:extLst>
+                <a:ext uri="{FF2B5EF4-FFF2-40B4-BE49-F238E27FC236}">
+                  <a16:creationId xmlns:a16="http://schemas.microsoft.com/office/drawing/2014/main" id="{6D63C3E3-DE76-A544-A0F0-9CE186ED56BB}"/>
+                </a:ext>
+              </a:extLst>
+            </p:cNvPr>
+            <p:cNvSpPr txBox="1">
+              <a:spLocks noChangeArrowheads="1"/>
+            </p:cNvSpPr>
+            <p:nvPr/>
+          </p:nvSpPr>
+          <p:spPr bwMode="auto">
+            <a:xfrm>
+              <a:off x="3897790" y="1311900"/>
+              <a:ext cx="3458441" cy="400110"/>
+            </a:xfrm>
+            <a:prstGeom prst="rect">
+              <a:avLst/>
+            </a:prstGeom>
+            <a:noFill/>
+            <a:ln w="38100">
+              <a:solidFill>
+                <a:schemeClr val="tx1"/>
+              </a:solidFill>
+              <a:miter lim="800000"/>
+              <a:headEnd/>
+              <a:tailEnd/>
+            </a:ln>
+            <a:extLst>
+              <a:ext uri="{909E8E84-426E-40DD-AFC4-6F175D3DCCD1}">
+                <a14:hiddenFill xmlns:a14="http://schemas.microsoft.com/office/drawing/2010/main">
+                  <a:solidFill>
+                    <a:srgbClr val="FFFFFF"/>
+                  </a:solidFill>
+                </a14:hiddenFill>
+              </a:ext>
+            </a:extLst>
+          </p:spPr>
+          <p:txBody>
+            <a:bodyPr wrap="square">
+              <a:spAutoFit/>
+            </a:bodyPr>
+            <a:lstStyle>
+              <a:lvl1pPr eaLnBrk="0" hangingPunct="0">
+                <a:defRPr sz="2400">
+                  <a:solidFill>
+                    <a:schemeClr val="tx1"/>
+                  </a:solidFill>
+                  <a:latin typeface="Calibri" charset="0"/>
+                  <a:ea typeface="ＭＳ Ｐゴシック" charset="-128"/>
+                </a:defRPr>
+              </a:lvl1pPr>
+              <a:lvl2pPr marL="742950" indent="-285750" eaLnBrk="0" hangingPunct="0">
+                <a:defRPr sz="2400">
+                  <a:solidFill>
+                    <a:schemeClr val="tx1"/>
+                  </a:solidFill>
+                  <a:latin typeface="Calibri" charset="0"/>
+                  <a:ea typeface="ＭＳ Ｐゴシック" charset="-128"/>
+                </a:defRPr>
+              </a:lvl2pPr>
+              <a:lvl3pPr marL="1143000" indent="-228600" eaLnBrk="0" hangingPunct="0">
+                <a:defRPr sz="2400">
+                  <a:solidFill>
+                    <a:schemeClr val="tx1"/>
+                  </a:solidFill>
+                  <a:latin typeface="Calibri" charset="0"/>
+                  <a:ea typeface="ＭＳ Ｐゴシック" charset="-128"/>
+                </a:defRPr>
+              </a:lvl3pPr>
+              <a:lvl4pPr marL="1600200" indent="-228600" eaLnBrk="0" hangingPunct="0">
+                <a:defRPr sz="2400">
+                  <a:solidFill>
+                    <a:schemeClr val="tx1"/>
+                  </a:solidFill>
+                  <a:latin typeface="Calibri" charset="0"/>
+                  <a:ea typeface="ＭＳ Ｐゴシック" charset="-128"/>
+                </a:defRPr>
+              </a:lvl4pPr>
+              <a:lvl5pPr marL="2057400" indent="-228600" eaLnBrk="0" hangingPunct="0">
+                <a:defRPr sz="2400">
+                  <a:solidFill>
+                    <a:schemeClr val="tx1"/>
+                  </a:solidFill>
+                  <a:latin typeface="Calibri" charset="0"/>
+                  <a:ea typeface="ＭＳ Ｐゴシック" charset="-128"/>
+                </a:defRPr>
+              </a:lvl5pPr>
+              <a:lvl6pPr marL="2514600" indent="-228600" defTabSz="457200" eaLnBrk="0" fontAlgn="base" hangingPunct="0">
+                <a:spcBef>
+                  <a:spcPct val="0"/>
+                </a:spcBef>
+                <a:spcAft>
+                  <a:spcPct val="0"/>
+                </a:spcAft>
+                <a:defRPr sz="2400">
+                  <a:solidFill>
+                    <a:schemeClr val="tx1"/>
+                  </a:solidFill>
+                  <a:latin typeface="Calibri" charset="0"/>
+                  <a:ea typeface="ＭＳ Ｐゴシック" charset="-128"/>
+                </a:defRPr>
+              </a:lvl6pPr>
+              <a:lvl7pPr marL="2971800" indent="-228600" defTabSz="457200" eaLnBrk="0" fontAlgn="base" hangingPunct="0">
+                <a:spcBef>
+                  <a:spcPct val="0"/>
+                </a:spcBef>
+                <a:spcAft>
+                  <a:spcPct val="0"/>
+                </a:spcAft>
+                <a:defRPr sz="2400">
+                  <a:solidFill>
+                    <a:schemeClr val="tx1"/>
+                  </a:solidFill>
+                  <a:latin typeface="Calibri" charset="0"/>
+                  <a:ea typeface="ＭＳ Ｐゴシック" charset="-128"/>
+                </a:defRPr>
+              </a:lvl7pPr>
+              <a:lvl8pPr marL="3429000" indent="-228600" defTabSz="457200" eaLnBrk="0" fontAlgn="base" hangingPunct="0">
+                <a:spcBef>
+                  <a:spcPct val="0"/>
+                </a:spcBef>
+                <a:spcAft>
+                  <a:spcPct val="0"/>
+                </a:spcAft>
+                <a:defRPr sz="2400">
+                  <a:solidFill>
+                    <a:schemeClr val="tx1"/>
+                  </a:solidFill>
+                  <a:latin typeface="Calibri" charset="0"/>
+                  <a:ea typeface="ＭＳ Ｐゴシック" charset="-128"/>
+                </a:defRPr>
+              </a:lvl8pPr>
+              <a:lvl9pPr marL="3886200" indent="-228600" defTabSz="457200" eaLnBrk="0" fontAlgn="base" hangingPunct="0">
+                <a:spcBef>
+                  <a:spcPct val="0"/>
+                </a:spcBef>
+                <a:spcAft>
+                  <a:spcPct val="0"/>
+                </a:spcAft>
+                <a:defRPr sz="2400">
+                  <a:solidFill>
+                    <a:schemeClr val="tx1"/>
+                  </a:solidFill>
+                  <a:latin typeface="Calibri" charset="0"/>
+                  <a:ea typeface="ＭＳ Ｐゴシック" charset="-128"/>
+                </a:defRPr>
+              </a:lvl9pPr>
+            </a:lstStyle>
+            <a:p>
+              <a:pPr eaLnBrk="1" hangingPunct="1"/>
+              <a:r>
+                <a:rPr lang="en-US" altLang="en-US" sz="2000" dirty="0"/>
+                <a:t>Favorite</a:t>
+              </a:r>
+            </a:p>
+          </p:txBody>
+        </p:sp>
+        <p:sp>
+          <p:nvSpPr>
+            <p:cNvPr id="28" name="TextBox 29">
+              <a:extLst>
+                <a:ext uri="{FF2B5EF4-FFF2-40B4-BE49-F238E27FC236}">
+                  <a16:creationId xmlns:a16="http://schemas.microsoft.com/office/drawing/2014/main" id="{3F31A9A4-C63A-974F-A494-43A8592EA650}"/>
+                </a:ext>
+              </a:extLst>
+            </p:cNvPr>
+            <p:cNvSpPr txBox="1">
+              <a:spLocks noChangeArrowheads="1"/>
+            </p:cNvSpPr>
+            <p:nvPr/>
+          </p:nvSpPr>
+          <p:spPr bwMode="auto">
+            <a:xfrm>
+              <a:off x="3897790" y="1712010"/>
+              <a:ext cx="3458441" cy="400110"/>
+            </a:xfrm>
+            <a:prstGeom prst="rect">
+              <a:avLst/>
+            </a:prstGeom>
+            <a:noFill/>
+            <a:ln w="38100">
+              <a:solidFill>
+                <a:schemeClr val="tx1"/>
+              </a:solidFill>
+              <a:miter lim="800000"/>
+              <a:headEnd/>
+              <a:tailEnd/>
+            </a:ln>
+            <a:extLst>
+              <a:ext uri="{909E8E84-426E-40DD-AFC4-6F175D3DCCD1}">
+                <a14:hiddenFill xmlns:a14="http://schemas.microsoft.com/office/drawing/2010/main">
+                  <a:solidFill>
+                    <a:srgbClr val="FFFFFF"/>
+                  </a:solidFill>
+                </a14:hiddenFill>
+              </a:ext>
+            </a:extLst>
+          </p:spPr>
+          <p:txBody>
+            <a:bodyPr wrap="square">
+              <a:spAutoFit/>
+            </a:bodyPr>
+            <a:lstStyle>
+              <a:lvl1pPr eaLnBrk="0" hangingPunct="0">
+                <a:defRPr sz="2400">
+                  <a:solidFill>
+                    <a:schemeClr val="tx1"/>
+                  </a:solidFill>
+                  <a:latin typeface="Calibri" charset="0"/>
+                  <a:ea typeface="ＭＳ Ｐゴシック" charset="-128"/>
+                </a:defRPr>
+              </a:lvl1pPr>
+              <a:lvl2pPr marL="742950" indent="-285750" eaLnBrk="0" hangingPunct="0">
+                <a:defRPr sz="2400">
+                  <a:solidFill>
+                    <a:schemeClr val="tx1"/>
+                  </a:solidFill>
+                  <a:latin typeface="Calibri" charset="0"/>
+                  <a:ea typeface="ＭＳ Ｐゴシック" charset="-128"/>
+                </a:defRPr>
+              </a:lvl2pPr>
+              <a:lvl3pPr marL="1143000" indent="-228600" eaLnBrk="0" hangingPunct="0">
+                <a:defRPr sz="2400">
+                  <a:solidFill>
+                    <a:schemeClr val="tx1"/>
+                  </a:solidFill>
+                  <a:latin typeface="Calibri" charset="0"/>
+                  <a:ea typeface="ＭＳ Ｐゴシック" charset="-128"/>
+                </a:defRPr>
+              </a:lvl3pPr>
+              <a:lvl4pPr marL="1600200" indent="-228600" eaLnBrk="0" hangingPunct="0">
+                <a:defRPr sz="2400">
+                  <a:solidFill>
+                    <a:schemeClr val="tx1"/>
+                  </a:solidFill>
+                  <a:latin typeface="Calibri" charset="0"/>
+                  <a:ea typeface="ＭＳ Ｐゴシック" charset="-128"/>
+                </a:defRPr>
+              </a:lvl4pPr>
+              <a:lvl5pPr marL="2057400" indent="-228600" eaLnBrk="0" hangingPunct="0">
+                <a:defRPr sz="2400">
+                  <a:solidFill>
+                    <a:schemeClr val="tx1"/>
+                  </a:solidFill>
+                  <a:latin typeface="Calibri" charset="0"/>
+                  <a:ea typeface="ＭＳ Ｐゴシック" charset="-128"/>
+                </a:defRPr>
+              </a:lvl5pPr>
+              <a:lvl6pPr marL="2514600" indent="-228600" defTabSz="457200" eaLnBrk="0" fontAlgn="base" hangingPunct="0">
+                <a:spcBef>
+                  <a:spcPct val="0"/>
+                </a:spcBef>
+                <a:spcAft>
+                  <a:spcPct val="0"/>
+                </a:spcAft>
+                <a:defRPr sz="2400">
+                  <a:solidFill>
+                    <a:schemeClr val="tx1"/>
+                  </a:solidFill>
+                  <a:latin typeface="Calibri" charset="0"/>
+                  <a:ea typeface="ＭＳ Ｐゴシック" charset="-128"/>
+                </a:defRPr>
+              </a:lvl6pPr>
+              <a:lvl7pPr marL="2971800" indent="-228600" defTabSz="457200" eaLnBrk="0" fontAlgn="base" hangingPunct="0">
+                <a:spcBef>
+                  <a:spcPct val="0"/>
+                </a:spcBef>
+                <a:spcAft>
+                  <a:spcPct val="0"/>
+                </a:spcAft>
+                <a:defRPr sz="2400">
+                  <a:solidFill>
+                    <a:schemeClr val="tx1"/>
+                  </a:solidFill>
+                  <a:latin typeface="Calibri" charset="0"/>
+                  <a:ea typeface="ＭＳ Ｐゴシック" charset="-128"/>
+                </a:defRPr>
+              </a:lvl7pPr>
+              <a:lvl8pPr marL="3429000" indent="-228600" defTabSz="457200" eaLnBrk="0" fontAlgn="base" hangingPunct="0">
+                <a:spcBef>
+                  <a:spcPct val="0"/>
+                </a:spcBef>
+                <a:spcAft>
+                  <a:spcPct val="0"/>
+                </a:spcAft>
+                <a:defRPr sz="2400">
+                  <a:solidFill>
+                    <a:schemeClr val="tx1"/>
+                  </a:solidFill>
+                  <a:latin typeface="Calibri" charset="0"/>
+                  <a:ea typeface="ＭＳ Ｐゴシック" charset="-128"/>
+                </a:defRPr>
+              </a:lvl8pPr>
+              <a:lvl9pPr marL="3886200" indent="-228600" defTabSz="457200" eaLnBrk="0" fontAlgn="base" hangingPunct="0">
+                <a:spcBef>
+                  <a:spcPct val="0"/>
+                </a:spcBef>
+                <a:spcAft>
+                  <a:spcPct val="0"/>
+                </a:spcAft>
+                <a:defRPr sz="2400">
+                  <a:solidFill>
+                    <a:schemeClr val="tx1"/>
+                  </a:solidFill>
+                  <a:latin typeface="Calibri" charset="0"/>
+                  <a:ea typeface="ＭＳ Ｐゴシック" charset="-128"/>
+                </a:defRPr>
+              </a:lvl9pPr>
+            </a:lstStyle>
+            <a:p>
+              <a:pPr eaLnBrk="1" hangingPunct="1"/>
+              <a:endParaRPr lang="en-US" altLang="en-US" sz="2000" dirty="0"/>
+            </a:p>
+          </p:txBody>
+        </p:sp>
+      </p:grpSp>
+      <p:cxnSp>
+        <p:nvCxnSpPr>
+          <p:cNvPr id="18" name="Straight Connector 17">
+            <a:extLst>
+              <a:ext uri="{FF2B5EF4-FFF2-40B4-BE49-F238E27FC236}">
+                <a16:creationId xmlns:a16="http://schemas.microsoft.com/office/drawing/2014/main" id="{7ED81354-CB51-7047-9C03-FC979DA291A8}"/>
+              </a:ext>
+            </a:extLst>
+          </p:cNvPr>
+          <p:cNvCxnSpPr>
+            <a:cxnSpLocks/>
+            <a:endCxn id="27" idx="0"/>
+          </p:cNvCxnSpPr>
+          <p:nvPr/>
+        </p:nvCxnSpPr>
+        <p:spPr>
+          <a:xfrm>
+            <a:off x="3316902" y="4096011"/>
+            <a:ext cx="0" cy="896200"/>
+          </a:xfrm>
+          <a:prstGeom prst="line">
+            <a:avLst/>
+          </a:prstGeom>
+          <a:ln w="38100">
+            <a:solidFill>
+              <a:schemeClr val="tx1"/>
+            </a:solidFill>
+            <a:prstDash val="dash"/>
+          </a:ln>
+        </p:spPr>
+        <p:style>
+          <a:lnRef idx="1">
+            <a:schemeClr val="accent1"/>
+          </a:lnRef>
+          <a:fillRef idx="0">
+            <a:schemeClr val="accent1"/>
+          </a:fillRef>
+          <a:effectRef idx="0">
+            <a:schemeClr val="accent1"/>
+          </a:effectRef>
+          <a:fontRef idx="minor">
+            <a:schemeClr val="tx1"/>
+          </a:fontRef>
+        </p:style>
+      </p:cxnSp>
+    </p:spTree>
+    <p:extLst>
+      <p:ext uri="{BB962C8B-B14F-4D97-AF65-F5344CB8AC3E}">
+        <p14:creationId xmlns:p14="http://schemas.microsoft.com/office/powerpoint/2010/main" val="1001630686"/>
+      </p:ext>
+    </p:extLst>
+  </p:cSld>
+  <p:clrMapOvr>
+    <a:masterClrMapping/>
+  </p:clrMapOvr>
+</p:sld>
+</file>
+
 <file path=ppt/theme/theme1.xml><?xml version="1.0" encoding="utf-8"?>
 <a:theme xmlns:a="http://schemas.openxmlformats.org/drawingml/2006/main" name="Office Theme">
   <a:themeElements>

</xml_diff>